<commit_message>
Added a slide about the legal side of things
</commit_message>
<xml_diff>
--- a/Sitting in meetings all day long.pptx
+++ b/Sitting in meetings all day long.pptx
@@ -5,7 +5,7 @@
     <p:sldMasterId id="2147483660" r:id="rId1"/>
   </p:sldMasterIdLst>
   <p:notesMasterIdLst>
-    <p:notesMasterId r:id="rId20"/>
+    <p:notesMasterId r:id="rId21"/>
   </p:notesMasterIdLst>
   <p:sldIdLst>
     <p:sldId id="256" r:id="rId2"/>
@@ -15,17 +15,18 @@
     <p:sldId id="297" r:id="rId6"/>
     <p:sldId id="298" r:id="rId7"/>
     <p:sldId id="289" r:id="rId8"/>
-    <p:sldId id="292" r:id="rId9"/>
-    <p:sldId id="299" r:id="rId10"/>
+    <p:sldId id="299" r:id="rId9"/>
+    <p:sldId id="292" r:id="rId10"/>
     <p:sldId id="294" r:id="rId11"/>
     <p:sldId id="293" r:id="rId12"/>
     <p:sldId id="295" r:id="rId13"/>
-    <p:sldId id="287" r:id="rId14"/>
-    <p:sldId id="290" r:id="rId15"/>
-    <p:sldId id="291" r:id="rId16"/>
-    <p:sldId id="288" r:id="rId17"/>
-    <p:sldId id="284" r:id="rId18"/>
-    <p:sldId id="285" r:id="rId19"/>
+    <p:sldId id="300" r:id="rId14"/>
+    <p:sldId id="287" r:id="rId15"/>
+    <p:sldId id="290" r:id="rId16"/>
+    <p:sldId id="291" r:id="rId17"/>
+    <p:sldId id="288" r:id="rId18"/>
+    <p:sldId id="284" r:id="rId19"/>
+    <p:sldId id="285" r:id="rId20"/>
   </p:sldIdLst>
   <p:sldSz cx="12192000" cy="6858000"/>
   <p:notesSz cx="6858000" cy="9144000"/>
@@ -214,7 +215,7 @@
           <a:p>
             <a:fld id="{2B6DBF41-98D5-4B29-8B81-B31614D19ACC}" type="datetimeFigureOut">
               <a:rPr lang="en-US" smtClean="0"/>
-              <a:t>2/25/24</a:t>
+              <a:t>3/8/24</a:t>
             </a:fld>
             <a:endParaRPr lang="en-US"/>
           </a:p>
@@ -762,7 +763,7 @@
           <a:p>
             <a:fld id="{F9BC75CE-03FF-4667-898C-4C70B4392062}" type="datetimeFigureOut">
               <a:rPr lang="en-US" smtClean="0"/>
-              <a:t>2/25/24</a:t>
+              <a:t>3/8/24</a:t>
             </a:fld>
             <a:endParaRPr lang="en-US"/>
           </a:p>
@@ -1037,7 +1038,7 @@
           <a:p>
             <a:fld id="{F9BC75CE-03FF-4667-898C-4C70B4392062}" type="datetimeFigureOut">
               <a:rPr lang="en-US" smtClean="0"/>
-              <a:t>2/25/24</a:t>
+              <a:t>3/8/24</a:t>
             </a:fld>
             <a:endParaRPr lang="en-US"/>
           </a:p>
@@ -1231,7 +1232,7 @@
           <a:p>
             <a:fld id="{F9BC75CE-03FF-4667-898C-4C70B4392062}" type="datetimeFigureOut">
               <a:rPr lang="en-US" smtClean="0"/>
-              <a:t>2/25/24</a:t>
+              <a:t>3/8/24</a:t>
             </a:fld>
             <a:endParaRPr lang="en-US"/>
           </a:p>
@@ -1504,7 +1505,7 @@
           <a:p>
             <a:fld id="{F9BC75CE-03FF-4667-898C-4C70B4392062}" type="datetimeFigureOut">
               <a:rPr lang="en-US" smtClean="0"/>
-              <a:t>2/25/24</a:t>
+              <a:t>3/8/24</a:t>
             </a:fld>
             <a:endParaRPr lang="en-US"/>
           </a:p>
@@ -1845,7 +1846,7 @@
           <a:p>
             <a:fld id="{F9BC75CE-03FF-4667-898C-4C70B4392062}" type="datetimeFigureOut">
               <a:rPr lang="en-US" smtClean="0"/>
-              <a:t>2/25/24</a:t>
+              <a:t>3/8/24</a:t>
             </a:fld>
             <a:endParaRPr lang="en-US"/>
           </a:p>
@@ -2468,7 +2469,7 @@
           <a:p>
             <a:fld id="{F9BC75CE-03FF-4667-898C-4C70B4392062}" type="datetimeFigureOut">
               <a:rPr lang="en-US" smtClean="0"/>
-              <a:t>2/25/24</a:t>
+              <a:t>3/8/24</a:t>
             </a:fld>
             <a:endParaRPr lang="en-US"/>
           </a:p>
@@ -3328,7 +3329,7 @@
           <a:p>
             <a:fld id="{F9BC75CE-03FF-4667-898C-4C70B4392062}" type="datetimeFigureOut">
               <a:rPr lang="en-US" smtClean="0"/>
-              <a:t>2/25/24</a:t>
+              <a:t>3/8/24</a:t>
             </a:fld>
             <a:endParaRPr lang="en-US"/>
           </a:p>
@@ -3498,7 +3499,7 @@
           <a:p>
             <a:fld id="{F9BC75CE-03FF-4667-898C-4C70B4392062}" type="datetimeFigureOut">
               <a:rPr lang="en-US" smtClean="0"/>
-              <a:t>2/25/24</a:t>
+              <a:t>3/8/24</a:t>
             </a:fld>
             <a:endParaRPr lang="en-US"/>
           </a:p>
@@ -3678,7 +3679,7 @@
           <a:p>
             <a:fld id="{F9BC75CE-03FF-4667-898C-4C70B4392062}" type="datetimeFigureOut">
               <a:rPr lang="en-US" smtClean="0"/>
-              <a:t>2/25/24</a:t>
+              <a:t>3/8/24</a:t>
             </a:fld>
             <a:endParaRPr lang="en-US"/>
           </a:p>
@@ -3848,7 +3849,7 @@
           <a:p>
             <a:fld id="{F9BC75CE-03FF-4667-898C-4C70B4392062}" type="datetimeFigureOut">
               <a:rPr lang="en-US" smtClean="0"/>
-              <a:t>2/25/24</a:t>
+              <a:t>3/8/24</a:t>
             </a:fld>
             <a:endParaRPr lang="en-US"/>
           </a:p>
@@ -4095,7 +4096,7 @@
           <a:p>
             <a:fld id="{F9BC75CE-03FF-4667-898C-4C70B4392062}" type="datetimeFigureOut">
               <a:rPr lang="en-US" smtClean="0"/>
-              <a:t>2/25/24</a:t>
+              <a:t>3/8/24</a:t>
             </a:fld>
             <a:endParaRPr lang="en-US"/>
           </a:p>
@@ -4387,7 +4388,7 @@
           <a:p>
             <a:fld id="{F9BC75CE-03FF-4667-898C-4C70B4392062}" type="datetimeFigureOut">
               <a:rPr lang="en-US" smtClean="0"/>
-              <a:t>2/25/24</a:t>
+              <a:t>3/8/24</a:t>
             </a:fld>
             <a:endParaRPr lang="en-US"/>
           </a:p>
@@ -4831,7 +4832,7 @@
           <a:p>
             <a:fld id="{F9BC75CE-03FF-4667-898C-4C70B4392062}" type="datetimeFigureOut">
               <a:rPr lang="en-US" smtClean="0"/>
-              <a:t>2/25/24</a:t>
+              <a:t>3/8/24</a:t>
             </a:fld>
             <a:endParaRPr lang="en-US"/>
           </a:p>
@@ -4949,7 +4950,7 @@
           <a:p>
             <a:fld id="{F9BC75CE-03FF-4667-898C-4C70B4392062}" type="datetimeFigureOut">
               <a:rPr lang="en-US" smtClean="0"/>
-              <a:t>2/25/24</a:t>
+              <a:t>3/8/24</a:t>
             </a:fld>
             <a:endParaRPr lang="en-US"/>
           </a:p>
@@ -5044,7 +5045,7 @@
           <a:p>
             <a:fld id="{F9BC75CE-03FF-4667-898C-4C70B4392062}" type="datetimeFigureOut">
               <a:rPr lang="en-US" smtClean="0"/>
-              <a:t>2/25/24</a:t>
+              <a:t>3/8/24</a:t>
             </a:fld>
             <a:endParaRPr lang="en-US"/>
           </a:p>
@@ -5323,7 +5324,7 @@
           <a:p>
             <a:fld id="{F9BC75CE-03FF-4667-898C-4C70B4392062}" type="datetimeFigureOut">
               <a:rPr lang="en-US" smtClean="0"/>
-              <a:t>2/25/24</a:t>
+              <a:t>3/8/24</a:t>
             </a:fld>
             <a:endParaRPr lang="en-US"/>
           </a:p>
@@ -5598,7 +5599,7 @@
           <a:p>
             <a:fld id="{F9BC75CE-03FF-4667-898C-4C70B4392062}" type="datetimeFigureOut">
               <a:rPr lang="en-US" smtClean="0"/>
-              <a:t>2/25/24</a:t>
+              <a:t>3/8/24</a:t>
             </a:fld>
             <a:endParaRPr lang="en-US"/>
           </a:p>
@@ -6027,7 +6028,7 @@
           <a:p>
             <a:fld id="{F9BC75CE-03FF-4667-898C-4C70B4392062}" type="datetimeFigureOut">
               <a:rPr lang="en-US" smtClean="0"/>
-              <a:t>2/25/24</a:t>
+              <a:t>3/8/24</a:t>
             </a:fld>
             <a:endParaRPr lang="en-US"/>
           </a:p>
@@ -7497,82 +7498,65 @@
           <p:cNvPr id="2" name="Title 1">
             <a:extLst>
               <a:ext uri="{FF2B5EF4-FFF2-40B4-BE49-F238E27FC236}">
-                <a16:creationId xmlns:a16="http://schemas.microsoft.com/office/drawing/2014/main" id="{7306C212-B3B4-8E92-B9B3-B626EF37EBA4}"/>
+                <a16:creationId xmlns:a16="http://schemas.microsoft.com/office/drawing/2014/main" id="{85AD860C-A17C-AE6C-22A8-9F41B0D57738}"/>
               </a:ext>
             </a:extLst>
           </p:cNvPr>
-          <p:cNvSpPr txBox="1">
-            <a:spLocks noGrp="1"/>
-          </p:cNvSpPr>
-          <p:nvPr>
-            <p:ph type="title" idx="4294967295"/>
-          </p:nvPr>
-        </p:nvSpPr>
-        <p:spPr>
-          <a:xfrm>
-            <a:off x="1061794" y="2274838"/>
-            <a:ext cx="10068412" cy="2308324"/>
-          </a:xfrm>
-          <a:prstGeom prst="rect">
-            <a:avLst/>
-          </a:prstGeom>
-          <a:noFill/>
-          <a:ln>
-            <a:noFill/>
-            <a:prstDash/>
-          </a:ln>
-          <a:effectLst/>
-        </p:spPr>
-        <p:txBody>
-          <a:bodyPr rot="0" spcFirstLastPara="0" vertOverflow="overflow" horzOverflow="overflow" vert="horz" wrap="square" lIns="91440" tIns="45720" rIns="91440" bIns="45720" numCol="1" spcCol="0" rtlCol="0" fromWordArt="0" anchor="t" anchorCtr="0" forceAA="0" compatLnSpc="1">
-            <a:prstTxWarp prst="textNoShape">
-              <a:avLst/>
-            </a:prstTxWarp>
-            <a:spAutoFit/>
-          </a:bodyPr>
+          <p:cNvSpPr>
+            <a:spLocks noGrp="1"/>
+          </p:cNvSpPr>
+          <p:nvPr>
+            <p:ph type="title"/>
+          </p:nvPr>
+        </p:nvSpPr>
+        <p:spPr/>
+        <p:txBody>
+          <a:bodyPr/>
           <a:lstStyle/>
           <a:p>
-            <a:pPr marL="0" marR="0" lvl="0" indent="0" algn="ctr" defTabSz="457200" rtl="0" eaLnBrk="1" fontAlgn="auto" latinLnBrk="0" hangingPunct="1">
-              <a:lnSpc>
-                <a:spcPct val="100000"/>
-              </a:lnSpc>
-              <a:spcBef>
-                <a:spcPts val="0"/>
-              </a:spcBef>
-              <a:spcAft>
-                <a:spcPts val="0"/>
-              </a:spcAft>
-              <a:buClrTx/>
-              <a:buSzTx/>
-              <a:buFontTx/>
-              <a:buNone/>
-              <a:tabLst/>
-              <a:defRPr/>
-            </a:pPr>
-            <a:r>
-              <a:rPr kumimoji="0" lang="en-US" sz="7200" b="0" i="0" u="none" strike="noStrike" kern="1200" cap="none" spc="0" normalizeH="0" baseline="0" noProof="0" dirty="0">
-                <a:ln>
-                  <a:noFill/>
-                </a:ln>
-                <a:solidFill>
-                  <a:schemeClr val="tx1"/>
-                </a:solidFill>
-                <a:effectLst/>
-                <a:uLnTx/>
-                <a:uFillTx/>
-                <a:latin typeface="+mn-lt"/>
-                <a:ea typeface="+mn-ea"/>
-                <a:cs typeface="+mn-cs"/>
-              </a:rPr>
-              <a:t>Lessons in communication</a:t>
-            </a:r>
+            <a:r>
+              <a:rPr lang="en-US" dirty="0"/>
+              <a:t>Leadership and management</a:t>
+            </a:r>
+            <a:br>
+              <a:rPr lang="en-US" dirty="0"/>
+            </a:br>
+            <a:r>
+              <a:rPr lang="en-US" dirty="0"/>
+              <a:t>About fine print</a:t>
+            </a:r>
+          </a:p>
+        </p:txBody>
+      </p:sp>
+      <p:sp>
+        <p:nvSpPr>
+          <p:cNvPr id="3" name="Content Placeholder 2">
+            <a:extLst>
+              <a:ext uri="{FF2B5EF4-FFF2-40B4-BE49-F238E27FC236}">
+                <a16:creationId xmlns:a16="http://schemas.microsoft.com/office/drawing/2014/main" id="{79129D58-9DB9-FEC3-0C9D-348AAA5A68E6}"/>
+              </a:ext>
+            </a:extLst>
+          </p:cNvPr>
+          <p:cNvSpPr>
+            <a:spLocks noGrp="1"/>
+          </p:cNvSpPr>
+          <p:nvPr>
+            <p:ph idx="1"/>
+          </p:nvPr>
+        </p:nvSpPr>
+        <p:spPr/>
+        <p:txBody>
+          <a:bodyPr/>
+          <a:lstStyle/>
+          <a:p>
+            <a:endParaRPr lang="en-US"/>
           </a:p>
         </p:txBody>
       </p:sp>
     </p:spTree>
     <p:extLst>
       <p:ext uri="{BB962C8B-B14F-4D97-AF65-F5344CB8AC3E}">
-        <p14:creationId xmlns:p14="http://schemas.microsoft.com/office/powerpoint/2010/main" val="260604515"/>
+        <p14:creationId xmlns:p14="http://schemas.microsoft.com/office/powerpoint/2010/main" val="3106584548"/>
       </p:ext>
     </p:extLst>
   </p:cSld>
@@ -7671,7 +7655,7 @@
                 <a:ea typeface="+mn-ea"/>
                 <a:cs typeface="+mn-cs"/>
               </a:rPr>
-              <a:t>Tactical and strategic staffing</a:t>
+              <a:t>Lessons in communication</a:t>
             </a:r>
           </a:p>
         </p:txBody>
@@ -7679,7 +7663,7 @@
     </p:spTree>
     <p:extLst>
       <p:ext uri="{BB962C8B-B14F-4D97-AF65-F5344CB8AC3E}">
-        <p14:creationId xmlns:p14="http://schemas.microsoft.com/office/powerpoint/2010/main" val="2515611607"/>
+        <p14:creationId xmlns:p14="http://schemas.microsoft.com/office/powerpoint/2010/main" val="260604515"/>
       </p:ext>
     </p:extLst>
   </p:cSld>
@@ -7778,7 +7762,7 @@
                 <a:ea typeface="+mn-ea"/>
                 <a:cs typeface="+mn-cs"/>
               </a:rPr>
-              <a:t>Dealing with ”large" amounts</a:t>
+              <a:t>Tactical and strategic staffing</a:t>
             </a:r>
           </a:p>
         </p:txBody>
@@ -7786,7 +7770,7 @@
     </p:spTree>
     <p:extLst>
       <p:ext uri="{BB962C8B-B14F-4D97-AF65-F5344CB8AC3E}">
-        <p14:creationId xmlns:p14="http://schemas.microsoft.com/office/powerpoint/2010/main" val="3958885873"/>
+        <p14:creationId xmlns:p14="http://schemas.microsoft.com/office/powerpoint/2010/main" val="2515611607"/>
       </p:ext>
     </p:extLst>
   </p:cSld>
@@ -7885,6 +7869,113 @@
                 <a:ea typeface="+mn-ea"/>
                 <a:cs typeface="+mn-cs"/>
               </a:rPr>
+              <a:t>Dealing with ”large" amounts</a:t>
+            </a:r>
+          </a:p>
+        </p:txBody>
+      </p:sp>
+    </p:spTree>
+    <p:extLst>
+      <p:ext uri="{BB962C8B-B14F-4D97-AF65-F5344CB8AC3E}">
+        <p14:creationId xmlns:p14="http://schemas.microsoft.com/office/powerpoint/2010/main" val="3958885873"/>
+      </p:ext>
+    </p:extLst>
+  </p:cSld>
+  <p:clrMapOvr>
+    <a:masterClrMapping/>
+  </p:clrMapOvr>
+</p:sld>
+</file>
+
+<file path=ppt/slides/slide17.xml><?xml version="1.0" encoding="utf-8"?>
+<p:sld xmlns:a="http://schemas.openxmlformats.org/drawingml/2006/main" xmlns:r="http://schemas.openxmlformats.org/officeDocument/2006/relationships" xmlns:p="http://schemas.openxmlformats.org/presentationml/2006/main">
+  <p:cSld>
+    <p:spTree>
+      <p:nvGrpSpPr>
+        <p:cNvPr id="1" name=""/>
+        <p:cNvGrpSpPr/>
+        <p:nvPr/>
+      </p:nvGrpSpPr>
+      <p:grpSpPr>
+        <a:xfrm>
+          <a:off x="0" y="0"/>
+          <a:ext cx="0" cy="0"/>
+          <a:chOff x="0" y="0"/>
+          <a:chExt cx="0" cy="0"/>
+        </a:xfrm>
+      </p:grpSpPr>
+      <p:sp>
+        <p:nvSpPr>
+          <p:cNvPr id="2" name="Title 1">
+            <a:extLst>
+              <a:ext uri="{FF2B5EF4-FFF2-40B4-BE49-F238E27FC236}">
+                <a16:creationId xmlns:a16="http://schemas.microsoft.com/office/drawing/2014/main" id="{7306C212-B3B4-8E92-B9B3-B626EF37EBA4}"/>
+              </a:ext>
+            </a:extLst>
+          </p:cNvPr>
+          <p:cNvSpPr txBox="1">
+            <a:spLocks noGrp="1"/>
+          </p:cNvSpPr>
+          <p:nvPr>
+            <p:ph type="title" idx="4294967295"/>
+          </p:nvPr>
+        </p:nvSpPr>
+        <p:spPr>
+          <a:xfrm>
+            <a:off x="1061794" y="2274838"/>
+            <a:ext cx="10068412" cy="2308324"/>
+          </a:xfrm>
+          <a:prstGeom prst="rect">
+            <a:avLst/>
+          </a:prstGeom>
+          <a:noFill/>
+          <a:ln>
+            <a:noFill/>
+            <a:prstDash/>
+          </a:ln>
+          <a:effectLst/>
+        </p:spPr>
+        <p:txBody>
+          <a:bodyPr rot="0" spcFirstLastPara="0" vertOverflow="overflow" horzOverflow="overflow" vert="horz" wrap="square" lIns="91440" tIns="45720" rIns="91440" bIns="45720" numCol="1" spcCol="0" rtlCol="0" fromWordArt="0" anchor="t" anchorCtr="0" forceAA="0" compatLnSpc="1">
+            <a:prstTxWarp prst="textNoShape">
+              <a:avLst/>
+            </a:prstTxWarp>
+            <a:spAutoFit/>
+          </a:bodyPr>
+          <a:lstStyle/>
+          <a:p>
+            <a:pPr marL="0" marR="0" lvl="0" indent="0" algn="ctr" defTabSz="457200" rtl="0" eaLnBrk="1" fontAlgn="auto" latinLnBrk="0" hangingPunct="1">
+              <a:lnSpc>
+                <a:spcPct val="100000"/>
+              </a:lnSpc>
+              <a:spcBef>
+                <a:spcPts val="0"/>
+              </a:spcBef>
+              <a:spcAft>
+                <a:spcPts val="0"/>
+              </a:spcAft>
+              <a:buClrTx/>
+              <a:buSzTx/>
+              <a:buFontTx/>
+              <a:buNone/>
+              <a:tabLst/>
+              <a:defRPr/>
+            </a:pPr>
+            <a:r>
+              <a:rPr kumimoji="0" lang="en-US" sz="7200" b="0" i="0" u="none" strike="noStrike" kern="1200" cap="none" spc="0" normalizeH="0" baseline="0" noProof="0" dirty="0">
+                <a:ln>
+                  <a:noFill/>
+                </a:ln>
+                <a:solidFill>
+                  <a:schemeClr val="tx1"/>
+                </a:solidFill>
+                <a:effectLst/>
+                <a:uLnTx/>
+                <a:uFillTx/>
+                <a:latin typeface="+mn-lt"/>
+                <a:ea typeface="+mn-ea"/>
+                <a:cs typeface="+mn-cs"/>
+              </a:rPr>
               <a:t>Reaching the next level</a:t>
             </a:r>
           </a:p>
@@ -7903,7 +7994,7 @@
 </p:sld>
 </file>
 
-<file path=ppt/slides/slide17.xml><?xml version="1.0" encoding="utf-8"?>
+<file path=ppt/slides/slide18.xml><?xml version="1.0" encoding="utf-8"?>
 <p:sld xmlns:a="http://schemas.openxmlformats.org/drawingml/2006/main" xmlns:r="http://schemas.openxmlformats.org/officeDocument/2006/relationships" xmlns:p="http://schemas.openxmlformats.org/presentationml/2006/main">
   <p:cSld>
     <p:spTree>
@@ -8228,7 +8319,7 @@
 </p:sld>
 </file>
 
-<file path=ppt/slides/slide18.xml><?xml version="1.0" encoding="utf-8"?>
+<file path=ppt/slides/slide19.xml><?xml version="1.0" encoding="utf-8"?>
 <p:sld xmlns:a="http://schemas.openxmlformats.org/drawingml/2006/main" xmlns:r="http://schemas.openxmlformats.org/officeDocument/2006/relationships" xmlns:p="http://schemas.openxmlformats.org/presentationml/2006/main">
   <p:cSld>
     <p:spTree>
@@ -8621,7 +8712,7 @@
           <a:p>
             <a:r>
               <a:rPr lang="en-US" dirty="0"/>
-              <a:t>How to prepare</a:t>
+              <a:t>Getting ready</a:t>
             </a:r>
           </a:p>
           <a:p>
@@ -9085,7 +9176,7 @@
                 <a:ea typeface="+mn-ea"/>
                 <a:cs typeface="+mn-cs"/>
               </a:rPr>
-              <a:t>How to prepare</a:t>
+              <a:t>Getting ready</a:t>
             </a:r>
           </a:p>
         </p:txBody>
@@ -9143,7 +9234,7 @@
           <a:p>
             <a:r>
               <a:rPr lang="en-US" dirty="0"/>
-              <a:t>How to prepare</a:t>
+              <a:t>Getting ready</a:t>
             </a:r>
             <a:br>
               <a:rPr lang="en-US" dirty="0"/>
@@ -9233,7 +9324,7 @@
           <a:p>
             <a:r>
               <a:rPr lang="en-US" dirty="0"/>
-              <a:t>How to prepare</a:t>
+              <a:t>Getting ready</a:t>
             </a:r>
             <a:br>
               <a:rPr lang="en-US" dirty="0"/>
@@ -9323,7 +9414,7 @@
           <a:p>
             <a:r>
               <a:rPr lang="en-US" dirty="0"/>
-              <a:t>How to prepare</a:t>
+              <a:t>Getting ready</a:t>
             </a:r>
             <a:br>
               <a:rPr lang="en-US" dirty="0"/>
@@ -9527,7 +9618,7 @@
             </a:br>
             <a:r>
               <a:rPr lang="en-US" dirty="0"/>
-              <a:t>Definitions</a:t>
+              <a:t>An Outlook on helping Teams Excel</a:t>
             </a:r>
           </a:p>
         </p:txBody>
@@ -9560,7 +9651,7 @@
     </p:spTree>
     <p:extLst>
       <p:ext uri="{BB962C8B-B14F-4D97-AF65-F5344CB8AC3E}">
-        <p14:creationId xmlns:p14="http://schemas.microsoft.com/office/powerpoint/2010/main" val="2210604802"/>
+        <p14:creationId xmlns:p14="http://schemas.microsoft.com/office/powerpoint/2010/main" val="2676459649"/>
       </p:ext>
     </p:extLst>
   </p:cSld>
@@ -9617,7 +9708,7 @@
             </a:br>
             <a:r>
               <a:rPr lang="en-US" dirty="0"/>
-              <a:t>An Outlook on helping Teams Excel</a:t>
+              <a:t>Definitions</a:t>
             </a:r>
           </a:p>
         </p:txBody>
@@ -9650,7 +9741,7 @@
     </p:spTree>
     <p:extLst>
       <p:ext uri="{BB962C8B-B14F-4D97-AF65-F5344CB8AC3E}">
-        <p14:creationId xmlns:p14="http://schemas.microsoft.com/office/powerpoint/2010/main" val="2676459649"/>
+        <p14:creationId xmlns:p14="http://schemas.microsoft.com/office/powerpoint/2010/main" val="2210604802"/>
       </p:ext>
     </p:extLst>
   </p:cSld>

</xml_diff>

<commit_message>
First draft of "Getting ready" section
</commit_message>
<xml_diff>
--- a/Sitting in meetings all day long.pptx
+++ b/Sitting in meetings all day long.pptx
@@ -5,7 +5,7 @@
     <p:sldMasterId id="2147483660" r:id="rId1"/>
   </p:sldMasterIdLst>
   <p:notesMasterIdLst>
-    <p:notesMasterId r:id="rId21"/>
+    <p:notesMasterId r:id="rId22"/>
   </p:notesMasterIdLst>
   <p:sldIdLst>
     <p:sldId id="256" r:id="rId2"/>
@@ -19,14 +19,15 @@
     <p:sldId id="292" r:id="rId10"/>
     <p:sldId id="294" r:id="rId11"/>
     <p:sldId id="293" r:id="rId12"/>
-    <p:sldId id="295" r:id="rId13"/>
-    <p:sldId id="300" r:id="rId14"/>
-    <p:sldId id="287" r:id="rId15"/>
-    <p:sldId id="290" r:id="rId16"/>
-    <p:sldId id="291" r:id="rId17"/>
-    <p:sldId id="288" r:id="rId18"/>
-    <p:sldId id="284" r:id="rId19"/>
-    <p:sldId id="285" r:id="rId20"/>
+    <p:sldId id="301" r:id="rId13"/>
+    <p:sldId id="295" r:id="rId14"/>
+    <p:sldId id="300" r:id="rId15"/>
+    <p:sldId id="287" r:id="rId16"/>
+    <p:sldId id="290" r:id="rId17"/>
+    <p:sldId id="291" r:id="rId18"/>
+    <p:sldId id="288" r:id="rId19"/>
+    <p:sldId id="284" r:id="rId20"/>
+    <p:sldId id="285" r:id="rId21"/>
   </p:sldIdLst>
   <p:sldSz cx="12192000" cy="6858000"/>
   <p:notesSz cx="6858000" cy="9144000"/>
@@ -215,7 +216,7 @@
           <a:p>
             <a:fld id="{2B6DBF41-98D5-4B29-8B81-B31614D19ACC}" type="datetimeFigureOut">
               <a:rPr lang="en-US" smtClean="0"/>
-              <a:t>3/8/24</a:t>
+              <a:t>3/24/24</a:t>
             </a:fld>
             <a:endParaRPr lang="en-US"/>
           </a:p>
@@ -577,6 +578,129 @@
 </p:notes>
 </file>
 
+<file path=ppt/notesSlides/notesSlide2.xml><?xml version="1.0" encoding="utf-8"?>
+<p:notes xmlns:a="http://schemas.openxmlformats.org/drawingml/2006/main" xmlns:r="http://schemas.openxmlformats.org/officeDocument/2006/relationships" xmlns:p="http://schemas.openxmlformats.org/presentationml/2006/main">
+  <p:cSld>
+    <p:spTree>
+      <p:nvGrpSpPr>
+        <p:cNvPr id="1" name=""/>
+        <p:cNvGrpSpPr/>
+        <p:nvPr/>
+      </p:nvGrpSpPr>
+      <p:grpSpPr>
+        <a:xfrm>
+          <a:off x="0" y="0"/>
+          <a:ext cx="0" cy="0"/>
+          <a:chOff x="0" y="0"/>
+          <a:chExt cx="0" cy="0"/>
+        </a:xfrm>
+      </p:grpSpPr>
+      <p:sp>
+        <p:nvSpPr>
+          <p:cNvPr id="2" name="Slide Image Placeholder 1"/>
+          <p:cNvSpPr>
+            <a:spLocks noGrp="1" noRot="1" noChangeAspect="1"/>
+          </p:cNvSpPr>
+          <p:nvPr>
+            <p:ph type="sldImg"/>
+          </p:nvPr>
+        </p:nvSpPr>
+        <p:spPr/>
+      </p:sp>
+      <p:sp>
+        <p:nvSpPr>
+          <p:cNvPr id="3" name="Notes Placeholder 2"/>
+          <p:cNvSpPr>
+            <a:spLocks noGrp="1"/>
+          </p:cNvSpPr>
+          <p:nvPr>
+            <p:ph type="body" idx="1"/>
+          </p:nvPr>
+        </p:nvSpPr>
+        <p:spPr/>
+        <p:txBody>
+          <a:bodyPr/>
+          <a:lstStyle/>
+          <a:p>
+            <a:r>
+              <a:rPr lang="en-US" dirty="0"/>
+              <a:t>HBR's 10 Must Reads for New Managers (https://</a:t>
+            </a:r>
+            <a:r>
+              <a:rPr lang="en-US" dirty="0" err="1"/>
+              <a:t>store.hbr.org</a:t>
+            </a:r>
+            <a:r>
+              <a:rPr lang="en-US" dirty="0"/>
+              <a:t>/product/hbr-s-10-must-reads-for-new-managers-with-bonus-article-how-managers-become-leaders-by-michael-d-watkins/10134)</a:t>
+            </a:r>
+          </a:p>
+          <a:p>
+            <a:r>
+              <a:rPr lang="en-US" dirty="0"/>
+              <a:t>The Manager's Path (https://</a:t>
+            </a:r>
+            <a:r>
+              <a:rPr lang="en-US" dirty="0" err="1"/>
+              <a:t>www.oreilly.com</a:t>
+            </a:r>
+            <a:r>
+              <a:rPr lang="en-US" dirty="0"/>
+              <a:t>/library/view/the-managers-path/9781491973882/)</a:t>
+            </a:r>
+          </a:p>
+          <a:p>
+            <a:r>
+              <a:rPr lang="en-US" dirty="0"/>
+              <a:t>The Culture Map (https://</a:t>
+            </a:r>
+            <a:r>
+              <a:rPr lang="en-US" dirty="0" err="1"/>
+              <a:t>erinmeyer.com</a:t>
+            </a:r>
+            <a:r>
+              <a:rPr lang="en-US" dirty="0"/>
+              <a:t>/books/the-culture-map/)</a:t>
+            </a:r>
+          </a:p>
+        </p:txBody>
+      </p:sp>
+      <p:sp>
+        <p:nvSpPr>
+          <p:cNvPr id="4" name="Slide Number Placeholder 3"/>
+          <p:cNvSpPr>
+            <a:spLocks noGrp="1"/>
+          </p:cNvSpPr>
+          <p:nvPr>
+            <p:ph type="sldNum" sz="quarter" idx="5"/>
+          </p:nvPr>
+        </p:nvSpPr>
+        <p:spPr/>
+        <p:txBody>
+          <a:bodyPr/>
+          <a:lstStyle/>
+          <a:p>
+            <a:fld id="{2B4F40D4-862D-491C-85E3-1A34EFA2BD00}" type="slidenum">
+              <a:rPr lang="en-US" smtClean="0"/>
+              <a:t>6</a:t>
+            </a:fld>
+            <a:endParaRPr lang="en-US"/>
+          </a:p>
+        </p:txBody>
+      </p:sp>
+    </p:spTree>
+    <p:extLst>
+      <p:ext uri="{BB962C8B-B14F-4D97-AF65-F5344CB8AC3E}">
+        <p14:creationId xmlns:p14="http://schemas.microsoft.com/office/powerpoint/2010/main" val="2957055282"/>
+      </p:ext>
+    </p:extLst>
+  </p:cSld>
+  <p:clrMapOvr>
+    <a:masterClrMapping/>
+  </p:clrMapOvr>
+</p:notes>
+</file>
+
 <file path=ppt/slideLayouts/slideLayout1.xml><?xml version="1.0" encoding="utf-8"?>
 <p:sldLayout xmlns:a="http://schemas.openxmlformats.org/drawingml/2006/main" xmlns:r="http://schemas.openxmlformats.org/officeDocument/2006/relationships" xmlns:p="http://schemas.openxmlformats.org/presentationml/2006/main" type="title" preserve="1">
   <p:cSld name="Title Slide">
@@ -763,7 +887,7 @@
           <a:p>
             <a:fld id="{F9BC75CE-03FF-4667-898C-4C70B4392062}" type="datetimeFigureOut">
               <a:rPr lang="en-US" smtClean="0"/>
-              <a:t>3/8/24</a:t>
+              <a:t>3/24/24</a:t>
             </a:fld>
             <a:endParaRPr lang="en-US"/>
           </a:p>
@@ -1038,7 +1162,7 @@
           <a:p>
             <a:fld id="{F9BC75CE-03FF-4667-898C-4C70B4392062}" type="datetimeFigureOut">
               <a:rPr lang="en-US" smtClean="0"/>
-              <a:t>3/8/24</a:t>
+              <a:t>3/24/24</a:t>
             </a:fld>
             <a:endParaRPr lang="en-US"/>
           </a:p>
@@ -1232,7 +1356,7 @@
           <a:p>
             <a:fld id="{F9BC75CE-03FF-4667-898C-4C70B4392062}" type="datetimeFigureOut">
               <a:rPr lang="en-US" smtClean="0"/>
-              <a:t>3/8/24</a:t>
+              <a:t>3/24/24</a:t>
             </a:fld>
             <a:endParaRPr lang="en-US"/>
           </a:p>
@@ -1505,7 +1629,7 @@
           <a:p>
             <a:fld id="{F9BC75CE-03FF-4667-898C-4C70B4392062}" type="datetimeFigureOut">
               <a:rPr lang="en-US" smtClean="0"/>
-              <a:t>3/8/24</a:t>
+              <a:t>3/24/24</a:t>
             </a:fld>
             <a:endParaRPr lang="en-US"/>
           </a:p>
@@ -1846,7 +1970,7 @@
           <a:p>
             <a:fld id="{F9BC75CE-03FF-4667-898C-4C70B4392062}" type="datetimeFigureOut">
               <a:rPr lang="en-US" smtClean="0"/>
-              <a:t>3/8/24</a:t>
+              <a:t>3/24/24</a:t>
             </a:fld>
             <a:endParaRPr lang="en-US"/>
           </a:p>
@@ -2469,7 +2593,7 @@
           <a:p>
             <a:fld id="{F9BC75CE-03FF-4667-898C-4C70B4392062}" type="datetimeFigureOut">
               <a:rPr lang="en-US" smtClean="0"/>
-              <a:t>3/8/24</a:t>
+              <a:t>3/24/24</a:t>
             </a:fld>
             <a:endParaRPr lang="en-US"/>
           </a:p>
@@ -3329,7 +3453,7 @@
           <a:p>
             <a:fld id="{F9BC75CE-03FF-4667-898C-4C70B4392062}" type="datetimeFigureOut">
               <a:rPr lang="en-US" smtClean="0"/>
-              <a:t>3/8/24</a:t>
+              <a:t>3/24/24</a:t>
             </a:fld>
             <a:endParaRPr lang="en-US"/>
           </a:p>
@@ -3499,7 +3623,7 @@
           <a:p>
             <a:fld id="{F9BC75CE-03FF-4667-898C-4C70B4392062}" type="datetimeFigureOut">
               <a:rPr lang="en-US" smtClean="0"/>
-              <a:t>3/8/24</a:t>
+              <a:t>3/24/24</a:t>
             </a:fld>
             <a:endParaRPr lang="en-US"/>
           </a:p>
@@ -3679,7 +3803,7 @@
           <a:p>
             <a:fld id="{F9BC75CE-03FF-4667-898C-4C70B4392062}" type="datetimeFigureOut">
               <a:rPr lang="en-US" smtClean="0"/>
-              <a:t>3/8/24</a:t>
+              <a:t>3/24/24</a:t>
             </a:fld>
             <a:endParaRPr lang="en-US"/>
           </a:p>
@@ -3849,7 +3973,7 @@
           <a:p>
             <a:fld id="{F9BC75CE-03FF-4667-898C-4C70B4392062}" type="datetimeFigureOut">
               <a:rPr lang="en-US" smtClean="0"/>
-              <a:t>3/8/24</a:t>
+              <a:t>3/24/24</a:t>
             </a:fld>
             <a:endParaRPr lang="en-US"/>
           </a:p>
@@ -4096,7 +4220,7 @@
           <a:p>
             <a:fld id="{F9BC75CE-03FF-4667-898C-4C70B4392062}" type="datetimeFigureOut">
               <a:rPr lang="en-US" smtClean="0"/>
-              <a:t>3/8/24</a:t>
+              <a:t>3/24/24</a:t>
             </a:fld>
             <a:endParaRPr lang="en-US"/>
           </a:p>
@@ -4388,7 +4512,7 @@
           <a:p>
             <a:fld id="{F9BC75CE-03FF-4667-898C-4C70B4392062}" type="datetimeFigureOut">
               <a:rPr lang="en-US" smtClean="0"/>
-              <a:t>3/8/24</a:t>
+              <a:t>3/24/24</a:t>
             </a:fld>
             <a:endParaRPr lang="en-US"/>
           </a:p>
@@ -4832,7 +4956,7 @@
           <a:p>
             <a:fld id="{F9BC75CE-03FF-4667-898C-4C70B4392062}" type="datetimeFigureOut">
               <a:rPr lang="en-US" smtClean="0"/>
-              <a:t>3/8/24</a:t>
+              <a:t>3/24/24</a:t>
             </a:fld>
             <a:endParaRPr lang="en-US"/>
           </a:p>
@@ -4950,7 +5074,7 @@
           <a:p>
             <a:fld id="{F9BC75CE-03FF-4667-898C-4C70B4392062}" type="datetimeFigureOut">
               <a:rPr lang="en-US" smtClean="0"/>
-              <a:t>3/8/24</a:t>
+              <a:t>3/24/24</a:t>
             </a:fld>
             <a:endParaRPr lang="en-US"/>
           </a:p>
@@ -5045,7 +5169,7 @@
           <a:p>
             <a:fld id="{F9BC75CE-03FF-4667-898C-4C70B4392062}" type="datetimeFigureOut">
               <a:rPr lang="en-US" smtClean="0"/>
-              <a:t>3/8/24</a:t>
+              <a:t>3/24/24</a:t>
             </a:fld>
             <a:endParaRPr lang="en-US"/>
           </a:p>
@@ -5324,7 +5448,7 @@
           <a:p>
             <a:fld id="{F9BC75CE-03FF-4667-898C-4C70B4392062}" type="datetimeFigureOut">
               <a:rPr lang="en-US" smtClean="0"/>
-              <a:t>3/8/24</a:t>
+              <a:t>3/24/24</a:t>
             </a:fld>
             <a:endParaRPr lang="en-US"/>
           </a:p>
@@ -5599,7 +5723,7 @@
           <a:p>
             <a:fld id="{F9BC75CE-03FF-4667-898C-4C70B4392062}" type="datetimeFigureOut">
               <a:rPr lang="en-US" smtClean="0"/>
-              <a:t>3/8/24</a:t>
+              <a:t>3/24/24</a:t>
             </a:fld>
             <a:endParaRPr lang="en-US"/>
           </a:p>
@@ -6028,7 +6152,7 @@
           <a:p>
             <a:fld id="{F9BC75CE-03FF-4667-898C-4C70B4392062}" type="datetimeFigureOut">
               <a:rPr lang="en-US" smtClean="0"/>
-              <a:t>3/8/24</a:t>
+              <a:t>3/24/24</a:t>
             </a:fld>
             <a:endParaRPr lang="en-US"/>
           </a:p>
@@ -7433,7 +7557,7 @@
             </a:br>
             <a:r>
               <a:rPr lang="en-US" dirty="0"/>
-              <a:t>Performance management</a:t>
+              <a:t>Leaving your comfort zone</a:t>
             </a:r>
           </a:p>
         </p:txBody>
@@ -7466,7 +7590,7 @@
     </p:spTree>
     <p:extLst>
       <p:ext uri="{BB962C8B-B14F-4D97-AF65-F5344CB8AC3E}">
-        <p14:creationId xmlns:p14="http://schemas.microsoft.com/office/powerpoint/2010/main" val="1181696427"/>
+        <p14:creationId xmlns:p14="http://schemas.microsoft.com/office/powerpoint/2010/main" val="3764024582"/>
       </p:ext>
     </p:extLst>
   </p:cSld>
@@ -7523,7 +7647,7 @@
             </a:br>
             <a:r>
               <a:rPr lang="en-US" dirty="0"/>
-              <a:t>About fine print</a:t>
+              <a:t>Performance management</a:t>
             </a:r>
           </a:p>
         </p:txBody>
@@ -7556,7 +7680,7 @@
     </p:spTree>
     <p:extLst>
       <p:ext uri="{BB962C8B-B14F-4D97-AF65-F5344CB8AC3E}">
-        <p14:creationId xmlns:p14="http://schemas.microsoft.com/office/powerpoint/2010/main" val="3106584548"/>
+        <p14:creationId xmlns:p14="http://schemas.microsoft.com/office/powerpoint/2010/main" val="1181696427"/>
       </p:ext>
     </p:extLst>
   </p:cSld>
@@ -7588,82 +7712,65 @@
           <p:cNvPr id="2" name="Title 1">
             <a:extLst>
               <a:ext uri="{FF2B5EF4-FFF2-40B4-BE49-F238E27FC236}">
-                <a16:creationId xmlns:a16="http://schemas.microsoft.com/office/drawing/2014/main" id="{7306C212-B3B4-8E92-B9B3-B626EF37EBA4}"/>
+                <a16:creationId xmlns:a16="http://schemas.microsoft.com/office/drawing/2014/main" id="{85AD860C-A17C-AE6C-22A8-9F41B0D57738}"/>
               </a:ext>
             </a:extLst>
           </p:cNvPr>
-          <p:cNvSpPr txBox="1">
-            <a:spLocks noGrp="1"/>
-          </p:cNvSpPr>
-          <p:nvPr>
-            <p:ph type="title" idx="4294967295"/>
-          </p:nvPr>
-        </p:nvSpPr>
-        <p:spPr>
-          <a:xfrm>
-            <a:off x="1061794" y="2274838"/>
-            <a:ext cx="10068412" cy="2308324"/>
-          </a:xfrm>
-          <a:prstGeom prst="rect">
-            <a:avLst/>
-          </a:prstGeom>
-          <a:noFill/>
-          <a:ln>
-            <a:noFill/>
-            <a:prstDash/>
-          </a:ln>
-          <a:effectLst/>
-        </p:spPr>
-        <p:txBody>
-          <a:bodyPr rot="0" spcFirstLastPara="0" vertOverflow="overflow" horzOverflow="overflow" vert="horz" wrap="square" lIns="91440" tIns="45720" rIns="91440" bIns="45720" numCol="1" spcCol="0" rtlCol="0" fromWordArt="0" anchor="t" anchorCtr="0" forceAA="0" compatLnSpc="1">
-            <a:prstTxWarp prst="textNoShape">
-              <a:avLst/>
-            </a:prstTxWarp>
-            <a:spAutoFit/>
-          </a:bodyPr>
+          <p:cNvSpPr>
+            <a:spLocks noGrp="1"/>
+          </p:cNvSpPr>
+          <p:nvPr>
+            <p:ph type="title"/>
+          </p:nvPr>
+        </p:nvSpPr>
+        <p:spPr/>
+        <p:txBody>
+          <a:bodyPr/>
           <a:lstStyle/>
           <a:p>
-            <a:pPr marL="0" marR="0" lvl="0" indent="0" algn="ctr" defTabSz="457200" rtl="0" eaLnBrk="1" fontAlgn="auto" latinLnBrk="0" hangingPunct="1">
-              <a:lnSpc>
-                <a:spcPct val="100000"/>
-              </a:lnSpc>
-              <a:spcBef>
-                <a:spcPts val="0"/>
-              </a:spcBef>
-              <a:spcAft>
-                <a:spcPts val="0"/>
-              </a:spcAft>
-              <a:buClrTx/>
-              <a:buSzTx/>
-              <a:buFontTx/>
-              <a:buNone/>
-              <a:tabLst/>
-              <a:defRPr/>
-            </a:pPr>
-            <a:r>
-              <a:rPr kumimoji="0" lang="en-US" sz="7200" b="0" i="0" u="none" strike="noStrike" kern="1200" cap="none" spc="0" normalizeH="0" baseline="0" noProof="0" dirty="0">
-                <a:ln>
-                  <a:noFill/>
-                </a:ln>
-                <a:solidFill>
-                  <a:schemeClr val="tx1"/>
-                </a:solidFill>
-                <a:effectLst/>
-                <a:uLnTx/>
-                <a:uFillTx/>
-                <a:latin typeface="+mn-lt"/>
-                <a:ea typeface="+mn-ea"/>
-                <a:cs typeface="+mn-cs"/>
-              </a:rPr>
-              <a:t>Lessons in communication</a:t>
-            </a:r>
+            <a:r>
+              <a:rPr lang="en-US" dirty="0"/>
+              <a:t>Leadership and management</a:t>
+            </a:r>
+            <a:br>
+              <a:rPr lang="en-US" dirty="0"/>
+            </a:br>
+            <a:r>
+              <a:rPr lang="en-US" dirty="0"/>
+              <a:t>About fine print</a:t>
+            </a:r>
+          </a:p>
+        </p:txBody>
+      </p:sp>
+      <p:sp>
+        <p:nvSpPr>
+          <p:cNvPr id="3" name="Content Placeholder 2">
+            <a:extLst>
+              <a:ext uri="{FF2B5EF4-FFF2-40B4-BE49-F238E27FC236}">
+                <a16:creationId xmlns:a16="http://schemas.microsoft.com/office/drawing/2014/main" id="{79129D58-9DB9-FEC3-0C9D-348AAA5A68E6}"/>
+              </a:ext>
+            </a:extLst>
+          </p:cNvPr>
+          <p:cNvSpPr>
+            <a:spLocks noGrp="1"/>
+          </p:cNvSpPr>
+          <p:nvPr>
+            <p:ph idx="1"/>
+          </p:nvPr>
+        </p:nvSpPr>
+        <p:spPr/>
+        <p:txBody>
+          <a:bodyPr/>
+          <a:lstStyle/>
+          <a:p>
+            <a:endParaRPr lang="en-US"/>
           </a:p>
         </p:txBody>
       </p:sp>
     </p:spTree>
     <p:extLst>
       <p:ext uri="{BB962C8B-B14F-4D97-AF65-F5344CB8AC3E}">
-        <p14:creationId xmlns:p14="http://schemas.microsoft.com/office/powerpoint/2010/main" val="260604515"/>
+        <p14:creationId xmlns:p14="http://schemas.microsoft.com/office/powerpoint/2010/main" val="3106584548"/>
       </p:ext>
     </p:extLst>
   </p:cSld>
@@ -7762,7 +7869,7 @@
                 <a:ea typeface="+mn-ea"/>
                 <a:cs typeface="+mn-cs"/>
               </a:rPr>
-              <a:t>Tactical and strategic staffing</a:t>
+              <a:t>Lessons in communication</a:t>
             </a:r>
           </a:p>
         </p:txBody>
@@ -7770,7 +7877,7 @@
     </p:spTree>
     <p:extLst>
       <p:ext uri="{BB962C8B-B14F-4D97-AF65-F5344CB8AC3E}">
-        <p14:creationId xmlns:p14="http://schemas.microsoft.com/office/powerpoint/2010/main" val="2515611607"/>
+        <p14:creationId xmlns:p14="http://schemas.microsoft.com/office/powerpoint/2010/main" val="260604515"/>
       </p:ext>
     </p:extLst>
   </p:cSld>
@@ -7869,7 +7976,7 @@
                 <a:ea typeface="+mn-ea"/>
                 <a:cs typeface="+mn-cs"/>
               </a:rPr>
-              <a:t>Dealing with ”large" amounts</a:t>
+              <a:t>Tactical and strategic staffing</a:t>
             </a:r>
           </a:p>
         </p:txBody>
@@ -7877,7 +7984,7 @@
     </p:spTree>
     <p:extLst>
       <p:ext uri="{BB962C8B-B14F-4D97-AF65-F5344CB8AC3E}">
-        <p14:creationId xmlns:p14="http://schemas.microsoft.com/office/powerpoint/2010/main" val="3958885873"/>
+        <p14:creationId xmlns:p14="http://schemas.microsoft.com/office/powerpoint/2010/main" val="2515611607"/>
       </p:ext>
     </p:extLst>
   </p:cSld>
@@ -7976,6 +8083,113 @@
                 <a:ea typeface="+mn-ea"/>
                 <a:cs typeface="+mn-cs"/>
               </a:rPr>
+              <a:t>Dealing with ”large" amounts</a:t>
+            </a:r>
+          </a:p>
+        </p:txBody>
+      </p:sp>
+    </p:spTree>
+    <p:extLst>
+      <p:ext uri="{BB962C8B-B14F-4D97-AF65-F5344CB8AC3E}">
+        <p14:creationId xmlns:p14="http://schemas.microsoft.com/office/powerpoint/2010/main" val="3958885873"/>
+      </p:ext>
+    </p:extLst>
+  </p:cSld>
+  <p:clrMapOvr>
+    <a:masterClrMapping/>
+  </p:clrMapOvr>
+</p:sld>
+</file>
+
+<file path=ppt/slides/slide18.xml><?xml version="1.0" encoding="utf-8"?>
+<p:sld xmlns:a="http://schemas.openxmlformats.org/drawingml/2006/main" xmlns:r="http://schemas.openxmlformats.org/officeDocument/2006/relationships" xmlns:p="http://schemas.openxmlformats.org/presentationml/2006/main">
+  <p:cSld>
+    <p:spTree>
+      <p:nvGrpSpPr>
+        <p:cNvPr id="1" name=""/>
+        <p:cNvGrpSpPr/>
+        <p:nvPr/>
+      </p:nvGrpSpPr>
+      <p:grpSpPr>
+        <a:xfrm>
+          <a:off x="0" y="0"/>
+          <a:ext cx="0" cy="0"/>
+          <a:chOff x="0" y="0"/>
+          <a:chExt cx="0" cy="0"/>
+        </a:xfrm>
+      </p:grpSpPr>
+      <p:sp>
+        <p:nvSpPr>
+          <p:cNvPr id="2" name="Title 1">
+            <a:extLst>
+              <a:ext uri="{FF2B5EF4-FFF2-40B4-BE49-F238E27FC236}">
+                <a16:creationId xmlns:a16="http://schemas.microsoft.com/office/drawing/2014/main" id="{7306C212-B3B4-8E92-B9B3-B626EF37EBA4}"/>
+              </a:ext>
+            </a:extLst>
+          </p:cNvPr>
+          <p:cNvSpPr txBox="1">
+            <a:spLocks noGrp="1"/>
+          </p:cNvSpPr>
+          <p:nvPr>
+            <p:ph type="title" idx="4294967295"/>
+          </p:nvPr>
+        </p:nvSpPr>
+        <p:spPr>
+          <a:xfrm>
+            <a:off x="1061794" y="2274838"/>
+            <a:ext cx="10068412" cy="2308324"/>
+          </a:xfrm>
+          <a:prstGeom prst="rect">
+            <a:avLst/>
+          </a:prstGeom>
+          <a:noFill/>
+          <a:ln>
+            <a:noFill/>
+            <a:prstDash/>
+          </a:ln>
+          <a:effectLst/>
+        </p:spPr>
+        <p:txBody>
+          <a:bodyPr rot="0" spcFirstLastPara="0" vertOverflow="overflow" horzOverflow="overflow" vert="horz" wrap="square" lIns="91440" tIns="45720" rIns="91440" bIns="45720" numCol="1" spcCol="0" rtlCol="0" fromWordArt="0" anchor="t" anchorCtr="0" forceAA="0" compatLnSpc="1">
+            <a:prstTxWarp prst="textNoShape">
+              <a:avLst/>
+            </a:prstTxWarp>
+            <a:spAutoFit/>
+          </a:bodyPr>
+          <a:lstStyle/>
+          <a:p>
+            <a:pPr marL="0" marR="0" lvl="0" indent="0" algn="ctr" defTabSz="457200" rtl="0" eaLnBrk="1" fontAlgn="auto" latinLnBrk="0" hangingPunct="1">
+              <a:lnSpc>
+                <a:spcPct val="100000"/>
+              </a:lnSpc>
+              <a:spcBef>
+                <a:spcPts val="0"/>
+              </a:spcBef>
+              <a:spcAft>
+                <a:spcPts val="0"/>
+              </a:spcAft>
+              <a:buClrTx/>
+              <a:buSzTx/>
+              <a:buFontTx/>
+              <a:buNone/>
+              <a:tabLst/>
+              <a:defRPr/>
+            </a:pPr>
+            <a:r>
+              <a:rPr kumimoji="0" lang="en-US" sz="7200" b="0" i="0" u="none" strike="noStrike" kern="1200" cap="none" spc="0" normalizeH="0" baseline="0" noProof="0" dirty="0">
+                <a:ln>
+                  <a:noFill/>
+                </a:ln>
+                <a:solidFill>
+                  <a:schemeClr val="tx1"/>
+                </a:solidFill>
+                <a:effectLst/>
+                <a:uLnTx/>
+                <a:uFillTx/>
+                <a:latin typeface="+mn-lt"/>
+                <a:ea typeface="+mn-ea"/>
+                <a:cs typeface="+mn-cs"/>
+              </a:rPr>
               <a:t>Reaching the next level</a:t>
             </a:r>
           </a:p>
@@ -7994,7 +8208,7 @@
 </p:sld>
 </file>
 
-<file path=ppt/slides/slide18.xml><?xml version="1.0" encoding="utf-8"?>
+<file path=ppt/slides/slide19.xml><?xml version="1.0" encoding="utf-8"?>
 <p:sld xmlns:a="http://schemas.openxmlformats.org/drawingml/2006/main" xmlns:r="http://schemas.openxmlformats.org/officeDocument/2006/relationships" xmlns:p="http://schemas.openxmlformats.org/presentationml/2006/main">
   <p:cSld>
     <p:spTree>
@@ -8310,331 +8524,6 @@
     <p:extLst>
       <p:ext uri="{BB962C8B-B14F-4D97-AF65-F5344CB8AC3E}">
         <p14:creationId xmlns:p14="http://schemas.microsoft.com/office/powerpoint/2010/main" val="1870771211"/>
-      </p:ext>
-    </p:extLst>
-  </p:cSld>
-  <p:clrMapOvr>
-    <a:masterClrMapping/>
-  </p:clrMapOvr>
-</p:sld>
-</file>
-
-<file path=ppt/slides/slide19.xml><?xml version="1.0" encoding="utf-8"?>
-<p:sld xmlns:a="http://schemas.openxmlformats.org/drawingml/2006/main" xmlns:r="http://schemas.openxmlformats.org/officeDocument/2006/relationships" xmlns:p="http://schemas.openxmlformats.org/presentationml/2006/main">
-  <p:cSld>
-    <p:spTree>
-      <p:nvGrpSpPr>
-        <p:cNvPr id="1" name=""/>
-        <p:cNvGrpSpPr/>
-        <p:nvPr/>
-      </p:nvGrpSpPr>
-      <p:grpSpPr>
-        <a:xfrm>
-          <a:off x="0" y="0"/>
-          <a:ext cx="0" cy="0"/>
-          <a:chOff x="0" y="0"/>
-          <a:chExt cx="0" cy="0"/>
-        </a:xfrm>
-      </p:grpSpPr>
-      <p:sp>
-        <p:nvSpPr>
-          <p:cNvPr id="2" name="Title 1">
-            <a:extLst>
-              <a:ext uri="{FF2B5EF4-FFF2-40B4-BE49-F238E27FC236}">
-                <a16:creationId xmlns:a16="http://schemas.microsoft.com/office/drawing/2014/main" id="{7306C212-B3B4-8E92-B9B3-B626EF37EBA4}"/>
-              </a:ext>
-            </a:extLst>
-          </p:cNvPr>
-          <p:cNvSpPr txBox="1">
-            <a:spLocks noGrp="1"/>
-          </p:cNvSpPr>
-          <p:nvPr>
-            <p:ph type="title" idx="4294967295"/>
-          </p:nvPr>
-        </p:nvSpPr>
-        <p:spPr>
-          <a:xfrm>
-            <a:off x="1061794" y="2828836"/>
-            <a:ext cx="10068412" cy="1200329"/>
-          </a:xfrm>
-          <a:prstGeom prst="rect">
-            <a:avLst/>
-          </a:prstGeom>
-          <a:noFill/>
-          <a:ln>
-            <a:noFill/>
-            <a:prstDash/>
-          </a:ln>
-          <a:effectLst/>
-        </p:spPr>
-        <p:txBody>
-          <a:bodyPr rot="0" spcFirstLastPara="0" vertOverflow="overflow" horzOverflow="overflow" vert="horz" wrap="square" lIns="91440" tIns="45720" rIns="91440" bIns="45720" numCol="1" spcCol="0" rtlCol="0" fromWordArt="0" anchor="t" anchorCtr="0" forceAA="0" compatLnSpc="1">
-            <a:prstTxWarp prst="textNoShape">
-              <a:avLst/>
-            </a:prstTxWarp>
-            <a:spAutoFit/>
-          </a:bodyPr>
-          <a:lstStyle/>
-          <a:p>
-            <a:pPr marL="0" marR="0" lvl="0" indent="0" algn="ctr" defTabSz="457200" rtl="0" eaLnBrk="1" fontAlgn="auto" latinLnBrk="0" hangingPunct="1">
-              <a:lnSpc>
-                <a:spcPct val="100000"/>
-              </a:lnSpc>
-              <a:spcBef>
-                <a:spcPts val="0"/>
-              </a:spcBef>
-              <a:spcAft>
-                <a:spcPts val="0"/>
-              </a:spcAft>
-              <a:buClrTx/>
-              <a:buSzTx/>
-              <a:buFontTx/>
-              <a:buNone/>
-              <a:tabLst/>
-              <a:defRPr/>
-            </a:pPr>
-            <a:r>
-              <a:rPr kumimoji="0" lang="en-US" sz="7200" b="0" i="0" u="none" strike="noStrike" kern="1200" cap="none" spc="0" normalizeH="0" baseline="0" noProof="0" dirty="0">
-                <a:ln>
-                  <a:noFill/>
-                </a:ln>
-                <a:solidFill>
-                  <a:schemeClr val="tx1"/>
-                </a:solidFill>
-                <a:effectLst/>
-                <a:uLnTx/>
-                <a:uFillTx/>
-                <a:latin typeface="+mn-lt"/>
-                <a:ea typeface="+mn-ea"/>
-                <a:cs typeface="+mn-cs"/>
-              </a:rPr>
-              <a:t>Thanks for listening!</a:t>
-            </a:r>
-          </a:p>
-        </p:txBody>
-      </p:sp>
-      <p:pic>
-        <p:nvPicPr>
-          <p:cNvPr id="3" name="Picture 2" descr="GitHub">
-            <a:extLst>
-              <a:ext uri="{FF2B5EF4-FFF2-40B4-BE49-F238E27FC236}">
-                <a16:creationId xmlns:a16="http://schemas.microsoft.com/office/drawing/2014/main" id="{1C6807BB-2FE0-8AC1-C000-303938DA65F6}"/>
-              </a:ext>
-            </a:extLst>
-          </p:cNvPr>
-          <p:cNvPicPr>
-            <a:picLocks noChangeAspect="1"/>
-          </p:cNvPicPr>
-          <p:nvPr/>
-        </p:nvPicPr>
-        <p:blipFill>
-          <a:blip r:embed="rId2">
-            <a:extLst>
-              <a:ext uri="{28A0092B-C50C-407E-A947-70E740481C1C}">
-                <a14:useLocalDpi xmlns:a14="http://schemas.microsoft.com/office/drawing/2010/main" val="0"/>
-              </a:ext>
-            </a:extLst>
-          </a:blip>
-          <a:stretch>
-            <a:fillRect/>
-          </a:stretch>
-        </p:blipFill>
-        <p:spPr>
-          <a:xfrm>
-            <a:off x="457200" y="5303520"/>
-            <a:ext cx="274320" cy="274320"/>
-          </a:xfrm>
-          <a:prstGeom prst="rect">
-            <a:avLst/>
-          </a:prstGeom>
-        </p:spPr>
-      </p:pic>
-      <p:sp>
-        <p:nvSpPr>
-          <p:cNvPr id="4" name="TextBox 3">
-            <a:extLst>
-              <a:ext uri="{FF2B5EF4-FFF2-40B4-BE49-F238E27FC236}">
-                <a16:creationId xmlns:a16="http://schemas.microsoft.com/office/drawing/2014/main" id="{7C00689C-58BE-8CB3-A3BE-5AC4726F5F67}"/>
-              </a:ext>
-            </a:extLst>
-          </p:cNvPr>
-          <p:cNvSpPr txBox="1"/>
-          <p:nvPr/>
-        </p:nvSpPr>
-        <p:spPr>
-          <a:xfrm>
-            <a:off x="800098" y="5247459"/>
-            <a:ext cx="3457641" cy="400110"/>
-          </a:xfrm>
-          <a:prstGeom prst="rect">
-            <a:avLst/>
-          </a:prstGeom>
-          <a:noFill/>
-        </p:spPr>
-        <p:txBody>
-          <a:bodyPr wrap="square" rtlCol="0">
-            <a:spAutoFit/>
-          </a:bodyPr>
-          <a:lstStyle/>
-          <a:p>
-            <a:r>
-              <a:rPr lang="en-US" sz="2000" dirty="0" err="1"/>
-              <a:t>dennisdietrich</a:t>
-            </a:r>
-            <a:endParaRPr lang="en-US" sz="2000" dirty="0"/>
-          </a:p>
-        </p:txBody>
-      </p:sp>
-      <p:pic>
-        <p:nvPicPr>
-          <p:cNvPr id="7" name="Picture 6" descr="LinkedIn">
-            <a:extLst>
-              <a:ext uri="{FF2B5EF4-FFF2-40B4-BE49-F238E27FC236}">
-                <a16:creationId xmlns:a16="http://schemas.microsoft.com/office/drawing/2014/main" id="{8FAF0638-CCFD-84A0-547A-EA307F2E70C5}"/>
-              </a:ext>
-            </a:extLst>
-          </p:cNvPr>
-          <p:cNvPicPr>
-            <a:picLocks noChangeAspect="1"/>
-          </p:cNvPicPr>
-          <p:nvPr/>
-        </p:nvPicPr>
-        <p:blipFill>
-          <a:blip r:embed="rId3">
-            <a:extLst>
-              <a:ext uri="{28A0092B-C50C-407E-A947-70E740481C1C}">
-                <a14:useLocalDpi xmlns:a14="http://schemas.microsoft.com/office/drawing/2010/main" val="0"/>
-              </a:ext>
-            </a:extLst>
-          </a:blip>
-          <a:stretch>
-            <a:fillRect/>
-          </a:stretch>
-        </p:blipFill>
-        <p:spPr>
-          <a:xfrm>
-            <a:off x="457200" y="5715000"/>
-            <a:ext cx="274320" cy="274320"/>
-          </a:xfrm>
-          <a:prstGeom prst="rect">
-            <a:avLst/>
-          </a:prstGeom>
-        </p:spPr>
-      </p:pic>
-      <p:sp>
-        <p:nvSpPr>
-          <p:cNvPr id="8" name="TextBox 7">
-            <a:extLst>
-              <a:ext uri="{FF2B5EF4-FFF2-40B4-BE49-F238E27FC236}">
-                <a16:creationId xmlns:a16="http://schemas.microsoft.com/office/drawing/2014/main" id="{338AE759-2568-CC79-5E0A-3FDD566C7DDA}"/>
-              </a:ext>
-            </a:extLst>
-          </p:cNvPr>
-          <p:cNvSpPr txBox="1"/>
-          <p:nvPr/>
-        </p:nvSpPr>
-        <p:spPr>
-          <a:xfrm>
-            <a:off x="800099" y="5664321"/>
-            <a:ext cx="3457641" cy="400110"/>
-          </a:xfrm>
-          <a:prstGeom prst="rect">
-            <a:avLst/>
-          </a:prstGeom>
-          <a:noFill/>
-        </p:spPr>
-        <p:txBody>
-          <a:bodyPr wrap="square" rtlCol="0">
-            <a:spAutoFit/>
-          </a:bodyPr>
-          <a:lstStyle/>
-          <a:p>
-            <a:r>
-              <a:rPr lang="en-US" sz="2000" dirty="0" err="1"/>
-              <a:t>dcdietrich</a:t>
-            </a:r>
-            <a:endParaRPr lang="en-US" sz="2000" dirty="0"/>
-          </a:p>
-        </p:txBody>
-      </p:sp>
-      <p:pic>
-        <p:nvPicPr>
-          <p:cNvPr id="9" name="Graphic 8" descr="Mastodon">
-            <a:extLst>
-              <a:ext uri="{FF2B5EF4-FFF2-40B4-BE49-F238E27FC236}">
-                <a16:creationId xmlns:a16="http://schemas.microsoft.com/office/drawing/2014/main" id="{BF98801E-9928-B651-1FAE-635F24D543A0}"/>
-              </a:ext>
-            </a:extLst>
-          </p:cNvPr>
-          <p:cNvPicPr>
-            <a:picLocks noChangeAspect="1"/>
-          </p:cNvPicPr>
-          <p:nvPr/>
-        </p:nvPicPr>
-        <p:blipFill>
-          <a:blip r:embed="rId4">
-            <a:extLst>
-              <a:ext uri="{28A0092B-C50C-407E-A947-70E740481C1C}">
-                <a14:useLocalDpi xmlns:a14="http://schemas.microsoft.com/office/drawing/2010/main" val="0"/>
-              </a:ext>
-              <a:ext uri="{96DAC541-7B7A-43D3-8B79-37D633B846F1}">
-                <asvg:svgBlip xmlns:asvg="http://schemas.microsoft.com/office/drawing/2016/SVG/main" r:embed="rId5"/>
-              </a:ext>
-            </a:extLst>
-          </a:blip>
-          <a:stretch>
-            <a:fillRect/>
-          </a:stretch>
-        </p:blipFill>
-        <p:spPr>
-          <a:xfrm>
-            <a:off x="457200" y="6126480"/>
-            <a:ext cx="274320" cy="292855"/>
-          </a:xfrm>
-          <a:prstGeom prst="rect">
-            <a:avLst/>
-          </a:prstGeom>
-        </p:spPr>
-      </p:pic>
-      <p:sp>
-        <p:nvSpPr>
-          <p:cNvPr id="10" name="TextBox 9">
-            <a:extLst>
-              <a:ext uri="{FF2B5EF4-FFF2-40B4-BE49-F238E27FC236}">
-                <a16:creationId xmlns:a16="http://schemas.microsoft.com/office/drawing/2014/main" id="{FFDCD6FD-B230-C7B5-B746-B2489B5E1A1A}"/>
-              </a:ext>
-            </a:extLst>
-          </p:cNvPr>
-          <p:cNvSpPr txBox="1"/>
-          <p:nvPr/>
-        </p:nvSpPr>
-        <p:spPr>
-          <a:xfrm>
-            <a:off x="800100" y="6064431"/>
-            <a:ext cx="5935551" cy="400110"/>
-          </a:xfrm>
-          <a:prstGeom prst="rect">
-            <a:avLst/>
-          </a:prstGeom>
-          <a:noFill/>
-        </p:spPr>
-        <p:txBody>
-          <a:bodyPr wrap="square" rtlCol="0">
-            <a:spAutoFit/>
-          </a:bodyPr>
-          <a:lstStyle/>
-          <a:p>
-            <a:r>
-              <a:rPr lang="en-US" sz="2000" dirty="0"/>
-              <a:t>@dc@social.advancedsoftware.engineering</a:t>
-            </a:r>
-          </a:p>
-        </p:txBody>
-      </p:sp>
-    </p:spTree>
-    <p:extLst>
-      <p:ext uri="{BB962C8B-B14F-4D97-AF65-F5344CB8AC3E}">
-        <p14:creationId xmlns:p14="http://schemas.microsoft.com/office/powerpoint/2010/main" val="4124308893"/>
       </p:ext>
     </p:extLst>
   </p:cSld>
@@ -9084,6 +8973,331 @@
       <p:bldP spid="3" grpId="0" build="p"/>
     </p:bldLst>
   </p:timing>
+</p:sld>
+</file>
+
+<file path=ppt/slides/slide20.xml><?xml version="1.0" encoding="utf-8"?>
+<p:sld xmlns:a="http://schemas.openxmlformats.org/drawingml/2006/main" xmlns:r="http://schemas.openxmlformats.org/officeDocument/2006/relationships" xmlns:p="http://schemas.openxmlformats.org/presentationml/2006/main">
+  <p:cSld>
+    <p:spTree>
+      <p:nvGrpSpPr>
+        <p:cNvPr id="1" name=""/>
+        <p:cNvGrpSpPr/>
+        <p:nvPr/>
+      </p:nvGrpSpPr>
+      <p:grpSpPr>
+        <a:xfrm>
+          <a:off x="0" y="0"/>
+          <a:ext cx="0" cy="0"/>
+          <a:chOff x="0" y="0"/>
+          <a:chExt cx="0" cy="0"/>
+        </a:xfrm>
+      </p:grpSpPr>
+      <p:sp>
+        <p:nvSpPr>
+          <p:cNvPr id="2" name="Title 1">
+            <a:extLst>
+              <a:ext uri="{FF2B5EF4-FFF2-40B4-BE49-F238E27FC236}">
+                <a16:creationId xmlns:a16="http://schemas.microsoft.com/office/drawing/2014/main" id="{7306C212-B3B4-8E92-B9B3-B626EF37EBA4}"/>
+              </a:ext>
+            </a:extLst>
+          </p:cNvPr>
+          <p:cNvSpPr txBox="1">
+            <a:spLocks noGrp="1"/>
+          </p:cNvSpPr>
+          <p:nvPr>
+            <p:ph type="title" idx="4294967295"/>
+          </p:nvPr>
+        </p:nvSpPr>
+        <p:spPr>
+          <a:xfrm>
+            <a:off x="1061794" y="2828836"/>
+            <a:ext cx="10068412" cy="1200329"/>
+          </a:xfrm>
+          <a:prstGeom prst="rect">
+            <a:avLst/>
+          </a:prstGeom>
+          <a:noFill/>
+          <a:ln>
+            <a:noFill/>
+            <a:prstDash/>
+          </a:ln>
+          <a:effectLst/>
+        </p:spPr>
+        <p:txBody>
+          <a:bodyPr rot="0" spcFirstLastPara="0" vertOverflow="overflow" horzOverflow="overflow" vert="horz" wrap="square" lIns="91440" tIns="45720" rIns="91440" bIns="45720" numCol="1" spcCol="0" rtlCol="0" fromWordArt="0" anchor="t" anchorCtr="0" forceAA="0" compatLnSpc="1">
+            <a:prstTxWarp prst="textNoShape">
+              <a:avLst/>
+            </a:prstTxWarp>
+            <a:spAutoFit/>
+          </a:bodyPr>
+          <a:lstStyle/>
+          <a:p>
+            <a:pPr marL="0" marR="0" lvl="0" indent="0" algn="ctr" defTabSz="457200" rtl="0" eaLnBrk="1" fontAlgn="auto" latinLnBrk="0" hangingPunct="1">
+              <a:lnSpc>
+                <a:spcPct val="100000"/>
+              </a:lnSpc>
+              <a:spcBef>
+                <a:spcPts val="0"/>
+              </a:spcBef>
+              <a:spcAft>
+                <a:spcPts val="0"/>
+              </a:spcAft>
+              <a:buClrTx/>
+              <a:buSzTx/>
+              <a:buFontTx/>
+              <a:buNone/>
+              <a:tabLst/>
+              <a:defRPr/>
+            </a:pPr>
+            <a:r>
+              <a:rPr kumimoji="0" lang="en-US" sz="7200" b="0" i="0" u="none" strike="noStrike" kern="1200" cap="none" spc="0" normalizeH="0" baseline="0" noProof="0" dirty="0">
+                <a:ln>
+                  <a:noFill/>
+                </a:ln>
+                <a:solidFill>
+                  <a:schemeClr val="tx1"/>
+                </a:solidFill>
+                <a:effectLst/>
+                <a:uLnTx/>
+                <a:uFillTx/>
+                <a:latin typeface="+mn-lt"/>
+                <a:ea typeface="+mn-ea"/>
+                <a:cs typeface="+mn-cs"/>
+              </a:rPr>
+              <a:t>Thanks for listening!</a:t>
+            </a:r>
+          </a:p>
+        </p:txBody>
+      </p:sp>
+      <p:pic>
+        <p:nvPicPr>
+          <p:cNvPr id="3" name="Picture 2" descr="GitHub">
+            <a:extLst>
+              <a:ext uri="{FF2B5EF4-FFF2-40B4-BE49-F238E27FC236}">
+                <a16:creationId xmlns:a16="http://schemas.microsoft.com/office/drawing/2014/main" id="{1C6807BB-2FE0-8AC1-C000-303938DA65F6}"/>
+              </a:ext>
+            </a:extLst>
+          </p:cNvPr>
+          <p:cNvPicPr>
+            <a:picLocks noChangeAspect="1"/>
+          </p:cNvPicPr>
+          <p:nvPr/>
+        </p:nvPicPr>
+        <p:blipFill>
+          <a:blip r:embed="rId2">
+            <a:extLst>
+              <a:ext uri="{28A0092B-C50C-407E-A947-70E740481C1C}">
+                <a14:useLocalDpi xmlns:a14="http://schemas.microsoft.com/office/drawing/2010/main" val="0"/>
+              </a:ext>
+            </a:extLst>
+          </a:blip>
+          <a:stretch>
+            <a:fillRect/>
+          </a:stretch>
+        </p:blipFill>
+        <p:spPr>
+          <a:xfrm>
+            <a:off x="457200" y="5303520"/>
+            <a:ext cx="274320" cy="274320"/>
+          </a:xfrm>
+          <a:prstGeom prst="rect">
+            <a:avLst/>
+          </a:prstGeom>
+        </p:spPr>
+      </p:pic>
+      <p:sp>
+        <p:nvSpPr>
+          <p:cNvPr id="4" name="TextBox 3">
+            <a:extLst>
+              <a:ext uri="{FF2B5EF4-FFF2-40B4-BE49-F238E27FC236}">
+                <a16:creationId xmlns:a16="http://schemas.microsoft.com/office/drawing/2014/main" id="{7C00689C-58BE-8CB3-A3BE-5AC4726F5F67}"/>
+              </a:ext>
+            </a:extLst>
+          </p:cNvPr>
+          <p:cNvSpPr txBox="1"/>
+          <p:nvPr/>
+        </p:nvSpPr>
+        <p:spPr>
+          <a:xfrm>
+            <a:off x="800098" y="5247459"/>
+            <a:ext cx="3457641" cy="400110"/>
+          </a:xfrm>
+          <a:prstGeom prst="rect">
+            <a:avLst/>
+          </a:prstGeom>
+          <a:noFill/>
+        </p:spPr>
+        <p:txBody>
+          <a:bodyPr wrap="square" rtlCol="0">
+            <a:spAutoFit/>
+          </a:bodyPr>
+          <a:lstStyle/>
+          <a:p>
+            <a:r>
+              <a:rPr lang="en-US" sz="2000" dirty="0" err="1"/>
+              <a:t>dennisdietrich</a:t>
+            </a:r>
+            <a:endParaRPr lang="en-US" sz="2000" dirty="0"/>
+          </a:p>
+        </p:txBody>
+      </p:sp>
+      <p:pic>
+        <p:nvPicPr>
+          <p:cNvPr id="7" name="Picture 6" descr="LinkedIn">
+            <a:extLst>
+              <a:ext uri="{FF2B5EF4-FFF2-40B4-BE49-F238E27FC236}">
+                <a16:creationId xmlns:a16="http://schemas.microsoft.com/office/drawing/2014/main" id="{8FAF0638-CCFD-84A0-547A-EA307F2E70C5}"/>
+              </a:ext>
+            </a:extLst>
+          </p:cNvPr>
+          <p:cNvPicPr>
+            <a:picLocks noChangeAspect="1"/>
+          </p:cNvPicPr>
+          <p:nvPr/>
+        </p:nvPicPr>
+        <p:blipFill>
+          <a:blip r:embed="rId3">
+            <a:extLst>
+              <a:ext uri="{28A0092B-C50C-407E-A947-70E740481C1C}">
+                <a14:useLocalDpi xmlns:a14="http://schemas.microsoft.com/office/drawing/2010/main" val="0"/>
+              </a:ext>
+            </a:extLst>
+          </a:blip>
+          <a:stretch>
+            <a:fillRect/>
+          </a:stretch>
+        </p:blipFill>
+        <p:spPr>
+          <a:xfrm>
+            <a:off x="457200" y="5715000"/>
+            <a:ext cx="274320" cy="274320"/>
+          </a:xfrm>
+          <a:prstGeom prst="rect">
+            <a:avLst/>
+          </a:prstGeom>
+        </p:spPr>
+      </p:pic>
+      <p:sp>
+        <p:nvSpPr>
+          <p:cNvPr id="8" name="TextBox 7">
+            <a:extLst>
+              <a:ext uri="{FF2B5EF4-FFF2-40B4-BE49-F238E27FC236}">
+                <a16:creationId xmlns:a16="http://schemas.microsoft.com/office/drawing/2014/main" id="{338AE759-2568-CC79-5E0A-3FDD566C7DDA}"/>
+              </a:ext>
+            </a:extLst>
+          </p:cNvPr>
+          <p:cNvSpPr txBox="1"/>
+          <p:nvPr/>
+        </p:nvSpPr>
+        <p:spPr>
+          <a:xfrm>
+            <a:off x="800099" y="5664321"/>
+            <a:ext cx="3457641" cy="400110"/>
+          </a:xfrm>
+          <a:prstGeom prst="rect">
+            <a:avLst/>
+          </a:prstGeom>
+          <a:noFill/>
+        </p:spPr>
+        <p:txBody>
+          <a:bodyPr wrap="square" rtlCol="0">
+            <a:spAutoFit/>
+          </a:bodyPr>
+          <a:lstStyle/>
+          <a:p>
+            <a:r>
+              <a:rPr lang="en-US" sz="2000" dirty="0" err="1"/>
+              <a:t>dcdietrich</a:t>
+            </a:r>
+            <a:endParaRPr lang="en-US" sz="2000" dirty="0"/>
+          </a:p>
+        </p:txBody>
+      </p:sp>
+      <p:pic>
+        <p:nvPicPr>
+          <p:cNvPr id="9" name="Graphic 8" descr="Mastodon">
+            <a:extLst>
+              <a:ext uri="{FF2B5EF4-FFF2-40B4-BE49-F238E27FC236}">
+                <a16:creationId xmlns:a16="http://schemas.microsoft.com/office/drawing/2014/main" id="{BF98801E-9928-B651-1FAE-635F24D543A0}"/>
+              </a:ext>
+            </a:extLst>
+          </p:cNvPr>
+          <p:cNvPicPr>
+            <a:picLocks noChangeAspect="1"/>
+          </p:cNvPicPr>
+          <p:nvPr/>
+        </p:nvPicPr>
+        <p:blipFill>
+          <a:blip r:embed="rId4">
+            <a:extLst>
+              <a:ext uri="{28A0092B-C50C-407E-A947-70E740481C1C}">
+                <a14:useLocalDpi xmlns:a14="http://schemas.microsoft.com/office/drawing/2010/main" val="0"/>
+              </a:ext>
+              <a:ext uri="{96DAC541-7B7A-43D3-8B79-37D633B846F1}">
+                <asvg:svgBlip xmlns:asvg="http://schemas.microsoft.com/office/drawing/2016/SVG/main" r:embed="rId5"/>
+              </a:ext>
+            </a:extLst>
+          </a:blip>
+          <a:stretch>
+            <a:fillRect/>
+          </a:stretch>
+        </p:blipFill>
+        <p:spPr>
+          <a:xfrm>
+            <a:off x="457200" y="6126480"/>
+            <a:ext cx="274320" cy="292855"/>
+          </a:xfrm>
+          <a:prstGeom prst="rect">
+            <a:avLst/>
+          </a:prstGeom>
+        </p:spPr>
+      </p:pic>
+      <p:sp>
+        <p:nvSpPr>
+          <p:cNvPr id="10" name="TextBox 9">
+            <a:extLst>
+              <a:ext uri="{FF2B5EF4-FFF2-40B4-BE49-F238E27FC236}">
+                <a16:creationId xmlns:a16="http://schemas.microsoft.com/office/drawing/2014/main" id="{FFDCD6FD-B230-C7B5-B746-B2489B5E1A1A}"/>
+              </a:ext>
+            </a:extLst>
+          </p:cNvPr>
+          <p:cNvSpPr txBox="1"/>
+          <p:nvPr/>
+        </p:nvSpPr>
+        <p:spPr>
+          <a:xfrm>
+            <a:off x="800100" y="6064431"/>
+            <a:ext cx="5935551" cy="400110"/>
+          </a:xfrm>
+          <a:prstGeom prst="rect">
+            <a:avLst/>
+          </a:prstGeom>
+          <a:noFill/>
+        </p:spPr>
+        <p:txBody>
+          <a:bodyPr wrap="square" rtlCol="0">
+            <a:spAutoFit/>
+          </a:bodyPr>
+          <a:lstStyle/>
+          <a:p>
+            <a:r>
+              <a:rPr lang="en-US" sz="2000" dirty="0"/>
+              <a:t>@dc@social.advancedsoftware.engineering</a:t>
+            </a:r>
+          </a:p>
+        </p:txBody>
+      </p:sp>
+    </p:spTree>
+    <p:extLst>
+      <p:ext uri="{BB962C8B-B14F-4D97-AF65-F5344CB8AC3E}">
+        <p14:creationId xmlns:p14="http://schemas.microsoft.com/office/powerpoint/2010/main" val="4124308893"/>
+      </p:ext>
+    </p:extLst>
+  </p:cSld>
+  <p:clrMapOvr>
+    <a:masterClrMapping/>
+  </p:clrMapOvr>
 </p:sld>
 </file>
 

</xml_diff>

<commit_message>
Completed initial breakdown of the talk
</commit_message>
<xml_diff>
--- a/Sitting in meetings all day long.pptx
+++ b/Sitting in meetings all day long.pptx
@@ -5,7 +5,7 @@
     <p:sldMasterId id="2147483660" r:id="rId1"/>
   </p:sldMasterIdLst>
   <p:notesMasterIdLst>
-    <p:notesMasterId r:id="rId22"/>
+    <p:notesMasterId r:id="rId31"/>
   </p:notesMasterIdLst>
   <p:sldIdLst>
     <p:sldId id="256" r:id="rId2"/>
@@ -19,15 +19,24 @@
     <p:sldId id="292" r:id="rId10"/>
     <p:sldId id="294" r:id="rId11"/>
     <p:sldId id="293" r:id="rId12"/>
-    <p:sldId id="301" r:id="rId13"/>
+    <p:sldId id="300" r:id="rId13"/>
     <p:sldId id="295" r:id="rId14"/>
-    <p:sldId id="300" r:id="rId15"/>
+    <p:sldId id="301" r:id="rId15"/>
     <p:sldId id="287" r:id="rId16"/>
-    <p:sldId id="290" r:id="rId17"/>
-    <p:sldId id="291" r:id="rId18"/>
-    <p:sldId id="288" r:id="rId19"/>
-    <p:sldId id="284" r:id="rId20"/>
-    <p:sldId id="285" r:id="rId21"/>
+    <p:sldId id="305" r:id="rId17"/>
+    <p:sldId id="306" r:id="rId18"/>
+    <p:sldId id="290" r:id="rId19"/>
+    <p:sldId id="307" r:id="rId20"/>
+    <p:sldId id="308" r:id="rId21"/>
+    <p:sldId id="291" r:id="rId22"/>
+    <p:sldId id="309" r:id="rId23"/>
+    <p:sldId id="310" r:id="rId24"/>
+    <p:sldId id="288" r:id="rId25"/>
+    <p:sldId id="302" r:id="rId26"/>
+    <p:sldId id="303" r:id="rId27"/>
+    <p:sldId id="304" r:id="rId28"/>
+    <p:sldId id="284" r:id="rId29"/>
+    <p:sldId id="285" r:id="rId30"/>
   </p:sldIdLst>
   <p:sldSz cx="12192000" cy="6858000"/>
   <p:notesSz cx="6858000" cy="9144000"/>
@@ -216,7 +225,7 @@
           <a:p>
             <a:fld id="{2B6DBF41-98D5-4B29-8B81-B31614D19ACC}" type="datetimeFigureOut">
               <a:rPr lang="en-US" smtClean="0"/>
-              <a:t>3/24/24</a:t>
+              <a:t>3/27/24</a:t>
             </a:fld>
             <a:endParaRPr lang="en-US"/>
           </a:p>
@@ -887,7 +896,7 @@
           <a:p>
             <a:fld id="{F9BC75CE-03FF-4667-898C-4C70B4392062}" type="datetimeFigureOut">
               <a:rPr lang="en-US" smtClean="0"/>
-              <a:t>3/24/24</a:t>
+              <a:t>3/27/24</a:t>
             </a:fld>
             <a:endParaRPr lang="en-US"/>
           </a:p>
@@ -1162,7 +1171,7 @@
           <a:p>
             <a:fld id="{F9BC75CE-03FF-4667-898C-4C70B4392062}" type="datetimeFigureOut">
               <a:rPr lang="en-US" smtClean="0"/>
-              <a:t>3/24/24</a:t>
+              <a:t>3/27/24</a:t>
             </a:fld>
             <a:endParaRPr lang="en-US"/>
           </a:p>
@@ -1356,7 +1365,7 @@
           <a:p>
             <a:fld id="{F9BC75CE-03FF-4667-898C-4C70B4392062}" type="datetimeFigureOut">
               <a:rPr lang="en-US" smtClean="0"/>
-              <a:t>3/24/24</a:t>
+              <a:t>3/27/24</a:t>
             </a:fld>
             <a:endParaRPr lang="en-US"/>
           </a:p>
@@ -1629,7 +1638,7 @@
           <a:p>
             <a:fld id="{F9BC75CE-03FF-4667-898C-4C70B4392062}" type="datetimeFigureOut">
               <a:rPr lang="en-US" smtClean="0"/>
-              <a:t>3/24/24</a:t>
+              <a:t>3/27/24</a:t>
             </a:fld>
             <a:endParaRPr lang="en-US"/>
           </a:p>
@@ -1970,7 +1979,7 @@
           <a:p>
             <a:fld id="{F9BC75CE-03FF-4667-898C-4C70B4392062}" type="datetimeFigureOut">
               <a:rPr lang="en-US" smtClean="0"/>
-              <a:t>3/24/24</a:t>
+              <a:t>3/27/24</a:t>
             </a:fld>
             <a:endParaRPr lang="en-US"/>
           </a:p>
@@ -2593,7 +2602,7 @@
           <a:p>
             <a:fld id="{F9BC75CE-03FF-4667-898C-4C70B4392062}" type="datetimeFigureOut">
               <a:rPr lang="en-US" smtClean="0"/>
-              <a:t>3/24/24</a:t>
+              <a:t>3/27/24</a:t>
             </a:fld>
             <a:endParaRPr lang="en-US"/>
           </a:p>
@@ -3453,7 +3462,7 @@
           <a:p>
             <a:fld id="{F9BC75CE-03FF-4667-898C-4C70B4392062}" type="datetimeFigureOut">
               <a:rPr lang="en-US" smtClean="0"/>
-              <a:t>3/24/24</a:t>
+              <a:t>3/27/24</a:t>
             </a:fld>
             <a:endParaRPr lang="en-US"/>
           </a:p>
@@ -3623,7 +3632,7 @@
           <a:p>
             <a:fld id="{F9BC75CE-03FF-4667-898C-4C70B4392062}" type="datetimeFigureOut">
               <a:rPr lang="en-US" smtClean="0"/>
-              <a:t>3/24/24</a:t>
+              <a:t>3/27/24</a:t>
             </a:fld>
             <a:endParaRPr lang="en-US"/>
           </a:p>
@@ -3803,7 +3812,7 @@
           <a:p>
             <a:fld id="{F9BC75CE-03FF-4667-898C-4C70B4392062}" type="datetimeFigureOut">
               <a:rPr lang="en-US" smtClean="0"/>
-              <a:t>3/24/24</a:t>
+              <a:t>3/27/24</a:t>
             </a:fld>
             <a:endParaRPr lang="en-US"/>
           </a:p>
@@ -3973,7 +3982,7 @@
           <a:p>
             <a:fld id="{F9BC75CE-03FF-4667-898C-4C70B4392062}" type="datetimeFigureOut">
               <a:rPr lang="en-US" smtClean="0"/>
-              <a:t>3/24/24</a:t>
+              <a:t>3/27/24</a:t>
             </a:fld>
             <a:endParaRPr lang="en-US"/>
           </a:p>
@@ -4220,7 +4229,7 @@
           <a:p>
             <a:fld id="{F9BC75CE-03FF-4667-898C-4C70B4392062}" type="datetimeFigureOut">
               <a:rPr lang="en-US" smtClean="0"/>
-              <a:t>3/24/24</a:t>
+              <a:t>3/27/24</a:t>
             </a:fld>
             <a:endParaRPr lang="en-US"/>
           </a:p>
@@ -4512,7 +4521,7 @@
           <a:p>
             <a:fld id="{F9BC75CE-03FF-4667-898C-4C70B4392062}" type="datetimeFigureOut">
               <a:rPr lang="en-US" smtClean="0"/>
-              <a:t>3/24/24</a:t>
+              <a:t>3/27/24</a:t>
             </a:fld>
             <a:endParaRPr lang="en-US"/>
           </a:p>
@@ -4956,7 +4965,7 @@
           <a:p>
             <a:fld id="{F9BC75CE-03FF-4667-898C-4C70B4392062}" type="datetimeFigureOut">
               <a:rPr lang="en-US" smtClean="0"/>
-              <a:t>3/24/24</a:t>
+              <a:t>3/27/24</a:t>
             </a:fld>
             <a:endParaRPr lang="en-US"/>
           </a:p>
@@ -5074,7 +5083,7 @@
           <a:p>
             <a:fld id="{F9BC75CE-03FF-4667-898C-4C70B4392062}" type="datetimeFigureOut">
               <a:rPr lang="en-US" smtClean="0"/>
-              <a:t>3/24/24</a:t>
+              <a:t>3/27/24</a:t>
             </a:fld>
             <a:endParaRPr lang="en-US"/>
           </a:p>
@@ -5169,7 +5178,7 @@
           <a:p>
             <a:fld id="{F9BC75CE-03FF-4667-898C-4C70B4392062}" type="datetimeFigureOut">
               <a:rPr lang="en-US" smtClean="0"/>
-              <a:t>3/24/24</a:t>
+              <a:t>3/27/24</a:t>
             </a:fld>
             <a:endParaRPr lang="en-US"/>
           </a:p>
@@ -5448,7 +5457,7 @@
           <a:p>
             <a:fld id="{F9BC75CE-03FF-4667-898C-4C70B4392062}" type="datetimeFigureOut">
               <a:rPr lang="en-US" smtClean="0"/>
-              <a:t>3/24/24</a:t>
+              <a:t>3/27/24</a:t>
             </a:fld>
             <a:endParaRPr lang="en-US"/>
           </a:p>
@@ -5723,7 +5732,7 @@
           <a:p>
             <a:fld id="{F9BC75CE-03FF-4667-898C-4C70B4392062}" type="datetimeFigureOut">
               <a:rPr lang="en-US" smtClean="0"/>
-              <a:t>3/24/24</a:t>
+              <a:t>3/27/24</a:t>
             </a:fld>
             <a:endParaRPr lang="en-US"/>
           </a:p>
@@ -6152,7 +6161,7 @@
           <a:p>
             <a:fld id="{F9BC75CE-03FF-4667-898C-4C70B4392062}" type="datetimeFigureOut">
               <a:rPr lang="en-US" smtClean="0"/>
-              <a:t>3/24/24</a:t>
+              <a:t>3/27/24</a:t>
             </a:fld>
             <a:endParaRPr lang="en-US"/>
           </a:p>
@@ -7305,7 +7314,7 @@
           <a:p>
             <a:r>
               <a:rPr lang="en-US" sz="1200" dirty="0"/>
-              <a:t>Rev. 1 (2024-03-??), </a:t>
+              <a:t>Rev. 1 (2024-04-??), </a:t>
             </a:r>
             <a:r>
               <a:rPr lang="en-US" sz="1200" dirty="0">
@@ -7557,7 +7566,7 @@
             </a:br>
             <a:r>
               <a:rPr lang="en-US" dirty="0"/>
-              <a:t>Leaving your comfort zone</a:t>
+              <a:t>About fine print</a:t>
             </a:r>
           </a:p>
         </p:txBody>
@@ -7590,7 +7599,7 @@
     </p:spTree>
     <p:extLst>
       <p:ext uri="{BB962C8B-B14F-4D97-AF65-F5344CB8AC3E}">
-        <p14:creationId xmlns:p14="http://schemas.microsoft.com/office/powerpoint/2010/main" val="3764024582"/>
+        <p14:creationId xmlns:p14="http://schemas.microsoft.com/office/powerpoint/2010/main" val="3106584548"/>
       </p:ext>
     </p:extLst>
   </p:cSld>
@@ -7737,7 +7746,7 @@
             </a:br>
             <a:r>
               <a:rPr lang="en-US" dirty="0"/>
-              <a:t>About fine print</a:t>
+              <a:t>Leaving your comfort zone</a:t>
             </a:r>
           </a:p>
         </p:txBody>
@@ -7770,7 +7779,7 @@
     </p:spTree>
     <p:extLst>
       <p:ext uri="{BB962C8B-B14F-4D97-AF65-F5344CB8AC3E}">
-        <p14:creationId xmlns:p14="http://schemas.microsoft.com/office/powerpoint/2010/main" val="3106584548"/>
+        <p14:creationId xmlns:p14="http://schemas.microsoft.com/office/powerpoint/2010/main" val="3764024582"/>
       </p:ext>
     </p:extLst>
   </p:cSld>
@@ -7909,82 +7918,65 @@
           <p:cNvPr id="2" name="Title 1">
             <a:extLst>
               <a:ext uri="{FF2B5EF4-FFF2-40B4-BE49-F238E27FC236}">
-                <a16:creationId xmlns:a16="http://schemas.microsoft.com/office/drawing/2014/main" id="{7306C212-B3B4-8E92-B9B3-B626EF37EBA4}"/>
+                <a16:creationId xmlns:a16="http://schemas.microsoft.com/office/drawing/2014/main" id="{B1C169BA-9384-13A8-9DDF-F5C2403AEDE8}"/>
               </a:ext>
             </a:extLst>
           </p:cNvPr>
-          <p:cNvSpPr txBox="1">
-            <a:spLocks noGrp="1"/>
-          </p:cNvSpPr>
-          <p:nvPr>
-            <p:ph type="title" idx="4294967295"/>
-          </p:nvPr>
-        </p:nvSpPr>
-        <p:spPr>
-          <a:xfrm>
-            <a:off x="1061794" y="2274838"/>
-            <a:ext cx="10068412" cy="2308324"/>
-          </a:xfrm>
-          <a:prstGeom prst="rect">
-            <a:avLst/>
-          </a:prstGeom>
-          <a:noFill/>
-          <a:ln>
-            <a:noFill/>
-            <a:prstDash/>
-          </a:ln>
-          <a:effectLst/>
-        </p:spPr>
-        <p:txBody>
-          <a:bodyPr rot="0" spcFirstLastPara="0" vertOverflow="overflow" horzOverflow="overflow" vert="horz" wrap="square" lIns="91440" tIns="45720" rIns="91440" bIns="45720" numCol="1" spcCol="0" rtlCol="0" fromWordArt="0" anchor="t" anchorCtr="0" forceAA="0" compatLnSpc="1">
-            <a:prstTxWarp prst="textNoShape">
-              <a:avLst/>
-            </a:prstTxWarp>
-            <a:spAutoFit/>
-          </a:bodyPr>
-          <a:lstStyle/>
-          <a:p>
-            <a:pPr marL="0" marR="0" lvl="0" indent="0" algn="ctr" defTabSz="457200" rtl="0" eaLnBrk="1" fontAlgn="auto" latinLnBrk="0" hangingPunct="1">
-              <a:lnSpc>
-                <a:spcPct val="100000"/>
-              </a:lnSpc>
-              <a:spcBef>
-                <a:spcPts val="0"/>
-              </a:spcBef>
-              <a:spcAft>
-                <a:spcPts val="0"/>
-              </a:spcAft>
-              <a:buClrTx/>
-              <a:buSzTx/>
-              <a:buFontTx/>
-              <a:buNone/>
-              <a:tabLst/>
-              <a:defRPr/>
-            </a:pPr>
-            <a:r>
-              <a:rPr kumimoji="0" lang="en-US" sz="7200" b="0" i="0" u="none" strike="noStrike" kern="1200" cap="none" spc="0" normalizeH="0" baseline="0" noProof="0" dirty="0">
-                <a:ln>
-                  <a:noFill/>
-                </a:ln>
-                <a:solidFill>
-                  <a:schemeClr val="tx1"/>
-                </a:solidFill>
-                <a:effectLst/>
-                <a:uLnTx/>
-                <a:uFillTx/>
-                <a:latin typeface="+mn-lt"/>
-                <a:ea typeface="+mn-ea"/>
-                <a:cs typeface="+mn-cs"/>
-              </a:rPr>
-              <a:t>Tactical and strategic staffing</a:t>
-            </a:r>
+          <p:cNvSpPr>
+            <a:spLocks noGrp="1"/>
+          </p:cNvSpPr>
+          <p:nvPr>
+            <p:ph type="title"/>
+          </p:nvPr>
+        </p:nvSpPr>
+        <p:spPr/>
+        <p:txBody>
+          <a:bodyPr/>
+          <a:lstStyle/>
+          <a:p>
+            <a:r>
+              <a:rPr lang="en-US" dirty="0"/>
+              <a:t>Lessons in communication</a:t>
+            </a:r>
+            <a:br>
+              <a:rPr lang="en-US" dirty="0"/>
+            </a:br>
+            <a:r>
+              <a:rPr lang="en-US" dirty="0"/>
+              <a:t>Reading between the lines</a:t>
+            </a:r>
+          </a:p>
+        </p:txBody>
+      </p:sp>
+      <p:sp>
+        <p:nvSpPr>
+          <p:cNvPr id="3" name="Content Placeholder 2">
+            <a:extLst>
+              <a:ext uri="{FF2B5EF4-FFF2-40B4-BE49-F238E27FC236}">
+                <a16:creationId xmlns:a16="http://schemas.microsoft.com/office/drawing/2014/main" id="{B2E99B5C-42F6-68A9-5D8C-522EA5A66EF8}"/>
+              </a:ext>
+            </a:extLst>
+          </p:cNvPr>
+          <p:cNvSpPr>
+            <a:spLocks noGrp="1"/>
+          </p:cNvSpPr>
+          <p:nvPr>
+            <p:ph idx="1"/>
+          </p:nvPr>
+        </p:nvSpPr>
+        <p:spPr/>
+        <p:txBody>
+          <a:bodyPr/>
+          <a:lstStyle/>
+          <a:p>
+            <a:endParaRPr lang="en-US"/>
           </a:p>
         </p:txBody>
       </p:sp>
     </p:spTree>
     <p:extLst>
       <p:ext uri="{BB962C8B-B14F-4D97-AF65-F5344CB8AC3E}">
-        <p14:creationId xmlns:p14="http://schemas.microsoft.com/office/powerpoint/2010/main" val="2515611607"/>
+        <p14:creationId xmlns:p14="http://schemas.microsoft.com/office/powerpoint/2010/main" val="3488034133"/>
       </p:ext>
     </p:extLst>
   </p:cSld>
@@ -8016,82 +8008,65 @@
           <p:cNvPr id="2" name="Title 1">
             <a:extLst>
               <a:ext uri="{FF2B5EF4-FFF2-40B4-BE49-F238E27FC236}">
-                <a16:creationId xmlns:a16="http://schemas.microsoft.com/office/drawing/2014/main" id="{7306C212-B3B4-8E92-B9B3-B626EF37EBA4}"/>
+                <a16:creationId xmlns:a16="http://schemas.microsoft.com/office/drawing/2014/main" id="{B1C169BA-9384-13A8-9DDF-F5C2403AEDE8}"/>
               </a:ext>
             </a:extLst>
           </p:cNvPr>
-          <p:cNvSpPr txBox="1">
-            <a:spLocks noGrp="1"/>
-          </p:cNvSpPr>
-          <p:nvPr>
-            <p:ph type="title" idx="4294967295"/>
-          </p:nvPr>
-        </p:nvSpPr>
-        <p:spPr>
-          <a:xfrm>
-            <a:off x="1061794" y="2274838"/>
-            <a:ext cx="10068412" cy="2308324"/>
-          </a:xfrm>
-          <a:prstGeom prst="rect">
-            <a:avLst/>
-          </a:prstGeom>
-          <a:noFill/>
-          <a:ln>
-            <a:noFill/>
-            <a:prstDash/>
-          </a:ln>
-          <a:effectLst/>
-        </p:spPr>
-        <p:txBody>
-          <a:bodyPr rot="0" spcFirstLastPara="0" vertOverflow="overflow" horzOverflow="overflow" vert="horz" wrap="square" lIns="91440" tIns="45720" rIns="91440" bIns="45720" numCol="1" spcCol="0" rtlCol="0" fromWordArt="0" anchor="t" anchorCtr="0" forceAA="0" compatLnSpc="1">
-            <a:prstTxWarp prst="textNoShape">
-              <a:avLst/>
-            </a:prstTxWarp>
-            <a:spAutoFit/>
-          </a:bodyPr>
-          <a:lstStyle/>
-          <a:p>
-            <a:pPr marL="0" marR="0" lvl="0" indent="0" algn="ctr" defTabSz="457200" rtl="0" eaLnBrk="1" fontAlgn="auto" latinLnBrk="0" hangingPunct="1">
-              <a:lnSpc>
-                <a:spcPct val="100000"/>
-              </a:lnSpc>
-              <a:spcBef>
-                <a:spcPts val="0"/>
-              </a:spcBef>
-              <a:spcAft>
-                <a:spcPts val="0"/>
-              </a:spcAft>
-              <a:buClrTx/>
-              <a:buSzTx/>
-              <a:buFontTx/>
-              <a:buNone/>
-              <a:tabLst/>
-              <a:defRPr/>
-            </a:pPr>
-            <a:r>
-              <a:rPr kumimoji="0" lang="en-US" sz="7200" b="0" i="0" u="none" strike="noStrike" kern="1200" cap="none" spc="0" normalizeH="0" baseline="0" noProof="0" dirty="0">
-                <a:ln>
-                  <a:noFill/>
-                </a:ln>
-                <a:solidFill>
-                  <a:schemeClr val="tx1"/>
-                </a:solidFill>
-                <a:effectLst/>
-                <a:uLnTx/>
-                <a:uFillTx/>
-                <a:latin typeface="+mn-lt"/>
-                <a:ea typeface="+mn-ea"/>
-                <a:cs typeface="+mn-cs"/>
-              </a:rPr>
-              <a:t>Dealing with ”large" amounts</a:t>
-            </a:r>
+          <p:cNvSpPr>
+            <a:spLocks noGrp="1"/>
+          </p:cNvSpPr>
+          <p:nvPr>
+            <p:ph type="title"/>
+          </p:nvPr>
+        </p:nvSpPr>
+        <p:spPr/>
+        <p:txBody>
+          <a:bodyPr/>
+          <a:lstStyle/>
+          <a:p>
+            <a:r>
+              <a:rPr lang="en-US" dirty="0"/>
+              <a:t>Lessons in communication</a:t>
+            </a:r>
+            <a:br>
+              <a:rPr lang="en-US" dirty="0"/>
+            </a:br>
+            <a:r>
+              <a:rPr lang="en-US" dirty="0"/>
+              <a:t>They’ll listen… to something</a:t>
+            </a:r>
+          </a:p>
+        </p:txBody>
+      </p:sp>
+      <p:sp>
+        <p:nvSpPr>
+          <p:cNvPr id="3" name="Content Placeholder 2">
+            <a:extLst>
+              <a:ext uri="{FF2B5EF4-FFF2-40B4-BE49-F238E27FC236}">
+                <a16:creationId xmlns:a16="http://schemas.microsoft.com/office/drawing/2014/main" id="{B2E99B5C-42F6-68A9-5D8C-522EA5A66EF8}"/>
+              </a:ext>
+            </a:extLst>
+          </p:cNvPr>
+          <p:cNvSpPr>
+            <a:spLocks noGrp="1"/>
+          </p:cNvSpPr>
+          <p:nvPr>
+            <p:ph idx="1"/>
+          </p:nvPr>
+        </p:nvSpPr>
+        <p:spPr/>
+        <p:txBody>
+          <a:bodyPr/>
+          <a:lstStyle/>
+          <a:p>
+            <a:endParaRPr lang="en-US"/>
           </a:p>
         </p:txBody>
       </p:sp>
     </p:spTree>
     <p:extLst>
       <p:ext uri="{BB962C8B-B14F-4D97-AF65-F5344CB8AC3E}">
-        <p14:creationId xmlns:p14="http://schemas.microsoft.com/office/powerpoint/2010/main" val="3958885873"/>
+        <p14:creationId xmlns:p14="http://schemas.microsoft.com/office/powerpoint/2010/main" val="1967002286"/>
       </p:ext>
     </p:extLst>
   </p:cSld>
@@ -8190,7 +8165,7 @@
                 <a:ea typeface="+mn-ea"/>
                 <a:cs typeface="+mn-cs"/>
               </a:rPr>
-              <a:t>Reaching the next level</a:t>
+              <a:t>Tactical and strategic staffing</a:t>
             </a:r>
           </a:p>
         </p:txBody>
@@ -8198,7 +8173,7 @@
     </p:spTree>
     <p:extLst>
       <p:ext uri="{BB962C8B-B14F-4D97-AF65-F5344CB8AC3E}">
-        <p14:creationId xmlns:p14="http://schemas.microsoft.com/office/powerpoint/2010/main" val="304747598"/>
+        <p14:creationId xmlns:p14="http://schemas.microsoft.com/office/powerpoint/2010/main" val="2515611607"/>
       </p:ext>
     </p:extLst>
   </p:cSld>
@@ -8230,300 +8205,65 @@
           <p:cNvPr id="2" name="Title 1">
             <a:extLst>
               <a:ext uri="{FF2B5EF4-FFF2-40B4-BE49-F238E27FC236}">
-                <a16:creationId xmlns:a16="http://schemas.microsoft.com/office/drawing/2014/main" id="{7306C212-B3B4-8E92-B9B3-B626EF37EBA4}"/>
+                <a16:creationId xmlns:a16="http://schemas.microsoft.com/office/drawing/2014/main" id="{4B1138EC-C228-F909-6E50-58916471968D}"/>
               </a:ext>
             </a:extLst>
           </p:cNvPr>
-          <p:cNvSpPr txBox="1">
-            <a:spLocks noGrp="1"/>
-          </p:cNvSpPr>
-          <p:nvPr>
-            <p:ph type="title" idx="4294967295"/>
-          </p:nvPr>
-        </p:nvSpPr>
-        <p:spPr>
-          <a:xfrm>
-            <a:off x="1061794" y="2828836"/>
-            <a:ext cx="10068412" cy="1200329"/>
-          </a:xfrm>
-          <a:prstGeom prst="rect">
-            <a:avLst/>
-          </a:prstGeom>
-          <a:noFill/>
-          <a:ln>
-            <a:noFill/>
-            <a:prstDash/>
-          </a:ln>
-          <a:effectLst/>
-        </p:spPr>
-        <p:txBody>
-          <a:bodyPr rot="0" spcFirstLastPara="0" vertOverflow="overflow" horzOverflow="overflow" vert="horz" wrap="square" lIns="91440" tIns="45720" rIns="91440" bIns="45720" numCol="1" spcCol="0" rtlCol="0" fromWordArt="0" anchor="t" anchorCtr="0" forceAA="0" compatLnSpc="1">
-            <a:prstTxWarp prst="textNoShape">
-              <a:avLst/>
-            </a:prstTxWarp>
-            <a:spAutoFit/>
-          </a:bodyPr>
-          <a:lstStyle/>
-          <a:p>
-            <a:pPr marL="0" marR="0" lvl="0" indent="0" algn="ctr" defTabSz="457200" rtl="0" eaLnBrk="1" fontAlgn="auto" latinLnBrk="0" hangingPunct="1">
-              <a:lnSpc>
-                <a:spcPct val="100000"/>
-              </a:lnSpc>
-              <a:spcBef>
-                <a:spcPts val="0"/>
-              </a:spcBef>
-              <a:spcAft>
-                <a:spcPts val="0"/>
-              </a:spcAft>
-              <a:buClrTx/>
-              <a:buSzTx/>
-              <a:buFontTx/>
-              <a:buNone/>
-              <a:tabLst/>
-              <a:defRPr/>
-            </a:pPr>
-            <a:r>
-              <a:rPr kumimoji="0" lang="en-US" sz="7200" b="0" i="0" u="none" strike="noStrike" kern="1200" cap="none" spc="0" normalizeH="0" baseline="0" noProof="0" dirty="0">
-                <a:ln>
-                  <a:noFill/>
-                </a:ln>
-                <a:solidFill>
-                  <a:schemeClr val="tx1"/>
-                </a:solidFill>
-                <a:effectLst/>
-                <a:uLnTx/>
-                <a:uFillTx/>
-                <a:latin typeface="+mn-lt"/>
-                <a:ea typeface="+mn-ea"/>
-                <a:cs typeface="+mn-cs"/>
-              </a:rPr>
-              <a:t>Questions?</a:t>
-            </a:r>
-          </a:p>
-        </p:txBody>
-      </p:sp>
-      <p:pic>
-        <p:nvPicPr>
-          <p:cNvPr id="9" name="Picture 8" descr="GitHub">
+          <p:cNvSpPr>
+            <a:spLocks noGrp="1"/>
+          </p:cNvSpPr>
+          <p:nvPr>
+            <p:ph type="title"/>
+          </p:nvPr>
+        </p:nvSpPr>
+        <p:spPr/>
+        <p:txBody>
+          <a:bodyPr/>
+          <a:lstStyle/>
+          <a:p>
+            <a:r>
+              <a:rPr lang="en-US" dirty="0"/>
+              <a:t>Tactical and strategic staffing</a:t>
+            </a:r>
+            <a:br>
+              <a:rPr lang="en-US" dirty="0"/>
+            </a:br>
+            <a:r>
+              <a:rPr lang="en-US" dirty="0"/>
+              <a:t>Tactical (short-term)</a:t>
+            </a:r>
+          </a:p>
+        </p:txBody>
+      </p:sp>
+      <p:sp>
+        <p:nvSpPr>
+          <p:cNvPr id="3" name="Content Placeholder 2">
             <a:extLst>
               <a:ext uri="{FF2B5EF4-FFF2-40B4-BE49-F238E27FC236}">
-                <a16:creationId xmlns:a16="http://schemas.microsoft.com/office/drawing/2014/main" id="{D413AEAD-8A92-6186-D075-5F3D3F946656}"/>
+                <a16:creationId xmlns:a16="http://schemas.microsoft.com/office/drawing/2014/main" id="{8EC4E523-CC9F-4A9F-C5CF-DCCEB45FA33E}"/>
               </a:ext>
             </a:extLst>
           </p:cNvPr>
-          <p:cNvPicPr>
-            <a:picLocks noChangeAspect="1"/>
-          </p:cNvPicPr>
-          <p:nvPr/>
-        </p:nvPicPr>
-        <p:blipFill>
-          <a:blip r:embed="rId2">
-            <a:extLst>
-              <a:ext uri="{28A0092B-C50C-407E-A947-70E740481C1C}">
-                <a14:useLocalDpi xmlns:a14="http://schemas.microsoft.com/office/drawing/2010/main" val="0"/>
-              </a:ext>
-            </a:extLst>
-          </a:blip>
-          <a:stretch>
-            <a:fillRect/>
-          </a:stretch>
-        </p:blipFill>
-        <p:spPr>
-          <a:xfrm>
-            <a:off x="457200" y="5303520"/>
-            <a:ext cx="274320" cy="274320"/>
-          </a:xfrm>
-          <a:prstGeom prst="rect">
-            <a:avLst/>
-          </a:prstGeom>
-        </p:spPr>
-      </p:pic>
-      <p:sp>
-        <p:nvSpPr>
-          <p:cNvPr id="10" name="TextBox 9">
-            <a:extLst>
-              <a:ext uri="{FF2B5EF4-FFF2-40B4-BE49-F238E27FC236}">
-                <a16:creationId xmlns:a16="http://schemas.microsoft.com/office/drawing/2014/main" id="{888E3480-3A92-8D18-6D43-A59A2C6A1260}"/>
-              </a:ext>
-            </a:extLst>
-          </p:cNvPr>
-          <p:cNvSpPr txBox="1"/>
-          <p:nvPr/>
-        </p:nvSpPr>
-        <p:spPr>
-          <a:xfrm>
-            <a:off x="800098" y="5247459"/>
-            <a:ext cx="3457641" cy="400110"/>
-          </a:xfrm>
-          <a:prstGeom prst="rect">
-            <a:avLst/>
-          </a:prstGeom>
-          <a:noFill/>
-        </p:spPr>
-        <p:txBody>
-          <a:bodyPr wrap="square" rtlCol="0">
-            <a:spAutoFit/>
-          </a:bodyPr>
-          <a:lstStyle/>
-          <a:p>
-            <a:r>
-              <a:rPr lang="en-US" sz="2000" dirty="0" err="1"/>
-              <a:t>dennisdietrich</a:t>
-            </a:r>
-            <a:endParaRPr lang="en-US" sz="2000" dirty="0"/>
-          </a:p>
-        </p:txBody>
-      </p:sp>
-      <p:pic>
-        <p:nvPicPr>
-          <p:cNvPr id="11" name="Picture 10" descr="LinkedIn">
-            <a:extLst>
-              <a:ext uri="{FF2B5EF4-FFF2-40B4-BE49-F238E27FC236}">
-                <a16:creationId xmlns:a16="http://schemas.microsoft.com/office/drawing/2014/main" id="{5498B0FC-EAA9-1A93-9862-02CC73B5EEE3}"/>
-              </a:ext>
-            </a:extLst>
-          </p:cNvPr>
-          <p:cNvPicPr>
-            <a:picLocks noChangeAspect="1"/>
-          </p:cNvPicPr>
-          <p:nvPr/>
-        </p:nvPicPr>
-        <p:blipFill>
-          <a:blip r:embed="rId3">
-            <a:extLst>
-              <a:ext uri="{28A0092B-C50C-407E-A947-70E740481C1C}">
-                <a14:useLocalDpi xmlns:a14="http://schemas.microsoft.com/office/drawing/2010/main" val="0"/>
-              </a:ext>
-            </a:extLst>
-          </a:blip>
-          <a:stretch>
-            <a:fillRect/>
-          </a:stretch>
-        </p:blipFill>
-        <p:spPr>
-          <a:xfrm>
-            <a:off x="457200" y="5715000"/>
-            <a:ext cx="274320" cy="274320"/>
-          </a:xfrm>
-          <a:prstGeom prst="rect">
-            <a:avLst/>
-          </a:prstGeom>
-        </p:spPr>
-      </p:pic>
-      <p:sp>
-        <p:nvSpPr>
-          <p:cNvPr id="12" name="TextBox 11">
-            <a:extLst>
-              <a:ext uri="{FF2B5EF4-FFF2-40B4-BE49-F238E27FC236}">
-                <a16:creationId xmlns:a16="http://schemas.microsoft.com/office/drawing/2014/main" id="{E80021A4-348A-BF7C-63BF-6C89D7630DCC}"/>
-              </a:ext>
-            </a:extLst>
-          </p:cNvPr>
-          <p:cNvSpPr txBox="1"/>
-          <p:nvPr/>
-        </p:nvSpPr>
-        <p:spPr>
-          <a:xfrm>
-            <a:off x="800099" y="5664321"/>
-            <a:ext cx="3457641" cy="400110"/>
-          </a:xfrm>
-          <a:prstGeom prst="rect">
-            <a:avLst/>
-          </a:prstGeom>
-          <a:noFill/>
-        </p:spPr>
-        <p:txBody>
-          <a:bodyPr wrap="square" rtlCol="0">
-            <a:spAutoFit/>
-          </a:bodyPr>
-          <a:lstStyle/>
-          <a:p>
-            <a:r>
-              <a:rPr lang="en-US" sz="2000" dirty="0" err="1"/>
-              <a:t>dcdietrich</a:t>
-            </a:r>
-            <a:endParaRPr lang="en-US" sz="2000" dirty="0"/>
-          </a:p>
-        </p:txBody>
-      </p:sp>
-      <p:pic>
-        <p:nvPicPr>
-          <p:cNvPr id="13" name="Graphic 12" descr="Mastodon">
-            <a:extLst>
-              <a:ext uri="{FF2B5EF4-FFF2-40B4-BE49-F238E27FC236}">
-                <a16:creationId xmlns:a16="http://schemas.microsoft.com/office/drawing/2014/main" id="{DCED133C-A505-FBA4-FD79-26B84EFC1909}"/>
-              </a:ext>
-            </a:extLst>
-          </p:cNvPr>
-          <p:cNvPicPr>
-            <a:picLocks noChangeAspect="1"/>
-          </p:cNvPicPr>
-          <p:nvPr/>
-        </p:nvPicPr>
-        <p:blipFill>
-          <a:blip r:embed="rId4">
-            <a:extLst>
-              <a:ext uri="{28A0092B-C50C-407E-A947-70E740481C1C}">
-                <a14:useLocalDpi xmlns:a14="http://schemas.microsoft.com/office/drawing/2010/main" val="0"/>
-              </a:ext>
-              <a:ext uri="{96DAC541-7B7A-43D3-8B79-37D633B846F1}">
-                <asvg:svgBlip xmlns:asvg="http://schemas.microsoft.com/office/drawing/2016/SVG/main" r:embed="rId5"/>
-              </a:ext>
-            </a:extLst>
-          </a:blip>
-          <a:stretch>
-            <a:fillRect/>
-          </a:stretch>
-        </p:blipFill>
-        <p:spPr>
-          <a:xfrm>
-            <a:off x="457200" y="6126480"/>
-            <a:ext cx="274320" cy="292855"/>
-          </a:xfrm>
-          <a:prstGeom prst="rect">
-            <a:avLst/>
-          </a:prstGeom>
-        </p:spPr>
-      </p:pic>
-      <p:sp>
-        <p:nvSpPr>
-          <p:cNvPr id="14" name="TextBox 13">
-            <a:extLst>
-              <a:ext uri="{FF2B5EF4-FFF2-40B4-BE49-F238E27FC236}">
-                <a16:creationId xmlns:a16="http://schemas.microsoft.com/office/drawing/2014/main" id="{E5813634-0CE6-B509-5B60-E9061F6A69C4}"/>
-              </a:ext>
-            </a:extLst>
-          </p:cNvPr>
-          <p:cNvSpPr txBox="1"/>
-          <p:nvPr/>
-        </p:nvSpPr>
-        <p:spPr>
-          <a:xfrm>
-            <a:off x="800100" y="6064431"/>
-            <a:ext cx="5935551" cy="400110"/>
-          </a:xfrm>
-          <a:prstGeom prst="rect">
-            <a:avLst/>
-          </a:prstGeom>
-          <a:noFill/>
-        </p:spPr>
-        <p:txBody>
-          <a:bodyPr wrap="square" rtlCol="0">
-            <a:spAutoFit/>
-          </a:bodyPr>
-          <a:lstStyle/>
-          <a:p>
-            <a:r>
-              <a:rPr lang="en-US" sz="2000" dirty="0"/>
-              <a:t>@dc@social.advancedsoftware.engineering</a:t>
-            </a:r>
+          <p:cNvSpPr>
+            <a:spLocks noGrp="1"/>
+          </p:cNvSpPr>
+          <p:nvPr>
+            <p:ph idx="1"/>
+          </p:nvPr>
+        </p:nvSpPr>
+        <p:spPr/>
+        <p:txBody>
+          <a:bodyPr/>
+          <a:lstStyle/>
+          <a:p>
+            <a:endParaRPr lang="en-US"/>
           </a:p>
         </p:txBody>
       </p:sp>
     </p:spTree>
     <p:extLst>
       <p:ext uri="{BB962C8B-B14F-4D97-AF65-F5344CB8AC3E}">
-        <p14:creationId xmlns:p14="http://schemas.microsoft.com/office/powerpoint/2010/main" val="1870771211"/>
+        <p14:creationId xmlns:p14="http://schemas.microsoft.com/office/powerpoint/2010/main" val="191123847"/>
       </p:ext>
     </p:extLst>
   </p:cSld>
@@ -8977,6 +8717,1085 @@
 </file>
 
 <file path=ppt/slides/slide20.xml><?xml version="1.0" encoding="utf-8"?>
+<p:sld xmlns:a="http://schemas.openxmlformats.org/drawingml/2006/main" xmlns:r="http://schemas.openxmlformats.org/officeDocument/2006/relationships" xmlns:p="http://schemas.openxmlformats.org/presentationml/2006/main">
+  <p:cSld>
+    <p:spTree>
+      <p:nvGrpSpPr>
+        <p:cNvPr id="1" name=""/>
+        <p:cNvGrpSpPr/>
+        <p:nvPr/>
+      </p:nvGrpSpPr>
+      <p:grpSpPr>
+        <a:xfrm>
+          <a:off x="0" y="0"/>
+          <a:ext cx="0" cy="0"/>
+          <a:chOff x="0" y="0"/>
+          <a:chExt cx="0" cy="0"/>
+        </a:xfrm>
+      </p:grpSpPr>
+      <p:sp>
+        <p:nvSpPr>
+          <p:cNvPr id="2" name="Title 1">
+            <a:extLst>
+              <a:ext uri="{FF2B5EF4-FFF2-40B4-BE49-F238E27FC236}">
+                <a16:creationId xmlns:a16="http://schemas.microsoft.com/office/drawing/2014/main" id="{4B1138EC-C228-F909-6E50-58916471968D}"/>
+              </a:ext>
+            </a:extLst>
+          </p:cNvPr>
+          <p:cNvSpPr>
+            <a:spLocks noGrp="1"/>
+          </p:cNvSpPr>
+          <p:nvPr>
+            <p:ph type="title"/>
+          </p:nvPr>
+        </p:nvSpPr>
+        <p:spPr/>
+        <p:txBody>
+          <a:bodyPr/>
+          <a:lstStyle/>
+          <a:p>
+            <a:r>
+              <a:rPr lang="en-US" dirty="0"/>
+              <a:t>Tactical and strategic staffing</a:t>
+            </a:r>
+            <a:br>
+              <a:rPr lang="en-US" dirty="0"/>
+            </a:br>
+            <a:r>
+              <a:rPr lang="en-US" dirty="0"/>
+              <a:t>Strategic (long-term)</a:t>
+            </a:r>
+          </a:p>
+        </p:txBody>
+      </p:sp>
+      <p:sp>
+        <p:nvSpPr>
+          <p:cNvPr id="3" name="Content Placeholder 2">
+            <a:extLst>
+              <a:ext uri="{FF2B5EF4-FFF2-40B4-BE49-F238E27FC236}">
+                <a16:creationId xmlns:a16="http://schemas.microsoft.com/office/drawing/2014/main" id="{8EC4E523-CC9F-4A9F-C5CF-DCCEB45FA33E}"/>
+              </a:ext>
+            </a:extLst>
+          </p:cNvPr>
+          <p:cNvSpPr>
+            <a:spLocks noGrp="1"/>
+          </p:cNvSpPr>
+          <p:nvPr>
+            <p:ph idx="1"/>
+          </p:nvPr>
+        </p:nvSpPr>
+        <p:spPr/>
+        <p:txBody>
+          <a:bodyPr/>
+          <a:lstStyle/>
+          <a:p>
+            <a:endParaRPr lang="en-US"/>
+          </a:p>
+        </p:txBody>
+      </p:sp>
+    </p:spTree>
+    <p:extLst>
+      <p:ext uri="{BB962C8B-B14F-4D97-AF65-F5344CB8AC3E}">
+        <p14:creationId xmlns:p14="http://schemas.microsoft.com/office/powerpoint/2010/main" val="1883057240"/>
+      </p:ext>
+    </p:extLst>
+  </p:cSld>
+  <p:clrMapOvr>
+    <a:masterClrMapping/>
+  </p:clrMapOvr>
+</p:sld>
+</file>
+
+<file path=ppt/slides/slide21.xml><?xml version="1.0" encoding="utf-8"?>
+<p:sld xmlns:a="http://schemas.openxmlformats.org/drawingml/2006/main" xmlns:r="http://schemas.openxmlformats.org/officeDocument/2006/relationships" xmlns:p="http://schemas.openxmlformats.org/presentationml/2006/main">
+  <p:cSld>
+    <p:spTree>
+      <p:nvGrpSpPr>
+        <p:cNvPr id="1" name=""/>
+        <p:cNvGrpSpPr/>
+        <p:nvPr/>
+      </p:nvGrpSpPr>
+      <p:grpSpPr>
+        <a:xfrm>
+          <a:off x="0" y="0"/>
+          <a:ext cx="0" cy="0"/>
+          <a:chOff x="0" y="0"/>
+          <a:chExt cx="0" cy="0"/>
+        </a:xfrm>
+      </p:grpSpPr>
+      <p:sp>
+        <p:nvSpPr>
+          <p:cNvPr id="2" name="Title 1">
+            <a:extLst>
+              <a:ext uri="{FF2B5EF4-FFF2-40B4-BE49-F238E27FC236}">
+                <a16:creationId xmlns:a16="http://schemas.microsoft.com/office/drawing/2014/main" id="{7306C212-B3B4-8E92-B9B3-B626EF37EBA4}"/>
+              </a:ext>
+            </a:extLst>
+          </p:cNvPr>
+          <p:cNvSpPr txBox="1">
+            <a:spLocks noGrp="1"/>
+          </p:cNvSpPr>
+          <p:nvPr>
+            <p:ph type="title" idx="4294967295"/>
+          </p:nvPr>
+        </p:nvSpPr>
+        <p:spPr>
+          <a:xfrm>
+            <a:off x="1061794" y="2274838"/>
+            <a:ext cx="10068412" cy="2308324"/>
+          </a:xfrm>
+          <a:prstGeom prst="rect">
+            <a:avLst/>
+          </a:prstGeom>
+          <a:noFill/>
+          <a:ln>
+            <a:noFill/>
+            <a:prstDash/>
+          </a:ln>
+          <a:effectLst/>
+        </p:spPr>
+        <p:txBody>
+          <a:bodyPr rot="0" spcFirstLastPara="0" vertOverflow="overflow" horzOverflow="overflow" vert="horz" wrap="square" lIns="91440" tIns="45720" rIns="91440" bIns="45720" numCol="1" spcCol="0" rtlCol="0" fromWordArt="0" anchor="t" anchorCtr="0" forceAA="0" compatLnSpc="1">
+            <a:prstTxWarp prst="textNoShape">
+              <a:avLst/>
+            </a:prstTxWarp>
+            <a:spAutoFit/>
+          </a:bodyPr>
+          <a:lstStyle/>
+          <a:p>
+            <a:pPr marL="0" marR="0" lvl="0" indent="0" algn="ctr" defTabSz="457200" rtl="0" eaLnBrk="1" fontAlgn="auto" latinLnBrk="0" hangingPunct="1">
+              <a:lnSpc>
+                <a:spcPct val="100000"/>
+              </a:lnSpc>
+              <a:spcBef>
+                <a:spcPts val="0"/>
+              </a:spcBef>
+              <a:spcAft>
+                <a:spcPts val="0"/>
+              </a:spcAft>
+              <a:buClrTx/>
+              <a:buSzTx/>
+              <a:buFontTx/>
+              <a:buNone/>
+              <a:tabLst/>
+              <a:defRPr/>
+            </a:pPr>
+            <a:r>
+              <a:rPr kumimoji="0" lang="en-US" sz="7200" b="0" i="0" u="none" strike="noStrike" kern="1200" cap="none" spc="0" normalizeH="0" baseline="0" noProof="0" dirty="0">
+                <a:ln>
+                  <a:noFill/>
+                </a:ln>
+                <a:solidFill>
+                  <a:schemeClr val="tx1"/>
+                </a:solidFill>
+                <a:effectLst/>
+                <a:uLnTx/>
+                <a:uFillTx/>
+                <a:latin typeface="+mn-lt"/>
+                <a:ea typeface="+mn-ea"/>
+                <a:cs typeface="+mn-cs"/>
+              </a:rPr>
+              <a:t>Dealing with ”large" amounts</a:t>
+            </a:r>
+          </a:p>
+        </p:txBody>
+      </p:sp>
+    </p:spTree>
+    <p:extLst>
+      <p:ext uri="{BB962C8B-B14F-4D97-AF65-F5344CB8AC3E}">
+        <p14:creationId xmlns:p14="http://schemas.microsoft.com/office/powerpoint/2010/main" val="3958885873"/>
+      </p:ext>
+    </p:extLst>
+  </p:cSld>
+  <p:clrMapOvr>
+    <a:masterClrMapping/>
+  </p:clrMapOvr>
+</p:sld>
+</file>
+
+<file path=ppt/slides/slide22.xml><?xml version="1.0" encoding="utf-8"?>
+<p:sld xmlns:a="http://schemas.openxmlformats.org/drawingml/2006/main" xmlns:r="http://schemas.openxmlformats.org/officeDocument/2006/relationships" xmlns:p="http://schemas.openxmlformats.org/presentationml/2006/main">
+  <p:cSld>
+    <p:spTree>
+      <p:nvGrpSpPr>
+        <p:cNvPr id="1" name=""/>
+        <p:cNvGrpSpPr/>
+        <p:nvPr/>
+      </p:nvGrpSpPr>
+      <p:grpSpPr>
+        <a:xfrm>
+          <a:off x="0" y="0"/>
+          <a:ext cx="0" cy="0"/>
+          <a:chOff x="0" y="0"/>
+          <a:chExt cx="0" cy="0"/>
+        </a:xfrm>
+      </p:grpSpPr>
+      <p:sp>
+        <p:nvSpPr>
+          <p:cNvPr id="2" name="Title 1">
+            <a:extLst>
+              <a:ext uri="{FF2B5EF4-FFF2-40B4-BE49-F238E27FC236}">
+                <a16:creationId xmlns:a16="http://schemas.microsoft.com/office/drawing/2014/main" id="{1DC5880F-8E65-EA3A-86E0-927CA442F637}"/>
+              </a:ext>
+            </a:extLst>
+          </p:cNvPr>
+          <p:cNvSpPr>
+            <a:spLocks noGrp="1"/>
+          </p:cNvSpPr>
+          <p:nvPr>
+            <p:ph type="title"/>
+          </p:nvPr>
+        </p:nvSpPr>
+        <p:spPr/>
+        <p:txBody>
+          <a:bodyPr/>
+          <a:lstStyle/>
+          <a:p>
+            <a:r>
+              <a:rPr lang="en-US" dirty="0"/>
+              <a:t>Dealing with ”large" amounts</a:t>
+            </a:r>
+            <a:br>
+              <a:rPr lang="en-US" dirty="0"/>
+            </a:br>
+            <a:r>
+              <a:rPr lang="en-US" dirty="0"/>
+              <a:t>From retail to buying in bulk…</a:t>
+            </a:r>
+          </a:p>
+        </p:txBody>
+      </p:sp>
+      <p:sp>
+        <p:nvSpPr>
+          <p:cNvPr id="3" name="Content Placeholder 2">
+            <a:extLst>
+              <a:ext uri="{FF2B5EF4-FFF2-40B4-BE49-F238E27FC236}">
+                <a16:creationId xmlns:a16="http://schemas.microsoft.com/office/drawing/2014/main" id="{7CBE18E6-3DB3-585A-A7CA-B43607C969DC}"/>
+              </a:ext>
+            </a:extLst>
+          </p:cNvPr>
+          <p:cNvSpPr>
+            <a:spLocks noGrp="1"/>
+          </p:cNvSpPr>
+          <p:nvPr>
+            <p:ph idx="1"/>
+          </p:nvPr>
+        </p:nvSpPr>
+        <p:spPr/>
+        <p:txBody>
+          <a:bodyPr/>
+          <a:lstStyle/>
+          <a:p>
+            <a:endParaRPr lang="en-US"/>
+          </a:p>
+        </p:txBody>
+      </p:sp>
+    </p:spTree>
+    <p:extLst>
+      <p:ext uri="{BB962C8B-B14F-4D97-AF65-F5344CB8AC3E}">
+        <p14:creationId xmlns:p14="http://schemas.microsoft.com/office/powerpoint/2010/main" val="538221144"/>
+      </p:ext>
+    </p:extLst>
+  </p:cSld>
+  <p:clrMapOvr>
+    <a:masterClrMapping/>
+  </p:clrMapOvr>
+</p:sld>
+</file>
+
+<file path=ppt/slides/slide23.xml><?xml version="1.0" encoding="utf-8"?>
+<p:sld xmlns:a="http://schemas.openxmlformats.org/drawingml/2006/main" xmlns:r="http://schemas.openxmlformats.org/officeDocument/2006/relationships" xmlns:p="http://schemas.openxmlformats.org/presentationml/2006/main">
+  <p:cSld>
+    <p:spTree>
+      <p:nvGrpSpPr>
+        <p:cNvPr id="1" name=""/>
+        <p:cNvGrpSpPr/>
+        <p:nvPr/>
+      </p:nvGrpSpPr>
+      <p:grpSpPr>
+        <a:xfrm>
+          <a:off x="0" y="0"/>
+          <a:ext cx="0" cy="0"/>
+          <a:chOff x="0" y="0"/>
+          <a:chExt cx="0" cy="0"/>
+        </a:xfrm>
+      </p:grpSpPr>
+      <p:sp>
+        <p:nvSpPr>
+          <p:cNvPr id="2" name="Title 1">
+            <a:extLst>
+              <a:ext uri="{FF2B5EF4-FFF2-40B4-BE49-F238E27FC236}">
+                <a16:creationId xmlns:a16="http://schemas.microsoft.com/office/drawing/2014/main" id="{1DC5880F-8E65-EA3A-86E0-927CA442F637}"/>
+              </a:ext>
+            </a:extLst>
+          </p:cNvPr>
+          <p:cNvSpPr>
+            <a:spLocks noGrp="1"/>
+          </p:cNvSpPr>
+          <p:nvPr>
+            <p:ph type="title"/>
+          </p:nvPr>
+        </p:nvSpPr>
+        <p:spPr/>
+        <p:txBody>
+          <a:bodyPr/>
+          <a:lstStyle/>
+          <a:p>
+            <a:r>
+              <a:rPr lang="en-US" dirty="0"/>
+              <a:t>Dealing with ”large" amounts</a:t>
+            </a:r>
+            <a:br>
+              <a:rPr lang="en-US" dirty="0"/>
+            </a:br>
+            <a:r>
+              <a:rPr lang="en-US" dirty="0"/>
+              <a:t>…to labor costs</a:t>
+            </a:r>
+          </a:p>
+        </p:txBody>
+      </p:sp>
+      <p:sp>
+        <p:nvSpPr>
+          <p:cNvPr id="3" name="Content Placeholder 2">
+            <a:extLst>
+              <a:ext uri="{FF2B5EF4-FFF2-40B4-BE49-F238E27FC236}">
+                <a16:creationId xmlns:a16="http://schemas.microsoft.com/office/drawing/2014/main" id="{7CBE18E6-3DB3-585A-A7CA-B43607C969DC}"/>
+              </a:ext>
+            </a:extLst>
+          </p:cNvPr>
+          <p:cNvSpPr>
+            <a:spLocks noGrp="1"/>
+          </p:cNvSpPr>
+          <p:nvPr>
+            <p:ph idx="1"/>
+          </p:nvPr>
+        </p:nvSpPr>
+        <p:spPr/>
+        <p:txBody>
+          <a:bodyPr/>
+          <a:lstStyle/>
+          <a:p>
+            <a:endParaRPr lang="en-US"/>
+          </a:p>
+        </p:txBody>
+      </p:sp>
+    </p:spTree>
+    <p:extLst>
+      <p:ext uri="{BB962C8B-B14F-4D97-AF65-F5344CB8AC3E}">
+        <p14:creationId xmlns:p14="http://schemas.microsoft.com/office/powerpoint/2010/main" val="2006387642"/>
+      </p:ext>
+    </p:extLst>
+  </p:cSld>
+  <p:clrMapOvr>
+    <a:masterClrMapping/>
+  </p:clrMapOvr>
+</p:sld>
+</file>
+
+<file path=ppt/slides/slide24.xml><?xml version="1.0" encoding="utf-8"?>
+<p:sld xmlns:a="http://schemas.openxmlformats.org/drawingml/2006/main" xmlns:r="http://schemas.openxmlformats.org/officeDocument/2006/relationships" xmlns:p="http://schemas.openxmlformats.org/presentationml/2006/main">
+  <p:cSld>
+    <p:spTree>
+      <p:nvGrpSpPr>
+        <p:cNvPr id="1" name=""/>
+        <p:cNvGrpSpPr/>
+        <p:nvPr/>
+      </p:nvGrpSpPr>
+      <p:grpSpPr>
+        <a:xfrm>
+          <a:off x="0" y="0"/>
+          <a:ext cx="0" cy="0"/>
+          <a:chOff x="0" y="0"/>
+          <a:chExt cx="0" cy="0"/>
+        </a:xfrm>
+      </p:grpSpPr>
+      <p:sp>
+        <p:nvSpPr>
+          <p:cNvPr id="2" name="Title 1">
+            <a:extLst>
+              <a:ext uri="{FF2B5EF4-FFF2-40B4-BE49-F238E27FC236}">
+                <a16:creationId xmlns:a16="http://schemas.microsoft.com/office/drawing/2014/main" id="{7306C212-B3B4-8E92-B9B3-B626EF37EBA4}"/>
+              </a:ext>
+            </a:extLst>
+          </p:cNvPr>
+          <p:cNvSpPr txBox="1">
+            <a:spLocks noGrp="1"/>
+          </p:cNvSpPr>
+          <p:nvPr>
+            <p:ph type="title" idx="4294967295"/>
+          </p:nvPr>
+        </p:nvSpPr>
+        <p:spPr>
+          <a:xfrm>
+            <a:off x="1061794" y="2274838"/>
+            <a:ext cx="10068412" cy="2308324"/>
+          </a:xfrm>
+          <a:prstGeom prst="rect">
+            <a:avLst/>
+          </a:prstGeom>
+          <a:noFill/>
+          <a:ln>
+            <a:noFill/>
+            <a:prstDash/>
+          </a:ln>
+          <a:effectLst/>
+        </p:spPr>
+        <p:txBody>
+          <a:bodyPr rot="0" spcFirstLastPara="0" vertOverflow="overflow" horzOverflow="overflow" vert="horz" wrap="square" lIns="91440" tIns="45720" rIns="91440" bIns="45720" numCol="1" spcCol="0" rtlCol="0" fromWordArt="0" anchor="t" anchorCtr="0" forceAA="0" compatLnSpc="1">
+            <a:prstTxWarp prst="textNoShape">
+              <a:avLst/>
+            </a:prstTxWarp>
+            <a:spAutoFit/>
+          </a:bodyPr>
+          <a:lstStyle/>
+          <a:p>
+            <a:pPr marL="0" marR="0" lvl="0" indent="0" algn="ctr" defTabSz="457200" rtl="0" eaLnBrk="1" fontAlgn="auto" latinLnBrk="0" hangingPunct="1">
+              <a:lnSpc>
+                <a:spcPct val="100000"/>
+              </a:lnSpc>
+              <a:spcBef>
+                <a:spcPts val="0"/>
+              </a:spcBef>
+              <a:spcAft>
+                <a:spcPts val="0"/>
+              </a:spcAft>
+              <a:buClrTx/>
+              <a:buSzTx/>
+              <a:buFontTx/>
+              <a:buNone/>
+              <a:tabLst/>
+              <a:defRPr/>
+            </a:pPr>
+            <a:r>
+              <a:rPr kumimoji="0" lang="en-US" sz="7200" b="0" i="0" u="none" strike="noStrike" kern="1200" cap="none" spc="0" normalizeH="0" baseline="0" noProof="0" dirty="0">
+                <a:ln>
+                  <a:noFill/>
+                </a:ln>
+                <a:solidFill>
+                  <a:schemeClr val="tx1"/>
+                </a:solidFill>
+                <a:effectLst/>
+                <a:uLnTx/>
+                <a:uFillTx/>
+                <a:latin typeface="+mn-lt"/>
+                <a:ea typeface="+mn-ea"/>
+                <a:cs typeface="+mn-cs"/>
+              </a:rPr>
+              <a:t>Reaching the next level</a:t>
+            </a:r>
+          </a:p>
+        </p:txBody>
+      </p:sp>
+    </p:spTree>
+    <p:extLst>
+      <p:ext uri="{BB962C8B-B14F-4D97-AF65-F5344CB8AC3E}">
+        <p14:creationId xmlns:p14="http://schemas.microsoft.com/office/powerpoint/2010/main" val="304747598"/>
+      </p:ext>
+    </p:extLst>
+  </p:cSld>
+  <p:clrMapOvr>
+    <a:masterClrMapping/>
+  </p:clrMapOvr>
+</p:sld>
+</file>
+
+<file path=ppt/slides/slide25.xml><?xml version="1.0" encoding="utf-8"?>
+<p:sld xmlns:a="http://schemas.openxmlformats.org/drawingml/2006/main" xmlns:r="http://schemas.openxmlformats.org/officeDocument/2006/relationships" xmlns:p="http://schemas.openxmlformats.org/presentationml/2006/main">
+  <p:cSld>
+    <p:spTree>
+      <p:nvGrpSpPr>
+        <p:cNvPr id="1" name=""/>
+        <p:cNvGrpSpPr/>
+        <p:nvPr/>
+      </p:nvGrpSpPr>
+      <p:grpSpPr>
+        <a:xfrm>
+          <a:off x="0" y="0"/>
+          <a:ext cx="0" cy="0"/>
+          <a:chOff x="0" y="0"/>
+          <a:chExt cx="0" cy="0"/>
+        </a:xfrm>
+      </p:grpSpPr>
+      <p:sp>
+        <p:nvSpPr>
+          <p:cNvPr id="2" name="Title 1">
+            <a:extLst>
+              <a:ext uri="{FF2B5EF4-FFF2-40B4-BE49-F238E27FC236}">
+                <a16:creationId xmlns:a16="http://schemas.microsoft.com/office/drawing/2014/main" id="{A7CE3666-0251-236D-2C10-050AED8D53F0}"/>
+              </a:ext>
+            </a:extLst>
+          </p:cNvPr>
+          <p:cNvSpPr>
+            <a:spLocks noGrp="1"/>
+          </p:cNvSpPr>
+          <p:nvPr>
+            <p:ph type="title"/>
+          </p:nvPr>
+        </p:nvSpPr>
+        <p:spPr/>
+        <p:txBody>
+          <a:bodyPr/>
+          <a:lstStyle/>
+          <a:p>
+            <a:r>
+              <a:rPr lang="en-US" dirty="0"/>
+              <a:t>Reaching the next level</a:t>
+            </a:r>
+            <a:br>
+              <a:rPr lang="en-US" dirty="0"/>
+            </a:br>
+            <a:r>
+              <a:rPr lang="en-US" dirty="0"/>
+              <a:t>…of what?</a:t>
+            </a:r>
+          </a:p>
+        </p:txBody>
+      </p:sp>
+      <p:sp>
+        <p:nvSpPr>
+          <p:cNvPr id="3" name="Content Placeholder 2">
+            <a:extLst>
+              <a:ext uri="{FF2B5EF4-FFF2-40B4-BE49-F238E27FC236}">
+                <a16:creationId xmlns:a16="http://schemas.microsoft.com/office/drawing/2014/main" id="{93C949C0-C922-F73D-03DA-51170B99EFF3}"/>
+              </a:ext>
+            </a:extLst>
+          </p:cNvPr>
+          <p:cNvSpPr>
+            <a:spLocks noGrp="1"/>
+          </p:cNvSpPr>
+          <p:nvPr>
+            <p:ph idx="1"/>
+          </p:nvPr>
+        </p:nvSpPr>
+        <p:spPr/>
+        <p:txBody>
+          <a:bodyPr/>
+          <a:lstStyle/>
+          <a:p>
+            <a:endParaRPr lang="en-US"/>
+          </a:p>
+        </p:txBody>
+      </p:sp>
+    </p:spTree>
+    <p:extLst>
+      <p:ext uri="{BB962C8B-B14F-4D97-AF65-F5344CB8AC3E}">
+        <p14:creationId xmlns:p14="http://schemas.microsoft.com/office/powerpoint/2010/main" val="17785311"/>
+      </p:ext>
+    </p:extLst>
+  </p:cSld>
+  <p:clrMapOvr>
+    <a:masterClrMapping/>
+  </p:clrMapOvr>
+</p:sld>
+</file>
+
+<file path=ppt/slides/slide26.xml><?xml version="1.0" encoding="utf-8"?>
+<p:sld xmlns:a="http://schemas.openxmlformats.org/drawingml/2006/main" xmlns:r="http://schemas.openxmlformats.org/officeDocument/2006/relationships" xmlns:p="http://schemas.openxmlformats.org/presentationml/2006/main">
+  <p:cSld>
+    <p:spTree>
+      <p:nvGrpSpPr>
+        <p:cNvPr id="1" name=""/>
+        <p:cNvGrpSpPr/>
+        <p:nvPr/>
+      </p:nvGrpSpPr>
+      <p:grpSpPr>
+        <a:xfrm>
+          <a:off x="0" y="0"/>
+          <a:ext cx="0" cy="0"/>
+          <a:chOff x="0" y="0"/>
+          <a:chExt cx="0" cy="0"/>
+        </a:xfrm>
+      </p:grpSpPr>
+      <p:sp>
+        <p:nvSpPr>
+          <p:cNvPr id="2" name="Title 1">
+            <a:extLst>
+              <a:ext uri="{FF2B5EF4-FFF2-40B4-BE49-F238E27FC236}">
+                <a16:creationId xmlns:a16="http://schemas.microsoft.com/office/drawing/2014/main" id="{A7CE3666-0251-236D-2C10-050AED8D53F0}"/>
+              </a:ext>
+            </a:extLst>
+          </p:cNvPr>
+          <p:cNvSpPr>
+            <a:spLocks noGrp="1"/>
+          </p:cNvSpPr>
+          <p:nvPr>
+            <p:ph type="title"/>
+          </p:nvPr>
+        </p:nvSpPr>
+        <p:spPr/>
+        <p:txBody>
+          <a:bodyPr/>
+          <a:lstStyle/>
+          <a:p>
+            <a:r>
+              <a:rPr lang="en-US" dirty="0"/>
+              <a:t>Reaching the next level</a:t>
+            </a:r>
+            <a:br>
+              <a:rPr lang="en-US" dirty="0"/>
+            </a:br>
+            <a:r>
+              <a:rPr lang="en-US" dirty="0"/>
+              <a:t>More reading and courses!</a:t>
+            </a:r>
+          </a:p>
+        </p:txBody>
+      </p:sp>
+      <p:sp>
+        <p:nvSpPr>
+          <p:cNvPr id="3" name="Content Placeholder 2">
+            <a:extLst>
+              <a:ext uri="{FF2B5EF4-FFF2-40B4-BE49-F238E27FC236}">
+                <a16:creationId xmlns:a16="http://schemas.microsoft.com/office/drawing/2014/main" id="{93C949C0-C922-F73D-03DA-51170B99EFF3}"/>
+              </a:ext>
+            </a:extLst>
+          </p:cNvPr>
+          <p:cNvSpPr>
+            <a:spLocks noGrp="1"/>
+          </p:cNvSpPr>
+          <p:nvPr>
+            <p:ph idx="1"/>
+          </p:nvPr>
+        </p:nvSpPr>
+        <p:spPr/>
+        <p:txBody>
+          <a:bodyPr/>
+          <a:lstStyle/>
+          <a:p>
+            <a:endParaRPr lang="en-US"/>
+          </a:p>
+        </p:txBody>
+      </p:sp>
+    </p:spTree>
+    <p:extLst>
+      <p:ext uri="{BB962C8B-B14F-4D97-AF65-F5344CB8AC3E}">
+        <p14:creationId xmlns:p14="http://schemas.microsoft.com/office/powerpoint/2010/main" val="3599055868"/>
+      </p:ext>
+    </p:extLst>
+  </p:cSld>
+  <p:clrMapOvr>
+    <a:masterClrMapping/>
+  </p:clrMapOvr>
+</p:sld>
+</file>
+
+<file path=ppt/slides/slide27.xml><?xml version="1.0" encoding="utf-8"?>
+<p:sld xmlns:a="http://schemas.openxmlformats.org/drawingml/2006/main" xmlns:r="http://schemas.openxmlformats.org/officeDocument/2006/relationships" xmlns:p="http://schemas.openxmlformats.org/presentationml/2006/main">
+  <p:cSld>
+    <p:spTree>
+      <p:nvGrpSpPr>
+        <p:cNvPr id="1" name=""/>
+        <p:cNvGrpSpPr/>
+        <p:nvPr/>
+      </p:nvGrpSpPr>
+      <p:grpSpPr>
+        <a:xfrm>
+          <a:off x="0" y="0"/>
+          <a:ext cx="0" cy="0"/>
+          <a:chOff x="0" y="0"/>
+          <a:chExt cx="0" cy="0"/>
+        </a:xfrm>
+      </p:grpSpPr>
+      <p:sp>
+        <p:nvSpPr>
+          <p:cNvPr id="2" name="Title 1">
+            <a:extLst>
+              <a:ext uri="{FF2B5EF4-FFF2-40B4-BE49-F238E27FC236}">
+                <a16:creationId xmlns:a16="http://schemas.microsoft.com/office/drawing/2014/main" id="{A7CE3666-0251-236D-2C10-050AED8D53F0}"/>
+              </a:ext>
+            </a:extLst>
+          </p:cNvPr>
+          <p:cNvSpPr>
+            <a:spLocks noGrp="1"/>
+          </p:cNvSpPr>
+          <p:nvPr>
+            <p:ph type="title"/>
+          </p:nvPr>
+        </p:nvSpPr>
+        <p:spPr/>
+        <p:txBody>
+          <a:bodyPr/>
+          <a:lstStyle/>
+          <a:p>
+            <a:r>
+              <a:rPr lang="en-US" dirty="0"/>
+              <a:t>Reaching the next level</a:t>
+            </a:r>
+            <a:br>
+              <a:rPr lang="en-US" dirty="0"/>
+            </a:br>
+            <a:r>
+              <a:rPr lang="en-US" dirty="0"/>
+              <a:t>Formal education</a:t>
+            </a:r>
+          </a:p>
+        </p:txBody>
+      </p:sp>
+      <p:sp>
+        <p:nvSpPr>
+          <p:cNvPr id="3" name="Content Placeholder 2">
+            <a:extLst>
+              <a:ext uri="{FF2B5EF4-FFF2-40B4-BE49-F238E27FC236}">
+                <a16:creationId xmlns:a16="http://schemas.microsoft.com/office/drawing/2014/main" id="{93C949C0-C922-F73D-03DA-51170B99EFF3}"/>
+              </a:ext>
+            </a:extLst>
+          </p:cNvPr>
+          <p:cNvSpPr>
+            <a:spLocks noGrp="1"/>
+          </p:cNvSpPr>
+          <p:nvPr>
+            <p:ph idx="1"/>
+          </p:nvPr>
+        </p:nvSpPr>
+        <p:spPr/>
+        <p:txBody>
+          <a:bodyPr/>
+          <a:lstStyle/>
+          <a:p>
+            <a:endParaRPr lang="en-US"/>
+          </a:p>
+        </p:txBody>
+      </p:sp>
+    </p:spTree>
+    <p:extLst>
+      <p:ext uri="{BB962C8B-B14F-4D97-AF65-F5344CB8AC3E}">
+        <p14:creationId xmlns:p14="http://schemas.microsoft.com/office/powerpoint/2010/main" val="635686712"/>
+      </p:ext>
+    </p:extLst>
+  </p:cSld>
+  <p:clrMapOvr>
+    <a:masterClrMapping/>
+  </p:clrMapOvr>
+</p:sld>
+</file>
+
+<file path=ppt/slides/slide28.xml><?xml version="1.0" encoding="utf-8"?>
+<p:sld xmlns:a="http://schemas.openxmlformats.org/drawingml/2006/main" xmlns:r="http://schemas.openxmlformats.org/officeDocument/2006/relationships" xmlns:p="http://schemas.openxmlformats.org/presentationml/2006/main">
+  <p:cSld>
+    <p:spTree>
+      <p:nvGrpSpPr>
+        <p:cNvPr id="1" name=""/>
+        <p:cNvGrpSpPr/>
+        <p:nvPr/>
+      </p:nvGrpSpPr>
+      <p:grpSpPr>
+        <a:xfrm>
+          <a:off x="0" y="0"/>
+          <a:ext cx="0" cy="0"/>
+          <a:chOff x="0" y="0"/>
+          <a:chExt cx="0" cy="0"/>
+        </a:xfrm>
+      </p:grpSpPr>
+      <p:sp>
+        <p:nvSpPr>
+          <p:cNvPr id="2" name="Title 1">
+            <a:extLst>
+              <a:ext uri="{FF2B5EF4-FFF2-40B4-BE49-F238E27FC236}">
+                <a16:creationId xmlns:a16="http://schemas.microsoft.com/office/drawing/2014/main" id="{7306C212-B3B4-8E92-B9B3-B626EF37EBA4}"/>
+              </a:ext>
+            </a:extLst>
+          </p:cNvPr>
+          <p:cNvSpPr txBox="1">
+            <a:spLocks noGrp="1"/>
+          </p:cNvSpPr>
+          <p:nvPr>
+            <p:ph type="title" idx="4294967295"/>
+          </p:nvPr>
+        </p:nvSpPr>
+        <p:spPr>
+          <a:xfrm>
+            <a:off x="1061794" y="2828836"/>
+            <a:ext cx="10068412" cy="1200329"/>
+          </a:xfrm>
+          <a:prstGeom prst="rect">
+            <a:avLst/>
+          </a:prstGeom>
+          <a:noFill/>
+          <a:ln>
+            <a:noFill/>
+            <a:prstDash/>
+          </a:ln>
+          <a:effectLst/>
+        </p:spPr>
+        <p:txBody>
+          <a:bodyPr rot="0" spcFirstLastPara="0" vertOverflow="overflow" horzOverflow="overflow" vert="horz" wrap="square" lIns="91440" tIns="45720" rIns="91440" bIns="45720" numCol="1" spcCol="0" rtlCol="0" fromWordArt="0" anchor="t" anchorCtr="0" forceAA="0" compatLnSpc="1">
+            <a:prstTxWarp prst="textNoShape">
+              <a:avLst/>
+            </a:prstTxWarp>
+            <a:spAutoFit/>
+          </a:bodyPr>
+          <a:lstStyle/>
+          <a:p>
+            <a:pPr marL="0" marR="0" lvl="0" indent="0" algn="ctr" defTabSz="457200" rtl="0" eaLnBrk="1" fontAlgn="auto" latinLnBrk="0" hangingPunct="1">
+              <a:lnSpc>
+                <a:spcPct val="100000"/>
+              </a:lnSpc>
+              <a:spcBef>
+                <a:spcPts val="0"/>
+              </a:spcBef>
+              <a:spcAft>
+                <a:spcPts val="0"/>
+              </a:spcAft>
+              <a:buClrTx/>
+              <a:buSzTx/>
+              <a:buFontTx/>
+              <a:buNone/>
+              <a:tabLst/>
+              <a:defRPr/>
+            </a:pPr>
+            <a:r>
+              <a:rPr kumimoji="0" lang="en-US" sz="7200" b="0" i="0" u="none" strike="noStrike" kern="1200" cap="none" spc="0" normalizeH="0" baseline="0" noProof="0" dirty="0">
+                <a:ln>
+                  <a:noFill/>
+                </a:ln>
+                <a:solidFill>
+                  <a:schemeClr val="tx1"/>
+                </a:solidFill>
+                <a:effectLst/>
+                <a:uLnTx/>
+                <a:uFillTx/>
+                <a:latin typeface="+mn-lt"/>
+                <a:ea typeface="+mn-ea"/>
+                <a:cs typeface="+mn-cs"/>
+              </a:rPr>
+              <a:t>Questions?</a:t>
+            </a:r>
+          </a:p>
+        </p:txBody>
+      </p:sp>
+      <p:pic>
+        <p:nvPicPr>
+          <p:cNvPr id="9" name="Picture 8" descr="GitHub">
+            <a:extLst>
+              <a:ext uri="{FF2B5EF4-FFF2-40B4-BE49-F238E27FC236}">
+                <a16:creationId xmlns:a16="http://schemas.microsoft.com/office/drawing/2014/main" id="{D413AEAD-8A92-6186-D075-5F3D3F946656}"/>
+              </a:ext>
+            </a:extLst>
+          </p:cNvPr>
+          <p:cNvPicPr>
+            <a:picLocks noChangeAspect="1"/>
+          </p:cNvPicPr>
+          <p:nvPr/>
+        </p:nvPicPr>
+        <p:blipFill>
+          <a:blip r:embed="rId2">
+            <a:extLst>
+              <a:ext uri="{28A0092B-C50C-407E-A947-70E740481C1C}">
+                <a14:useLocalDpi xmlns:a14="http://schemas.microsoft.com/office/drawing/2010/main" val="0"/>
+              </a:ext>
+            </a:extLst>
+          </a:blip>
+          <a:stretch>
+            <a:fillRect/>
+          </a:stretch>
+        </p:blipFill>
+        <p:spPr>
+          <a:xfrm>
+            <a:off x="457200" y="5303520"/>
+            <a:ext cx="274320" cy="274320"/>
+          </a:xfrm>
+          <a:prstGeom prst="rect">
+            <a:avLst/>
+          </a:prstGeom>
+        </p:spPr>
+      </p:pic>
+      <p:sp>
+        <p:nvSpPr>
+          <p:cNvPr id="10" name="TextBox 9">
+            <a:extLst>
+              <a:ext uri="{FF2B5EF4-FFF2-40B4-BE49-F238E27FC236}">
+                <a16:creationId xmlns:a16="http://schemas.microsoft.com/office/drawing/2014/main" id="{888E3480-3A92-8D18-6D43-A59A2C6A1260}"/>
+              </a:ext>
+            </a:extLst>
+          </p:cNvPr>
+          <p:cNvSpPr txBox="1"/>
+          <p:nvPr/>
+        </p:nvSpPr>
+        <p:spPr>
+          <a:xfrm>
+            <a:off x="800098" y="5247459"/>
+            <a:ext cx="3457641" cy="400110"/>
+          </a:xfrm>
+          <a:prstGeom prst="rect">
+            <a:avLst/>
+          </a:prstGeom>
+          <a:noFill/>
+        </p:spPr>
+        <p:txBody>
+          <a:bodyPr wrap="square" rtlCol="0">
+            <a:spAutoFit/>
+          </a:bodyPr>
+          <a:lstStyle/>
+          <a:p>
+            <a:r>
+              <a:rPr lang="en-US" sz="2000" dirty="0" err="1"/>
+              <a:t>dennisdietrich</a:t>
+            </a:r>
+            <a:endParaRPr lang="en-US" sz="2000" dirty="0"/>
+          </a:p>
+        </p:txBody>
+      </p:sp>
+      <p:pic>
+        <p:nvPicPr>
+          <p:cNvPr id="11" name="Picture 10" descr="LinkedIn">
+            <a:extLst>
+              <a:ext uri="{FF2B5EF4-FFF2-40B4-BE49-F238E27FC236}">
+                <a16:creationId xmlns:a16="http://schemas.microsoft.com/office/drawing/2014/main" id="{5498B0FC-EAA9-1A93-9862-02CC73B5EEE3}"/>
+              </a:ext>
+            </a:extLst>
+          </p:cNvPr>
+          <p:cNvPicPr>
+            <a:picLocks noChangeAspect="1"/>
+          </p:cNvPicPr>
+          <p:nvPr/>
+        </p:nvPicPr>
+        <p:blipFill>
+          <a:blip r:embed="rId3">
+            <a:extLst>
+              <a:ext uri="{28A0092B-C50C-407E-A947-70E740481C1C}">
+                <a14:useLocalDpi xmlns:a14="http://schemas.microsoft.com/office/drawing/2010/main" val="0"/>
+              </a:ext>
+            </a:extLst>
+          </a:blip>
+          <a:stretch>
+            <a:fillRect/>
+          </a:stretch>
+        </p:blipFill>
+        <p:spPr>
+          <a:xfrm>
+            <a:off x="457200" y="5715000"/>
+            <a:ext cx="274320" cy="274320"/>
+          </a:xfrm>
+          <a:prstGeom prst="rect">
+            <a:avLst/>
+          </a:prstGeom>
+        </p:spPr>
+      </p:pic>
+      <p:sp>
+        <p:nvSpPr>
+          <p:cNvPr id="12" name="TextBox 11">
+            <a:extLst>
+              <a:ext uri="{FF2B5EF4-FFF2-40B4-BE49-F238E27FC236}">
+                <a16:creationId xmlns:a16="http://schemas.microsoft.com/office/drawing/2014/main" id="{E80021A4-348A-BF7C-63BF-6C89D7630DCC}"/>
+              </a:ext>
+            </a:extLst>
+          </p:cNvPr>
+          <p:cNvSpPr txBox="1"/>
+          <p:nvPr/>
+        </p:nvSpPr>
+        <p:spPr>
+          <a:xfrm>
+            <a:off x="800099" y="5664321"/>
+            <a:ext cx="3457641" cy="400110"/>
+          </a:xfrm>
+          <a:prstGeom prst="rect">
+            <a:avLst/>
+          </a:prstGeom>
+          <a:noFill/>
+        </p:spPr>
+        <p:txBody>
+          <a:bodyPr wrap="square" rtlCol="0">
+            <a:spAutoFit/>
+          </a:bodyPr>
+          <a:lstStyle/>
+          <a:p>
+            <a:r>
+              <a:rPr lang="en-US" sz="2000" dirty="0" err="1"/>
+              <a:t>dcdietrich</a:t>
+            </a:r>
+            <a:endParaRPr lang="en-US" sz="2000" dirty="0"/>
+          </a:p>
+        </p:txBody>
+      </p:sp>
+      <p:pic>
+        <p:nvPicPr>
+          <p:cNvPr id="13" name="Graphic 12" descr="Mastodon">
+            <a:extLst>
+              <a:ext uri="{FF2B5EF4-FFF2-40B4-BE49-F238E27FC236}">
+                <a16:creationId xmlns:a16="http://schemas.microsoft.com/office/drawing/2014/main" id="{DCED133C-A505-FBA4-FD79-26B84EFC1909}"/>
+              </a:ext>
+            </a:extLst>
+          </p:cNvPr>
+          <p:cNvPicPr>
+            <a:picLocks noChangeAspect="1"/>
+          </p:cNvPicPr>
+          <p:nvPr/>
+        </p:nvPicPr>
+        <p:blipFill>
+          <a:blip r:embed="rId4">
+            <a:extLst>
+              <a:ext uri="{28A0092B-C50C-407E-A947-70E740481C1C}">
+                <a14:useLocalDpi xmlns:a14="http://schemas.microsoft.com/office/drawing/2010/main" val="0"/>
+              </a:ext>
+              <a:ext uri="{96DAC541-7B7A-43D3-8B79-37D633B846F1}">
+                <asvg:svgBlip xmlns:asvg="http://schemas.microsoft.com/office/drawing/2016/SVG/main" r:embed="rId5"/>
+              </a:ext>
+            </a:extLst>
+          </a:blip>
+          <a:stretch>
+            <a:fillRect/>
+          </a:stretch>
+        </p:blipFill>
+        <p:spPr>
+          <a:xfrm>
+            <a:off x="457200" y="6126480"/>
+            <a:ext cx="274320" cy="292855"/>
+          </a:xfrm>
+          <a:prstGeom prst="rect">
+            <a:avLst/>
+          </a:prstGeom>
+        </p:spPr>
+      </p:pic>
+      <p:sp>
+        <p:nvSpPr>
+          <p:cNvPr id="14" name="TextBox 13">
+            <a:extLst>
+              <a:ext uri="{FF2B5EF4-FFF2-40B4-BE49-F238E27FC236}">
+                <a16:creationId xmlns:a16="http://schemas.microsoft.com/office/drawing/2014/main" id="{E5813634-0CE6-B509-5B60-E9061F6A69C4}"/>
+              </a:ext>
+            </a:extLst>
+          </p:cNvPr>
+          <p:cNvSpPr txBox="1"/>
+          <p:nvPr/>
+        </p:nvSpPr>
+        <p:spPr>
+          <a:xfrm>
+            <a:off x="800100" y="6064431"/>
+            <a:ext cx="5935551" cy="400110"/>
+          </a:xfrm>
+          <a:prstGeom prst="rect">
+            <a:avLst/>
+          </a:prstGeom>
+          <a:noFill/>
+        </p:spPr>
+        <p:txBody>
+          <a:bodyPr wrap="square" rtlCol="0">
+            <a:spAutoFit/>
+          </a:bodyPr>
+          <a:lstStyle/>
+          <a:p>
+            <a:r>
+              <a:rPr lang="en-US" sz="2000" dirty="0"/>
+              <a:t>@dc@social.advancedsoftware.engineering</a:t>
+            </a:r>
+          </a:p>
+        </p:txBody>
+      </p:sp>
+    </p:spTree>
+    <p:extLst>
+      <p:ext uri="{BB962C8B-B14F-4D97-AF65-F5344CB8AC3E}">
+        <p14:creationId xmlns:p14="http://schemas.microsoft.com/office/powerpoint/2010/main" val="1870771211"/>
+      </p:ext>
+    </p:extLst>
+  </p:cSld>
+  <p:clrMapOvr>
+    <a:masterClrMapping/>
+  </p:clrMapOvr>
+</p:sld>
+</file>
+
+<file path=ppt/slides/slide29.xml><?xml version="1.0" encoding="utf-8"?>
 <p:sld xmlns:a="http://schemas.openxmlformats.org/drawingml/2006/main" xmlns:r="http://schemas.openxmlformats.org/officeDocument/2006/relationships" xmlns:p="http://schemas.openxmlformats.org/presentationml/2006/main">
   <p:cSld>
     <p:spTree>

</xml_diff>

<commit_message>
Additional slide for 'looking back'
</commit_message>
<xml_diff>
--- a/Sitting in meetings all day long.pptx
+++ b/Sitting in meetings all day long.pptx
@@ -5,7 +5,7 @@
     <p:sldMasterId id="2147483660" r:id="rId1"/>
   </p:sldMasterIdLst>
   <p:notesMasterIdLst>
-    <p:notesMasterId r:id="rId31"/>
+    <p:notesMasterId r:id="rId32"/>
   </p:notesMasterIdLst>
   <p:sldIdLst>
     <p:sldId id="256" r:id="rId2"/>
@@ -14,29 +14,30 @@
     <p:sldId id="296" r:id="rId5"/>
     <p:sldId id="297" r:id="rId6"/>
     <p:sldId id="298" r:id="rId7"/>
-    <p:sldId id="289" r:id="rId8"/>
-    <p:sldId id="299" r:id="rId9"/>
-    <p:sldId id="292" r:id="rId10"/>
-    <p:sldId id="294" r:id="rId11"/>
-    <p:sldId id="293" r:id="rId12"/>
-    <p:sldId id="300" r:id="rId13"/>
-    <p:sldId id="295" r:id="rId14"/>
-    <p:sldId id="301" r:id="rId15"/>
-    <p:sldId id="287" r:id="rId16"/>
-    <p:sldId id="305" r:id="rId17"/>
-    <p:sldId id="306" r:id="rId18"/>
-    <p:sldId id="290" r:id="rId19"/>
-    <p:sldId id="307" r:id="rId20"/>
-    <p:sldId id="308" r:id="rId21"/>
-    <p:sldId id="291" r:id="rId22"/>
-    <p:sldId id="309" r:id="rId23"/>
-    <p:sldId id="310" r:id="rId24"/>
-    <p:sldId id="288" r:id="rId25"/>
-    <p:sldId id="302" r:id="rId26"/>
-    <p:sldId id="303" r:id="rId27"/>
-    <p:sldId id="304" r:id="rId28"/>
-    <p:sldId id="284" r:id="rId29"/>
-    <p:sldId id="285" r:id="rId30"/>
+    <p:sldId id="311" r:id="rId8"/>
+    <p:sldId id="289" r:id="rId9"/>
+    <p:sldId id="299" r:id="rId10"/>
+    <p:sldId id="292" r:id="rId11"/>
+    <p:sldId id="294" r:id="rId12"/>
+    <p:sldId id="293" r:id="rId13"/>
+    <p:sldId id="300" r:id="rId14"/>
+    <p:sldId id="295" r:id="rId15"/>
+    <p:sldId id="301" r:id="rId16"/>
+    <p:sldId id="287" r:id="rId17"/>
+    <p:sldId id="305" r:id="rId18"/>
+    <p:sldId id="306" r:id="rId19"/>
+    <p:sldId id="290" r:id="rId20"/>
+    <p:sldId id="307" r:id="rId21"/>
+    <p:sldId id="308" r:id="rId22"/>
+    <p:sldId id="291" r:id="rId23"/>
+    <p:sldId id="309" r:id="rId24"/>
+    <p:sldId id="310" r:id="rId25"/>
+    <p:sldId id="288" r:id="rId26"/>
+    <p:sldId id="302" r:id="rId27"/>
+    <p:sldId id="303" r:id="rId28"/>
+    <p:sldId id="304" r:id="rId29"/>
+    <p:sldId id="284" r:id="rId30"/>
+    <p:sldId id="285" r:id="rId31"/>
   </p:sldIdLst>
   <p:sldSz cx="12192000" cy="6858000"/>
   <p:notesSz cx="6858000" cy="9144000"/>
@@ -225,7 +226,7 @@
           <a:p>
             <a:fld id="{2B6DBF41-98D5-4B29-8B81-B31614D19ACC}" type="datetimeFigureOut">
               <a:rPr lang="en-US" smtClean="0"/>
-              <a:t>3/27/24</a:t>
+              <a:t>3/29/24</a:t>
             </a:fld>
             <a:endParaRPr lang="en-US"/>
           </a:p>
@@ -710,6 +711,90 @@
 </p:notes>
 </file>
 
+<file path=ppt/notesSlides/notesSlide3.xml><?xml version="1.0" encoding="utf-8"?>
+<p:notes xmlns:a="http://schemas.openxmlformats.org/drawingml/2006/main" xmlns:r="http://schemas.openxmlformats.org/officeDocument/2006/relationships" xmlns:p="http://schemas.openxmlformats.org/presentationml/2006/main">
+  <p:cSld>
+    <p:spTree>
+      <p:nvGrpSpPr>
+        <p:cNvPr id="1" name=""/>
+        <p:cNvGrpSpPr/>
+        <p:nvPr/>
+      </p:nvGrpSpPr>
+      <p:grpSpPr>
+        <a:xfrm>
+          <a:off x="0" y="0"/>
+          <a:ext cx="0" cy="0"/>
+          <a:chOff x="0" y="0"/>
+          <a:chExt cx="0" cy="0"/>
+        </a:xfrm>
+      </p:grpSpPr>
+      <p:sp>
+        <p:nvSpPr>
+          <p:cNvPr id="2" name="Slide Image Placeholder 1"/>
+          <p:cNvSpPr>
+            <a:spLocks noGrp="1" noRot="1" noChangeAspect="1"/>
+          </p:cNvSpPr>
+          <p:nvPr>
+            <p:ph type="sldImg"/>
+          </p:nvPr>
+        </p:nvSpPr>
+        <p:spPr/>
+      </p:sp>
+      <p:sp>
+        <p:nvSpPr>
+          <p:cNvPr id="3" name="Notes Placeholder 2"/>
+          <p:cNvSpPr>
+            <a:spLocks noGrp="1"/>
+          </p:cNvSpPr>
+          <p:nvPr>
+            <p:ph type="body" idx="1"/>
+          </p:nvPr>
+        </p:nvSpPr>
+        <p:spPr/>
+        <p:txBody>
+          <a:bodyPr/>
+          <a:lstStyle/>
+          <a:p>
+            <a:endParaRPr lang="en-US" dirty="0"/>
+          </a:p>
+        </p:txBody>
+      </p:sp>
+      <p:sp>
+        <p:nvSpPr>
+          <p:cNvPr id="4" name="Slide Number Placeholder 3"/>
+          <p:cNvSpPr>
+            <a:spLocks noGrp="1"/>
+          </p:cNvSpPr>
+          <p:nvPr>
+            <p:ph type="sldNum" sz="quarter" idx="5"/>
+          </p:nvPr>
+        </p:nvSpPr>
+        <p:spPr/>
+        <p:txBody>
+          <a:bodyPr/>
+          <a:lstStyle/>
+          <a:p>
+            <a:fld id="{2B4F40D4-862D-491C-85E3-1A34EFA2BD00}" type="slidenum">
+              <a:rPr lang="en-US" smtClean="0"/>
+              <a:t>7</a:t>
+            </a:fld>
+            <a:endParaRPr lang="en-US"/>
+          </a:p>
+        </p:txBody>
+      </p:sp>
+    </p:spTree>
+    <p:extLst>
+      <p:ext uri="{BB962C8B-B14F-4D97-AF65-F5344CB8AC3E}">
+        <p14:creationId xmlns:p14="http://schemas.microsoft.com/office/powerpoint/2010/main" val="362571524"/>
+      </p:ext>
+    </p:extLst>
+  </p:cSld>
+  <p:clrMapOvr>
+    <a:masterClrMapping/>
+  </p:clrMapOvr>
+</p:notes>
+</file>
+
 <file path=ppt/slideLayouts/slideLayout1.xml><?xml version="1.0" encoding="utf-8"?>
 <p:sldLayout xmlns:a="http://schemas.openxmlformats.org/drawingml/2006/main" xmlns:r="http://schemas.openxmlformats.org/officeDocument/2006/relationships" xmlns:p="http://schemas.openxmlformats.org/presentationml/2006/main" type="title" preserve="1">
   <p:cSld name="Title Slide">
@@ -896,7 +981,7 @@
           <a:p>
             <a:fld id="{F9BC75CE-03FF-4667-898C-4C70B4392062}" type="datetimeFigureOut">
               <a:rPr lang="en-US" smtClean="0"/>
-              <a:t>3/27/24</a:t>
+              <a:t>3/29/24</a:t>
             </a:fld>
             <a:endParaRPr lang="en-US"/>
           </a:p>
@@ -1171,7 +1256,7 @@
           <a:p>
             <a:fld id="{F9BC75CE-03FF-4667-898C-4C70B4392062}" type="datetimeFigureOut">
               <a:rPr lang="en-US" smtClean="0"/>
-              <a:t>3/27/24</a:t>
+              <a:t>3/29/24</a:t>
             </a:fld>
             <a:endParaRPr lang="en-US"/>
           </a:p>
@@ -1365,7 +1450,7 @@
           <a:p>
             <a:fld id="{F9BC75CE-03FF-4667-898C-4C70B4392062}" type="datetimeFigureOut">
               <a:rPr lang="en-US" smtClean="0"/>
-              <a:t>3/27/24</a:t>
+              <a:t>3/29/24</a:t>
             </a:fld>
             <a:endParaRPr lang="en-US"/>
           </a:p>
@@ -1638,7 +1723,7 @@
           <a:p>
             <a:fld id="{F9BC75CE-03FF-4667-898C-4C70B4392062}" type="datetimeFigureOut">
               <a:rPr lang="en-US" smtClean="0"/>
-              <a:t>3/27/24</a:t>
+              <a:t>3/29/24</a:t>
             </a:fld>
             <a:endParaRPr lang="en-US"/>
           </a:p>
@@ -1979,7 +2064,7 @@
           <a:p>
             <a:fld id="{F9BC75CE-03FF-4667-898C-4C70B4392062}" type="datetimeFigureOut">
               <a:rPr lang="en-US" smtClean="0"/>
-              <a:t>3/27/24</a:t>
+              <a:t>3/29/24</a:t>
             </a:fld>
             <a:endParaRPr lang="en-US"/>
           </a:p>
@@ -2602,7 +2687,7 @@
           <a:p>
             <a:fld id="{F9BC75CE-03FF-4667-898C-4C70B4392062}" type="datetimeFigureOut">
               <a:rPr lang="en-US" smtClean="0"/>
-              <a:t>3/27/24</a:t>
+              <a:t>3/29/24</a:t>
             </a:fld>
             <a:endParaRPr lang="en-US"/>
           </a:p>
@@ -3462,7 +3547,7 @@
           <a:p>
             <a:fld id="{F9BC75CE-03FF-4667-898C-4C70B4392062}" type="datetimeFigureOut">
               <a:rPr lang="en-US" smtClean="0"/>
-              <a:t>3/27/24</a:t>
+              <a:t>3/29/24</a:t>
             </a:fld>
             <a:endParaRPr lang="en-US"/>
           </a:p>
@@ -3632,7 +3717,7 @@
           <a:p>
             <a:fld id="{F9BC75CE-03FF-4667-898C-4C70B4392062}" type="datetimeFigureOut">
               <a:rPr lang="en-US" smtClean="0"/>
-              <a:t>3/27/24</a:t>
+              <a:t>3/29/24</a:t>
             </a:fld>
             <a:endParaRPr lang="en-US"/>
           </a:p>
@@ -3812,7 +3897,7 @@
           <a:p>
             <a:fld id="{F9BC75CE-03FF-4667-898C-4C70B4392062}" type="datetimeFigureOut">
               <a:rPr lang="en-US" smtClean="0"/>
-              <a:t>3/27/24</a:t>
+              <a:t>3/29/24</a:t>
             </a:fld>
             <a:endParaRPr lang="en-US"/>
           </a:p>
@@ -3982,7 +4067,7 @@
           <a:p>
             <a:fld id="{F9BC75CE-03FF-4667-898C-4C70B4392062}" type="datetimeFigureOut">
               <a:rPr lang="en-US" smtClean="0"/>
-              <a:t>3/27/24</a:t>
+              <a:t>3/29/24</a:t>
             </a:fld>
             <a:endParaRPr lang="en-US"/>
           </a:p>
@@ -4229,7 +4314,7 @@
           <a:p>
             <a:fld id="{F9BC75CE-03FF-4667-898C-4C70B4392062}" type="datetimeFigureOut">
               <a:rPr lang="en-US" smtClean="0"/>
-              <a:t>3/27/24</a:t>
+              <a:t>3/29/24</a:t>
             </a:fld>
             <a:endParaRPr lang="en-US"/>
           </a:p>
@@ -4521,7 +4606,7 @@
           <a:p>
             <a:fld id="{F9BC75CE-03FF-4667-898C-4C70B4392062}" type="datetimeFigureOut">
               <a:rPr lang="en-US" smtClean="0"/>
-              <a:t>3/27/24</a:t>
+              <a:t>3/29/24</a:t>
             </a:fld>
             <a:endParaRPr lang="en-US"/>
           </a:p>
@@ -4965,7 +5050,7 @@
           <a:p>
             <a:fld id="{F9BC75CE-03FF-4667-898C-4C70B4392062}" type="datetimeFigureOut">
               <a:rPr lang="en-US" smtClean="0"/>
-              <a:t>3/27/24</a:t>
+              <a:t>3/29/24</a:t>
             </a:fld>
             <a:endParaRPr lang="en-US"/>
           </a:p>
@@ -5083,7 +5168,7 @@
           <a:p>
             <a:fld id="{F9BC75CE-03FF-4667-898C-4C70B4392062}" type="datetimeFigureOut">
               <a:rPr lang="en-US" smtClean="0"/>
-              <a:t>3/27/24</a:t>
+              <a:t>3/29/24</a:t>
             </a:fld>
             <a:endParaRPr lang="en-US"/>
           </a:p>
@@ -5178,7 +5263,7 @@
           <a:p>
             <a:fld id="{F9BC75CE-03FF-4667-898C-4C70B4392062}" type="datetimeFigureOut">
               <a:rPr lang="en-US" smtClean="0"/>
-              <a:t>3/27/24</a:t>
+              <a:t>3/29/24</a:t>
             </a:fld>
             <a:endParaRPr lang="en-US"/>
           </a:p>
@@ -5457,7 +5542,7 @@
           <a:p>
             <a:fld id="{F9BC75CE-03FF-4667-898C-4C70B4392062}" type="datetimeFigureOut">
               <a:rPr lang="en-US" smtClean="0"/>
-              <a:t>3/27/24</a:t>
+              <a:t>3/29/24</a:t>
             </a:fld>
             <a:endParaRPr lang="en-US"/>
           </a:p>
@@ -5732,7 +5817,7 @@
           <a:p>
             <a:fld id="{F9BC75CE-03FF-4667-898C-4C70B4392062}" type="datetimeFigureOut">
               <a:rPr lang="en-US" smtClean="0"/>
-              <a:t>3/27/24</a:t>
+              <a:t>3/29/24</a:t>
             </a:fld>
             <a:endParaRPr lang="en-US"/>
           </a:p>
@@ -6161,7 +6246,7 @@
           <a:p>
             <a:fld id="{F9BC75CE-03FF-4667-898C-4C70B4392062}" type="datetimeFigureOut">
               <a:rPr lang="en-US" smtClean="0"/>
-              <a:t>3/27/24</a:t>
+              <a:t>3/29/24</a:t>
             </a:fld>
             <a:endParaRPr lang="en-US"/>
           </a:p>
@@ -7386,7 +7471,7 @@
             </a:br>
             <a:r>
               <a:rPr lang="en-US" dirty="0"/>
-              <a:t>Informal leadership</a:t>
+              <a:t>Definitions</a:t>
             </a:r>
           </a:p>
         </p:txBody>
@@ -7419,7 +7504,7 @@
     </p:spTree>
     <p:extLst>
       <p:ext uri="{BB962C8B-B14F-4D97-AF65-F5344CB8AC3E}">
-        <p14:creationId xmlns:p14="http://schemas.microsoft.com/office/powerpoint/2010/main" val="3080572812"/>
+        <p14:creationId xmlns:p14="http://schemas.microsoft.com/office/powerpoint/2010/main" val="2210604802"/>
       </p:ext>
     </p:extLst>
   </p:cSld>
@@ -7476,7 +7561,7 @@
             </a:br>
             <a:r>
               <a:rPr lang="en-US" dirty="0"/>
-              <a:t>Management styles</a:t>
+              <a:t>Informal leadership</a:t>
             </a:r>
           </a:p>
         </p:txBody>
@@ -7509,7 +7594,7 @@
     </p:spTree>
     <p:extLst>
       <p:ext uri="{BB962C8B-B14F-4D97-AF65-F5344CB8AC3E}">
-        <p14:creationId xmlns:p14="http://schemas.microsoft.com/office/powerpoint/2010/main" val="1634475225"/>
+        <p14:creationId xmlns:p14="http://schemas.microsoft.com/office/powerpoint/2010/main" val="3080572812"/>
       </p:ext>
     </p:extLst>
   </p:cSld>
@@ -7566,7 +7651,7 @@
             </a:br>
             <a:r>
               <a:rPr lang="en-US" dirty="0"/>
-              <a:t>About fine print</a:t>
+              <a:t>Management styles</a:t>
             </a:r>
           </a:p>
         </p:txBody>
@@ -7599,7 +7684,7 @@
     </p:spTree>
     <p:extLst>
       <p:ext uri="{BB962C8B-B14F-4D97-AF65-F5344CB8AC3E}">
-        <p14:creationId xmlns:p14="http://schemas.microsoft.com/office/powerpoint/2010/main" val="3106584548"/>
+        <p14:creationId xmlns:p14="http://schemas.microsoft.com/office/powerpoint/2010/main" val="1634475225"/>
       </p:ext>
     </p:extLst>
   </p:cSld>
@@ -7656,7 +7741,7 @@
             </a:br>
             <a:r>
               <a:rPr lang="en-US" dirty="0"/>
-              <a:t>Performance management</a:t>
+              <a:t>About fine print</a:t>
             </a:r>
           </a:p>
         </p:txBody>
@@ -7689,7 +7774,7 @@
     </p:spTree>
     <p:extLst>
       <p:ext uri="{BB962C8B-B14F-4D97-AF65-F5344CB8AC3E}">
-        <p14:creationId xmlns:p14="http://schemas.microsoft.com/office/powerpoint/2010/main" val="1181696427"/>
+        <p14:creationId xmlns:p14="http://schemas.microsoft.com/office/powerpoint/2010/main" val="3106584548"/>
       </p:ext>
     </p:extLst>
   </p:cSld>
@@ -7746,7 +7831,7 @@
             </a:br>
             <a:r>
               <a:rPr lang="en-US" dirty="0"/>
-              <a:t>Leaving your comfort zone</a:t>
+              <a:t>Performance management</a:t>
             </a:r>
           </a:p>
         </p:txBody>
@@ -7779,7 +7864,7 @@
     </p:spTree>
     <p:extLst>
       <p:ext uri="{BB962C8B-B14F-4D97-AF65-F5344CB8AC3E}">
-        <p14:creationId xmlns:p14="http://schemas.microsoft.com/office/powerpoint/2010/main" val="3764024582"/>
+        <p14:creationId xmlns:p14="http://schemas.microsoft.com/office/powerpoint/2010/main" val="1181696427"/>
       </p:ext>
     </p:extLst>
   </p:cSld>
@@ -7811,82 +7896,65 @@
           <p:cNvPr id="2" name="Title 1">
             <a:extLst>
               <a:ext uri="{FF2B5EF4-FFF2-40B4-BE49-F238E27FC236}">
-                <a16:creationId xmlns:a16="http://schemas.microsoft.com/office/drawing/2014/main" id="{7306C212-B3B4-8E92-B9B3-B626EF37EBA4}"/>
+                <a16:creationId xmlns:a16="http://schemas.microsoft.com/office/drawing/2014/main" id="{85AD860C-A17C-AE6C-22A8-9F41B0D57738}"/>
               </a:ext>
             </a:extLst>
           </p:cNvPr>
-          <p:cNvSpPr txBox="1">
-            <a:spLocks noGrp="1"/>
-          </p:cNvSpPr>
-          <p:nvPr>
-            <p:ph type="title" idx="4294967295"/>
-          </p:nvPr>
-        </p:nvSpPr>
-        <p:spPr>
-          <a:xfrm>
-            <a:off x="1061794" y="2274838"/>
-            <a:ext cx="10068412" cy="2308324"/>
-          </a:xfrm>
-          <a:prstGeom prst="rect">
-            <a:avLst/>
-          </a:prstGeom>
-          <a:noFill/>
-          <a:ln>
-            <a:noFill/>
-            <a:prstDash/>
-          </a:ln>
-          <a:effectLst/>
-        </p:spPr>
-        <p:txBody>
-          <a:bodyPr rot="0" spcFirstLastPara="0" vertOverflow="overflow" horzOverflow="overflow" vert="horz" wrap="square" lIns="91440" tIns="45720" rIns="91440" bIns="45720" numCol="1" spcCol="0" rtlCol="0" fromWordArt="0" anchor="t" anchorCtr="0" forceAA="0" compatLnSpc="1">
-            <a:prstTxWarp prst="textNoShape">
-              <a:avLst/>
-            </a:prstTxWarp>
-            <a:spAutoFit/>
-          </a:bodyPr>
-          <a:lstStyle/>
-          <a:p>
-            <a:pPr marL="0" marR="0" lvl="0" indent="0" algn="ctr" defTabSz="457200" rtl="0" eaLnBrk="1" fontAlgn="auto" latinLnBrk="0" hangingPunct="1">
-              <a:lnSpc>
-                <a:spcPct val="100000"/>
-              </a:lnSpc>
-              <a:spcBef>
-                <a:spcPts val="0"/>
-              </a:spcBef>
-              <a:spcAft>
-                <a:spcPts val="0"/>
-              </a:spcAft>
-              <a:buClrTx/>
-              <a:buSzTx/>
-              <a:buFontTx/>
-              <a:buNone/>
-              <a:tabLst/>
-              <a:defRPr/>
-            </a:pPr>
-            <a:r>
-              <a:rPr kumimoji="0" lang="en-US" sz="7200" b="0" i="0" u="none" strike="noStrike" kern="1200" cap="none" spc="0" normalizeH="0" baseline="0" noProof="0" dirty="0">
-                <a:ln>
-                  <a:noFill/>
-                </a:ln>
-                <a:solidFill>
-                  <a:schemeClr val="tx1"/>
-                </a:solidFill>
-                <a:effectLst/>
-                <a:uLnTx/>
-                <a:uFillTx/>
-                <a:latin typeface="+mn-lt"/>
-                <a:ea typeface="+mn-ea"/>
-                <a:cs typeface="+mn-cs"/>
-              </a:rPr>
-              <a:t>Lessons in communication</a:t>
-            </a:r>
+          <p:cNvSpPr>
+            <a:spLocks noGrp="1"/>
+          </p:cNvSpPr>
+          <p:nvPr>
+            <p:ph type="title"/>
+          </p:nvPr>
+        </p:nvSpPr>
+        <p:spPr/>
+        <p:txBody>
+          <a:bodyPr/>
+          <a:lstStyle/>
+          <a:p>
+            <a:r>
+              <a:rPr lang="en-US" dirty="0"/>
+              <a:t>Leadership and management</a:t>
+            </a:r>
+            <a:br>
+              <a:rPr lang="en-US" dirty="0"/>
+            </a:br>
+            <a:r>
+              <a:rPr lang="en-US" dirty="0"/>
+              <a:t>Leaving your comfort zone</a:t>
+            </a:r>
+          </a:p>
+        </p:txBody>
+      </p:sp>
+      <p:sp>
+        <p:nvSpPr>
+          <p:cNvPr id="3" name="Content Placeholder 2">
+            <a:extLst>
+              <a:ext uri="{FF2B5EF4-FFF2-40B4-BE49-F238E27FC236}">
+                <a16:creationId xmlns:a16="http://schemas.microsoft.com/office/drawing/2014/main" id="{79129D58-9DB9-FEC3-0C9D-348AAA5A68E6}"/>
+              </a:ext>
+            </a:extLst>
+          </p:cNvPr>
+          <p:cNvSpPr>
+            <a:spLocks noGrp="1"/>
+          </p:cNvSpPr>
+          <p:nvPr>
+            <p:ph idx="1"/>
+          </p:nvPr>
+        </p:nvSpPr>
+        <p:spPr/>
+        <p:txBody>
+          <a:bodyPr/>
+          <a:lstStyle/>
+          <a:p>
+            <a:endParaRPr lang="en-US"/>
           </a:p>
         </p:txBody>
       </p:sp>
     </p:spTree>
     <p:extLst>
       <p:ext uri="{BB962C8B-B14F-4D97-AF65-F5344CB8AC3E}">
-        <p14:creationId xmlns:p14="http://schemas.microsoft.com/office/powerpoint/2010/main" val="260604515"/>
+        <p14:creationId xmlns:p14="http://schemas.microsoft.com/office/powerpoint/2010/main" val="3764024582"/>
       </p:ext>
     </p:extLst>
   </p:cSld>
@@ -7918,65 +7986,82 @@
           <p:cNvPr id="2" name="Title 1">
             <a:extLst>
               <a:ext uri="{FF2B5EF4-FFF2-40B4-BE49-F238E27FC236}">
-                <a16:creationId xmlns:a16="http://schemas.microsoft.com/office/drawing/2014/main" id="{B1C169BA-9384-13A8-9DDF-F5C2403AEDE8}"/>
+                <a16:creationId xmlns:a16="http://schemas.microsoft.com/office/drawing/2014/main" id="{7306C212-B3B4-8E92-B9B3-B626EF37EBA4}"/>
               </a:ext>
             </a:extLst>
           </p:cNvPr>
-          <p:cNvSpPr>
-            <a:spLocks noGrp="1"/>
-          </p:cNvSpPr>
-          <p:nvPr>
-            <p:ph type="title"/>
-          </p:nvPr>
-        </p:nvSpPr>
-        <p:spPr/>
-        <p:txBody>
-          <a:bodyPr/>
-          <a:lstStyle/>
-          <a:p>
-            <a:r>
-              <a:rPr lang="en-US" dirty="0"/>
+          <p:cNvSpPr txBox="1">
+            <a:spLocks noGrp="1"/>
+          </p:cNvSpPr>
+          <p:nvPr>
+            <p:ph type="title" idx="4294967295"/>
+          </p:nvPr>
+        </p:nvSpPr>
+        <p:spPr>
+          <a:xfrm>
+            <a:off x="1061794" y="2274838"/>
+            <a:ext cx="10068412" cy="2308324"/>
+          </a:xfrm>
+          <a:prstGeom prst="rect">
+            <a:avLst/>
+          </a:prstGeom>
+          <a:noFill/>
+          <a:ln>
+            <a:noFill/>
+            <a:prstDash/>
+          </a:ln>
+          <a:effectLst/>
+        </p:spPr>
+        <p:txBody>
+          <a:bodyPr rot="0" spcFirstLastPara="0" vertOverflow="overflow" horzOverflow="overflow" vert="horz" wrap="square" lIns="91440" tIns="45720" rIns="91440" bIns="45720" numCol="1" spcCol="0" rtlCol="0" fromWordArt="0" anchor="t" anchorCtr="0" forceAA="0" compatLnSpc="1">
+            <a:prstTxWarp prst="textNoShape">
+              <a:avLst/>
+            </a:prstTxWarp>
+            <a:spAutoFit/>
+          </a:bodyPr>
+          <a:lstStyle/>
+          <a:p>
+            <a:pPr marL="0" marR="0" lvl="0" indent="0" algn="ctr" defTabSz="457200" rtl="0" eaLnBrk="1" fontAlgn="auto" latinLnBrk="0" hangingPunct="1">
+              <a:lnSpc>
+                <a:spcPct val="100000"/>
+              </a:lnSpc>
+              <a:spcBef>
+                <a:spcPts val="0"/>
+              </a:spcBef>
+              <a:spcAft>
+                <a:spcPts val="0"/>
+              </a:spcAft>
+              <a:buClrTx/>
+              <a:buSzTx/>
+              <a:buFontTx/>
+              <a:buNone/>
+              <a:tabLst/>
+              <a:defRPr/>
+            </a:pPr>
+            <a:r>
+              <a:rPr kumimoji="0" lang="en-US" sz="7200" b="0" i="0" u="none" strike="noStrike" kern="1200" cap="none" spc="0" normalizeH="0" baseline="0" noProof="0" dirty="0">
+                <a:ln>
+                  <a:noFill/>
+                </a:ln>
+                <a:solidFill>
+                  <a:schemeClr val="tx1"/>
+                </a:solidFill>
+                <a:effectLst/>
+                <a:uLnTx/>
+                <a:uFillTx/>
+                <a:latin typeface="+mn-lt"/>
+                <a:ea typeface="+mn-ea"/>
+                <a:cs typeface="+mn-cs"/>
+              </a:rPr>
               <a:t>Lessons in communication</a:t>
             </a:r>
-            <a:br>
-              <a:rPr lang="en-US" dirty="0"/>
-            </a:br>
-            <a:r>
-              <a:rPr lang="en-US" dirty="0"/>
-              <a:t>Reading between the lines</a:t>
-            </a:r>
-          </a:p>
-        </p:txBody>
-      </p:sp>
-      <p:sp>
-        <p:nvSpPr>
-          <p:cNvPr id="3" name="Content Placeholder 2">
-            <a:extLst>
-              <a:ext uri="{FF2B5EF4-FFF2-40B4-BE49-F238E27FC236}">
-                <a16:creationId xmlns:a16="http://schemas.microsoft.com/office/drawing/2014/main" id="{B2E99B5C-42F6-68A9-5D8C-522EA5A66EF8}"/>
-              </a:ext>
-            </a:extLst>
-          </p:cNvPr>
-          <p:cNvSpPr>
-            <a:spLocks noGrp="1"/>
-          </p:cNvSpPr>
-          <p:nvPr>
-            <p:ph idx="1"/>
-          </p:nvPr>
-        </p:nvSpPr>
-        <p:spPr/>
-        <p:txBody>
-          <a:bodyPr/>
-          <a:lstStyle/>
-          <a:p>
-            <a:endParaRPr lang="en-US"/>
           </a:p>
         </p:txBody>
       </p:sp>
     </p:spTree>
     <p:extLst>
       <p:ext uri="{BB962C8B-B14F-4D97-AF65-F5344CB8AC3E}">
-        <p14:creationId xmlns:p14="http://schemas.microsoft.com/office/powerpoint/2010/main" val="3488034133"/>
+        <p14:creationId xmlns:p14="http://schemas.microsoft.com/office/powerpoint/2010/main" val="260604515"/>
       </p:ext>
     </p:extLst>
   </p:cSld>
@@ -8033,7 +8118,7 @@
             </a:br>
             <a:r>
               <a:rPr lang="en-US" dirty="0"/>
-              <a:t>They’ll listen… to something</a:t>
+              <a:t>Reading between the lines</a:t>
             </a:r>
           </a:p>
         </p:txBody>
@@ -8066,7 +8151,7 @@
     </p:spTree>
     <p:extLst>
       <p:ext uri="{BB962C8B-B14F-4D97-AF65-F5344CB8AC3E}">
-        <p14:creationId xmlns:p14="http://schemas.microsoft.com/office/powerpoint/2010/main" val="1967002286"/>
+        <p14:creationId xmlns:p14="http://schemas.microsoft.com/office/powerpoint/2010/main" val="3488034133"/>
       </p:ext>
     </p:extLst>
   </p:cSld>
@@ -8098,82 +8183,65 @@
           <p:cNvPr id="2" name="Title 1">
             <a:extLst>
               <a:ext uri="{FF2B5EF4-FFF2-40B4-BE49-F238E27FC236}">
-                <a16:creationId xmlns:a16="http://schemas.microsoft.com/office/drawing/2014/main" id="{7306C212-B3B4-8E92-B9B3-B626EF37EBA4}"/>
+                <a16:creationId xmlns:a16="http://schemas.microsoft.com/office/drawing/2014/main" id="{B1C169BA-9384-13A8-9DDF-F5C2403AEDE8}"/>
               </a:ext>
             </a:extLst>
           </p:cNvPr>
-          <p:cNvSpPr txBox="1">
-            <a:spLocks noGrp="1"/>
-          </p:cNvSpPr>
-          <p:nvPr>
-            <p:ph type="title" idx="4294967295"/>
-          </p:nvPr>
-        </p:nvSpPr>
-        <p:spPr>
-          <a:xfrm>
-            <a:off x="1061794" y="2274838"/>
-            <a:ext cx="10068412" cy="2308324"/>
-          </a:xfrm>
-          <a:prstGeom prst="rect">
-            <a:avLst/>
-          </a:prstGeom>
-          <a:noFill/>
-          <a:ln>
-            <a:noFill/>
-            <a:prstDash/>
-          </a:ln>
-          <a:effectLst/>
-        </p:spPr>
-        <p:txBody>
-          <a:bodyPr rot="0" spcFirstLastPara="0" vertOverflow="overflow" horzOverflow="overflow" vert="horz" wrap="square" lIns="91440" tIns="45720" rIns="91440" bIns="45720" numCol="1" spcCol="0" rtlCol="0" fromWordArt="0" anchor="t" anchorCtr="0" forceAA="0" compatLnSpc="1">
-            <a:prstTxWarp prst="textNoShape">
-              <a:avLst/>
-            </a:prstTxWarp>
-            <a:spAutoFit/>
-          </a:bodyPr>
-          <a:lstStyle/>
-          <a:p>
-            <a:pPr marL="0" marR="0" lvl="0" indent="0" algn="ctr" defTabSz="457200" rtl="0" eaLnBrk="1" fontAlgn="auto" latinLnBrk="0" hangingPunct="1">
-              <a:lnSpc>
-                <a:spcPct val="100000"/>
-              </a:lnSpc>
-              <a:spcBef>
-                <a:spcPts val="0"/>
-              </a:spcBef>
-              <a:spcAft>
-                <a:spcPts val="0"/>
-              </a:spcAft>
-              <a:buClrTx/>
-              <a:buSzTx/>
-              <a:buFontTx/>
-              <a:buNone/>
-              <a:tabLst/>
-              <a:defRPr/>
-            </a:pPr>
-            <a:r>
-              <a:rPr kumimoji="0" lang="en-US" sz="7200" b="0" i="0" u="none" strike="noStrike" kern="1200" cap="none" spc="0" normalizeH="0" baseline="0" noProof="0" dirty="0">
-                <a:ln>
-                  <a:noFill/>
-                </a:ln>
-                <a:solidFill>
-                  <a:schemeClr val="tx1"/>
-                </a:solidFill>
-                <a:effectLst/>
-                <a:uLnTx/>
-                <a:uFillTx/>
-                <a:latin typeface="+mn-lt"/>
-                <a:ea typeface="+mn-ea"/>
-                <a:cs typeface="+mn-cs"/>
-              </a:rPr>
-              <a:t>Tactical and strategic staffing</a:t>
-            </a:r>
+          <p:cNvSpPr>
+            <a:spLocks noGrp="1"/>
+          </p:cNvSpPr>
+          <p:nvPr>
+            <p:ph type="title"/>
+          </p:nvPr>
+        </p:nvSpPr>
+        <p:spPr/>
+        <p:txBody>
+          <a:bodyPr/>
+          <a:lstStyle/>
+          <a:p>
+            <a:r>
+              <a:rPr lang="en-US" dirty="0"/>
+              <a:t>Lessons in communication</a:t>
+            </a:r>
+            <a:br>
+              <a:rPr lang="en-US" dirty="0"/>
+            </a:br>
+            <a:r>
+              <a:rPr lang="en-US" dirty="0"/>
+              <a:t>They’ll listen… to something</a:t>
+            </a:r>
+          </a:p>
+        </p:txBody>
+      </p:sp>
+      <p:sp>
+        <p:nvSpPr>
+          <p:cNvPr id="3" name="Content Placeholder 2">
+            <a:extLst>
+              <a:ext uri="{FF2B5EF4-FFF2-40B4-BE49-F238E27FC236}">
+                <a16:creationId xmlns:a16="http://schemas.microsoft.com/office/drawing/2014/main" id="{B2E99B5C-42F6-68A9-5D8C-522EA5A66EF8}"/>
+              </a:ext>
+            </a:extLst>
+          </p:cNvPr>
+          <p:cNvSpPr>
+            <a:spLocks noGrp="1"/>
+          </p:cNvSpPr>
+          <p:nvPr>
+            <p:ph idx="1"/>
+          </p:nvPr>
+        </p:nvSpPr>
+        <p:spPr/>
+        <p:txBody>
+          <a:bodyPr/>
+          <a:lstStyle/>
+          <a:p>
+            <a:endParaRPr lang="en-US"/>
           </a:p>
         </p:txBody>
       </p:sp>
     </p:spTree>
     <p:extLst>
       <p:ext uri="{BB962C8B-B14F-4D97-AF65-F5344CB8AC3E}">
-        <p14:creationId xmlns:p14="http://schemas.microsoft.com/office/powerpoint/2010/main" val="2515611607"/>
+        <p14:creationId xmlns:p14="http://schemas.microsoft.com/office/powerpoint/2010/main" val="1967002286"/>
       </p:ext>
     </p:extLst>
   </p:cSld>
@@ -8205,65 +8273,82 @@
           <p:cNvPr id="2" name="Title 1">
             <a:extLst>
               <a:ext uri="{FF2B5EF4-FFF2-40B4-BE49-F238E27FC236}">
-                <a16:creationId xmlns:a16="http://schemas.microsoft.com/office/drawing/2014/main" id="{4B1138EC-C228-F909-6E50-58916471968D}"/>
+                <a16:creationId xmlns:a16="http://schemas.microsoft.com/office/drawing/2014/main" id="{7306C212-B3B4-8E92-B9B3-B626EF37EBA4}"/>
               </a:ext>
             </a:extLst>
           </p:cNvPr>
-          <p:cNvSpPr>
-            <a:spLocks noGrp="1"/>
-          </p:cNvSpPr>
-          <p:nvPr>
-            <p:ph type="title"/>
-          </p:nvPr>
-        </p:nvSpPr>
-        <p:spPr/>
-        <p:txBody>
-          <a:bodyPr/>
-          <a:lstStyle/>
-          <a:p>
-            <a:r>
-              <a:rPr lang="en-US" dirty="0"/>
+          <p:cNvSpPr txBox="1">
+            <a:spLocks noGrp="1"/>
+          </p:cNvSpPr>
+          <p:nvPr>
+            <p:ph type="title" idx="4294967295"/>
+          </p:nvPr>
+        </p:nvSpPr>
+        <p:spPr>
+          <a:xfrm>
+            <a:off x="1061794" y="2274838"/>
+            <a:ext cx="10068412" cy="2308324"/>
+          </a:xfrm>
+          <a:prstGeom prst="rect">
+            <a:avLst/>
+          </a:prstGeom>
+          <a:noFill/>
+          <a:ln>
+            <a:noFill/>
+            <a:prstDash/>
+          </a:ln>
+          <a:effectLst/>
+        </p:spPr>
+        <p:txBody>
+          <a:bodyPr rot="0" spcFirstLastPara="0" vertOverflow="overflow" horzOverflow="overflow" vert="horz" wrap="square" lIns="91440" tIns="45720" rIns="91440" bIns="45720" numCol="1" spcCol="0" rtlCol="0" fromWordArt="0" anchor="t" anchorCtr="0" forceAA="0" compatLnSpc="1">
+            <a:prstTxWarp prst="textNoShape">
+              <a:avLst/>
+            </a:prstTxWarp>
+            <a:spAutoFit/>
+          </a:bodyPr>
+          <a:lstStyle/>
+          <a:p>
+            <a:pPr marL="0" marR="0" lvl="0" indent="0" algn="ctr" defTabSz="457200" rtl="0" eaLnBrk="1" fontAlgn="auto" latinLnBrk="0" hangingPunct="1">
+              <a:lnSpc>
+                <a:spcPct val="100000"/>
+              </a:lnSpc>
+              <a:spcBef>
+                <a:spcPts val="0"/>
+              </a:spcBef>
+              <a:spcAft>
+                <a:spcPts val="0"/>
+              </a:spcAft>
+              <a:buClrTx/>
+              <a:buSzTx/>
+              <a:buFontTx/>
+              <a:buNone/>
+              <a:tabLst/>
+              <a:defRPr/>
+            </a:pPr>
+            <a:r>
+              <a:rPr kumimoji="0" lang="en-US" sz="7200" b="0" i="0" u="none" strike="noStrike" kern="1200" cap="none" spc="0" normalizeH="0" baseline="0" noProof="0" dirty="0">
+                <a:ln>
+                  <a:noFill/>
+                </a:ln>
+                <a:solidFill>
+                  <a:schemeClr val="tx1"/>
+                </a:solidFill>
+                <a:effectLst/>
+                <a:uLnTx/>
+                <a:uFillTx/>
+                <a:latin typeface="+mn-lt"/>
+                <a:ea typeface="+mn-ea"/>
+                <a:cs typeface="+mn-cs"/>
+              </a:rPr>
               <a:t>Tactical and strategic staffing</a:t>
             </a:r>
-            <a:br>
-              <a:rPr lang="en-US" dirty="0"/>
-            </a:br>
-            <a:r>
-              <a:rPr lang="en-US" dirty="0"/>
-              <a:t>Tactical (short-term)</a:t>
-            </a:r>
-          </a:p>
-        </p:txBody>
-      </p:sp>
-      <p:sp>
-        <p:nvSpPr>
-          <p:cNvPr id="3" name="Content Placeholder 2">
-            <a:extLst>
-              <a:ext uri="{FF2B5EF4-FFF2-40B4-BE49-F238E27FC236}">
-                <a16:creationId xmlns:a16="http://schemas.microsoft.com/office/drawing/2014/main" id="{8EC4E523-CC9F-4A9F-C5CF-DCCEB45FA33E}"/>
-              </a:ext>
-            </a:extLst>
-          </p:cNvPr>
-          <p:cNvSpPr>
-            <a:spLocks noGrp="1"/>
-          </p:cNvSpPr>
-          <p:nvPr>
-            <p:ph idx="1"/>
-          </p:nvPr>
-        </p:nvSpPr>
-        <p:spPr/>
-        <p:txBody>
-          <a:bodyPr/>
-          <a:lstStyle/>
-          <a:p>
-            <a:endParaRPr lang="en-US"/>
           </a:p>
         </p:txBody>
       </p:sp>
     </p:spTree>
     <p:extLst>
       <p:ext uri="{BB962C8B-B14F-4D97-AF65-F5344CB8AC3E}">
-        <p14:creationId xmlns:p14="http://schemas.microsoft.com/office/powerpoint/2010/main" val="191123847"/>
+        <p14:creationId xmlns:p14="http://schemas.microsoft.com/office/powerpoint/2010/main" val="2515611607"/>
       </p:ext>
     </p:extLst>
   </p:cSld>
@@ -8763,7 +8848,7 @@
             </a:br>
             <a:r>
               <a:rPr lang="en-US" dirty="0"/>
-              <a:t>Strategic (long-term)</a:t>
+              <a:t>Tactical (short-term)</a:t>
             </a:r>
           </a:p>
         </p:txBody>
@@ -8796,7 +8881,7 @@
     </p:spTree>
     <p:extLst>
       <p:ext uri="{BB962C8B-B14F-4D97-AF65-F5344CB8AC3E}">
-        <p14:creationId xmlns:p14="http://schemas.microsoft.com/office/powerpoint/2010/main" val="1883057240"/>
+        <p14:creationId xmlns:p14="http://schemas.microsoft.com/office/powerpoint/2010/main" val="191123847"/>
       </p:ext>
     </p:extLst>
   </p:cSld>
@@ -8828,82 +8913,65 @@
           <p:cNvPr id="2" name="Title 1">
             <a:extLst>
               <a:ext uri="{FF2B5EF4-FFF2-40B4-BE49-F238E27FC236}">
-                <a16:creationId xmlns:a16="http://schemas.microsoft.com/office/drawing/2014/main" id="{7306C212-B3B4-8E92-B9B3-B626EF37EBA4}"/>
+                <a16:creationId xmlns:a16="http://schemas.microsoft.com/office/drawing/2014/main" id="{4B1138EC-C228-F909-6E50-58916471968D}"/>
               </a:ext>
             </a:extLst>
           </p:cNvPr>
-          <p:cNvSpPr txBox="1">
-            <a:spLocks noGrp="1"/>
-          </p:cNvSpPr>
-          <p:nvPr>
-            <p:ph type="title" idx="4294967295"/>
-          </p:nvPr>
-        </p:nvSpPr>
-        <p:spPr>
-          <a:xfrm>
-            <a:off x="1061794" y="2274838"/>
-            <a:ext cx="10068412" cy="2308324"/>
-          </a:xfrm>
-          <a:prstGeom prst="rect">
-            <a:avLst/>
-          </a:prstGeom>
-          <a:noFill/>
-          <a:ln>
-            <a:noFill/>
-            <a:prstDash/>
-          </a:ln>
-          <a:effectLst/>
-        </p:spPr>
-        <p:txBody>
-          <a:bodyPr rot="0" spcFirstLastPara="0" vertOverflow="overflow" horzOverflow="overflow" vert="horz" wrap="square" lIns="91440" tIns="45720" rIns="91440" bIns="45720" numCol="1" spcCol="0" rtlCol="0" fromWordArt="0" anchor="t" anchorCtr="0" forceAA="0" compatLnSpc="1">
-            <a:prstTxWarp prst="textNoShape">
-              <a:avLst/>
-            </a:prstTxWarp>
-            <a:spAutoFit/>
-          </a:bodyPr>
-          <a:lstStyle/>
-          <a:p>
-            <a:pPr marL="0" marR="0" lvl="0" indent="0" algn="ctr" defTabSz="457200" rtl="0" eaLnBrk="1" fontAlgn="auto" latinLnBrk="0" hangingPunct="1">
-              <a:lnSpc>
-                <a:spcPct val="100000"/>
-              </a:lnSpc>
-              <a:spcBef>
-                <a:spcPts val="0"/>
-              </a:spcBef>
-              <a:spcAft>
-                <a:spcPts val="0"/>
-              </a:spcAft>
-              <a:buClrTx/>
-              <a:buSzTx/>
-              <a:buFontTx/>
-              <a:buNone/>
-              <a:tabLst/>
-              <a:defRPr/>
-            </a:pPr>
-            <a:r>
-              <a:rPr kumimoji="0" lang="en-US" sz="7200" b="0" i="0" u="none" strike="noStrike" kern="1200" cap="none" spc="0" normalizeH="0" baseline="0" noProof="0" dirty="0">
-                <a:ln>
-                  <a:noFill/>
-                </a:ln>
-                <a:solidFill>
-                  <a:schemeClr val="tx1"/>
-                </a:solidFill>
-                <a:effectLst/>
-                <a:uLnTx/>
-                <a:uFillTx/>
-                <a:latin typeface="+mn-lt"/>
-                <a:ea typeface="+mn-ea"/>
-                <a:cs typeface="+mn-cs"/>
-              </a:rPr>
-              <a:t>Dealing with ”large" amounts</a:t>
-            </a:r>
+          <p:cNvSpPr>
+            <a:spLocks noGrp="1"/>
+          </p:cNvSpPr>
+          <p:nvPr>
+            <p:ph type="title"/>
+          </p:nvPr>
+        </p:nvSpPr>
+        <p:spPr/>
+        <p:txBody>
+          <a:bodyPr/>
+          <a:lstStyle/>
+          <a:p>
+            <a:r>
+              <a:rPr lang="en-US" dirty="0"/>
+              <a:t>Tactical and strategic staffing</a:t>
+            </a:r>
+            <a:br>
+              <a:rPr lang="en-US" dirty="0"/>
+            </a:br>
+            <a:r>
+              <a:rPr lang="en-US" dirty="0"/>
+              <a:t>Strategic (long-term)</a:t>
+            </a:r>
+          </a:p>
+        </p:txBody>
+      </p:sp>
+      <p:sp>
+        <p:nvSpPr>
+          <p:cNvPr id="3" name="Content Placeholder 2">
+            <a:extLst>
+              <a:ext uri="{FF2B5EF4-FFF2-40B4-BE49-F238E27FC236}">
+                <a16:creationId xmlns:a16="http://schemas.microsoft.com/office/drawing/2014/main" id="{8EC4E523-CC9F-4A9F-C5CF-DCCEB45FA33E}"/>
+              </a:ext>
+            </a:extLst>
+          </p:cNvPr>
+          <p:cNvSpPr>
+            <a:spLocks noGrp="1"/>
+          </p:cNvSpPr>
+          <p:nvPr>
+            <p:ph idx="1"/>
+          </p:nvPr>
+        </p:nvSpPr>
+        <p:spPr/>
+        <p:txBody>
+          <a:bodyPr/>
+          <a:lstStyle/>
+          <a:p>
+            <a:endParaRPr lang="en-US"/>
           </a:p>
         </p:txBody>
       </p:sp>
     </p:spTree>
     <p:extLst>
       <p:ext uri="{BB962C8B-B14F-4D97-AF65-F5344CB8AC3E}">
-        <p14:creationId xmlns:p14="http://schemas.microsoft.com/office/powerpoint/2010/main" val="3958885873"/>
+        <p14:creationId xmlns:p14="http://schemas.microsoft.com/office/powerpoint/2010/main" val="1883057240"/>
       </p:ext>
     </p:extLst>
   </p:cSld>
@@ -8935,65 +9003,82 @@
           <p:cNvPr id="2" name="Title 1">
             <a:extLst>
               <a:ext uri="{FF2B5EF4-FFF2-40B4-BE49-F238E27FC236}">
-                <a16:creationId xmlns:a16="http://schemas.microsoft.com/office/drawing/2014/main" id="{1DC5880F-8E65-EA3A-86E0-927CA442F637}"/>
+                <a16:creationId xmlns:a16="http://schemas.microsoft.com/office/drawing/2014/main" id="{7306C212-B3B4-8E92-B9B3-B626EF37EBA4}"/>
               </a:ext>
             </a:extLst>
           </p:cNvPr>
-          <p:cNvSpPr>
-            <a:spLocks noGrp="1"/>
-          </p:cNvSpPr>
-          <p:nvPr>
-            <p:ph type="title"/>
-          </p:nvPr>
-        </p:nvSpPr>
-        <p:spPr/>
-        <p:txBody>
-          <a:bodyPr/>
-          <a:lstStyle/>
-          <a:p>
-            <a:r>
-              <a:rPr lang="en-US" dirty="0"/>
+          <p:cNvSpPr txBox="1">
+            <a:spLocks noGrp="1"/>
+          </p:cNvSpPr>
+          <p:nvPr>
+            <p:ph type="title" idx="4294967295"/>
+          </p:nvPr>
+        </p:nvSpPr>
+        <p:spPr>
+          <a:xfrm>
+            <a:off x="1061794" y="2274838"/>
+            <a:ext cx="10068412" cy="2308324"/>
+          </a:xfrm>
+          <a:prstGeom prst="rect">
+            <a:avLst/>
+          </a:prstGeom>
+          <a:noFill/>
+          <a:ln>
+            <a:noFill/>
+            <a:prstDash/>
+          </a:ln>
+          <a:effectLst/>
+        </p:spPr>
+        <p:txBody>
+          <a:bodyPr rot="0" spcFirstLastPara="0" vertOverflow="overflow" horzOverflow="overflow" vert="horz" wrap="square" lIns="91440" tIns="45720" rIns="91440" bIns="45720" numCol="1" spcCol="0" rtlCol="0" fromWordArt="0" anchor="t" anchorCtr="0" forceAA="0" compatLnSpc="1">
+            <a:prstTxWarp prst="textNoShape">
+              <a:avLst/>
+            </a:prstTxWarp>
+            <a:spAutoFit/>
+          </a:bodyPr>
+          <a:lstStyle/>
+          <a:p>
+            <a:pPr marL="0" marR="0" lvl="0" indent="0" algn="ctr" defTabSz="457200" rtl="0" eaLnBrk="1" fontAlgn="auto" latinLnBrk="0" hangingPunct="1">
+              <a:lnSpc>
+                <a:spcPct val="100000"/>
+              </a:lnSpc>
+              <a:spcBef>
+                <a:spcPts val="0"/>
+              </a:spcBef>
+              <a:spcAft>
+                <a:spcPts val="0"/>
+              </a:spcAft>
+              <a:buClrTx/>
+              <a:buSzTx/>
+              <a:buFontTx/>
+              <a:buNone/>
+              <a:tabLst/>
+              <a:defRPr/>
+            </a:pPr>
+            <a:r>
+              <a:rPr kumimoji="0" lang="en-US" sz="7200" b="0" i="0" u="none" strike="noStrike" kern="1200" cap="none" spc="0" normalizeH="0" baseline="0" noProof="0" dirty="0">
+                <a:ln>
+                  <a:noFill/>
+                </a:ln>
+                <a:solidFill>
+                  <a:schemeClr val="tx1"/>
+                </a:solidFill>
+                <a:effectLst/>
+                <a:uLnTx/>
+                <a:uFillTx/>
+                <a:latin typeface="+mn-lt"/>
+                <a:ea typeface="+mn-ea"/>
+                <a:cs typeface="+mn-cs"/>
+              </a:rPr>
               <a:t>Dealing with ”large" amounts</a:t>
             </a:r>
-            <a:br>
-              <a:rPr lang="en-US" dirty="0"/>
-            </a:br>
-            <a:r>
-              <a:rPr lang="en-US" dirty="0"/>
-              <a:t>From retail to buying in bulk…</a:t>
-            </a:r>
-          </a:p>
-        </p:txBody>
-      </p:sp>
-      <p:sp>
-        <p:nvSpPr>
-          <p:cNvPr id="3" name="Content Placeholder 2">
-            <a:extLst>
-              <a:ext uri="{FF2B5EF4-FFF2-40B4-BE49-F238E27FC236}">
-                <a16:creationId xmlns:a16="http://schemas.microsoft.com/office/drawing/2014/main" id="{7CBE18E6-3DB3-585A-A7CA-B43607C969DC}"/>
-              </a:ext>
-            </a:extLst>
-          </p:cNvPr>
-          <p:cNvSpPr>
-            <a:spLocks noGrp="1"/>
-          </p:cNvSpPr>
-          <p:nvPr>
-            <p:ph idx="1"/>
-          </p:nvPr>
-        </p:nvSpPr>
-        <p:spPr/>
-        <p:txBody>
-          <a:bodyPr/>
-          <a:lstStyle/>
-          <a:p>
-            <a:endParaRPr lang="en-US"/>
           </a:p>
         </p:txBody>
       </p:sp>
     </p:spTree>
     <p:extLst>
       <p:ext uri="{BB962C8B-B14F-4D97-AF65-F5344CB8AC3E}">
-        <p14:creationId xmlns:p14="http://schemas.microsoft.com/office/powerpoint/2010/main" val="538221144"/>
+        <p14:creationId xmlns:p14="http://schemas.microsoft.com/office/powerpoint/2010/main" val="3958885873"/>
       </p:ext>
     </p:extLst>
   </p:cSld>
@@ -9050,7 +9135,7 @@
             </a:br>
             <a:r>
               <a:rPr lang="en-US" dirty="0"/>
-              <a:t>…to labor costs</a:t>
+              <a:t>From retail to buying in bulk…</a:t>
             </a:r>
           </a:p>
         </p:txBody>
@@ -9083,7 +9168,7 @@
     </p:spTree>
     <p:extLst>
       <p:ext uri="{BB962C8B-B14F-4D97-AF65-F5344CB8AC3E}">
-        <p14:creationId xmlns:p14="http://schemas.microsoft.com/office/powerpoint/2010/main" val="2006387642"/>
+        <p14:creationId xmlns:p14="http://schemas.microsoft.com/office/powerpoint/2010/main" val="538221144"/>
       </p:ext>
     </p:extLst>
   </p:cSld>
@@ -9115,82 +9200,65 @@
           <p:cNvPr id="2" name="Title 1">
             <a:extLst>
               <a:ext uri="{FF2B5EF4-FFF2-40B4-BE49-F238E27FC236}">
-                <a16:creationId xmlns:a16="http://schemas.microsoft.com/office/drawing/2014/main" id="{7306C212-B3B4-8E92-B9B3-B626EF37EBA4}"/>
+                <a16:creationId xmlns:a16="http://schemas.microsoft.com/office/drawing/2014/main" id="{1DC5880F-8E65-EA3A-86E0-927CA442F637}"/>
               </a:ext>
             </a:extLst>
           </p:cNvPr>
-          <p:cNvSpPr txBox="1">
-            <a:spLocks noGrp="1"/>
-          </p:cNvSpPr>
-          <p:nvPr>
-            <p:ph type="title" idx="4294967295"/>
-          </p:nvPr>
-        </p:nvSpPr>
-        <p:spPr>
-          <a:xfrm>
-            <a:off x="1061794" y="2274838"/>
-            <a:ext cx="10068412" cy="2308324"/>
-          </a:xfrm>
-          <a:prstGeom prst="rect">
-            <a:avLst/>
-          </a:prstGeom>
-          <a:noFill/>
-          <a:ln>
-            <a:noFill/>
-            <a:prstDash/>
-          </a:ln>
-          <a:effectLst/>
-        </p:spPr>
-        <p:txBody>
-          <a:bodyPr rot="0" spcFirstLastPara="0" vertOverflow="overflow" horzOverflow="overflow" vert="horz" wrap="square" lIns="91440" tIns="45720" rIns="91440" bIns="45720" numCol="1" spcCol="0" rtlCol="0" fromWordArt="0" anchor="t" anchorCtr="0" forceAA="0" compatLnSpc="1">
-            <a:prstTxWarp prst="textNoShape">
-              <a:avLst/>
-            </a:prstTxWarp>
-            <a:spAutoFit/>
-          </a:bodyPr>
-          <a:lstStyle/>
-          <a:p>
-            <a:pPr marL="0" marR="0" lvl="0" indent="0" algn="ctr" defTabSz="457200" rtl="0" eaLnBrk="1" fontAlgn="auto" latinLnBrk="0" hangingPunct="1">
-              <a:lnSpc>
-                <a:spcPct val="100000"/>
-              </a:lnSpc>
-              <a:spcBef>
-                <a:spcPts val="0"/>
-              </a:spcBef>
-              <a:spcAft>
-                <a:spcPts val="0"/>
-              </a:spcAft>
-              <a:buClrTx/>
-              <a:buSzTx/>
-              <a:buFontTx/>
-              <a:buNone/>
-              <a:tabLst/>
-              <a:defRPr/>
-            </a:pPr>
-            <a:r>
-              <a:rPr kumimoji="0" lang="en-US" sz="7200" b="0" i="0" u="none" strike="noStrike" kern="1200" cap="none" spc="0" normalizeH="0" baseline="0" noProof="0" dirty="0">
-                <a:ln>
-                  <a:noFill/>
-                </a:ln>
-                <a:solidFill>
-                  <a:schemeClr val="tx1"/>
-                </a:solidFill>
-                <a:effectLst/>
-                <a:uLnTx/>
-                <a:uFillTx/>
-                <a:latin typeface="+mn-lt"/>
-                <a:ea typeface="+mn-ea"/>
-                <a:cs typeface="+mn-cs"/>
-              </a:rPr>
-              <a:t>Reaching the next level</a:t>
-            </a:r>
+          <p:cNvSpPr>
+            <a:spLocks noGrp="1"/>
+          </p:cNvSpPr>
+          <p:nvPr>
+            <p:ph type="title"/>
+          </p:nvPr>
+        </p:nvSpPr>
+        <p:spPr/>
+        <p:txBody>
+          <a:bodyPr/>
+          <a:lstStyle/>
+          <a:p>
+            <a:r>
+              <a:rPr lang="en-US" dirty="0"/>
+              <a:t>Dealing with ”large" amounts</a:t>
+            </a:r>
+            <a:br>
+              <a:rPr lang="en-US" dirty="0"/>
+            </a:br>
+            <a:r>
+              <a:rPr lang="en-US" dirty="0"/>
+              <a:t>…to labor costs</a:t>
+            </a:r>
+          </a:p>
+        </p:txBody>
+      </p:sp>
+      <p:sp>
+        <p:nvSpPr>
+          <p:cNvPr id="3" name="Content Placeholder 2">
+            <a:extLst>
+              <a:ext uri="{FF2B5EF4-FFF2-40B4-BE49-F238E27FC236}">
+                <a16:creationId xmlns:a16="http://schemas.microsoft.com/office/drawing/2014/main" id="{7CBE18E6-3DB3-585A-A7CA-B43607C969DC}"/>
+              </a:ext>
+            </a:extLst>
+          </p:cNvPr>
+          <p:cNvSpPr>
+            <a:spLocks noGrp="1"/>
+          </p:cNvSpPr>
+          <p:nvPr>
+            <p:ph idx="1"/>
+          </p:nvPr>
+        </p:nvSpPr>
+        <p:spPr/>
+        <p:txBody>
+          <a:bodyPr/>
+          <a:lstStyle/>
+          <a:p>
+            <a:endParaRPr lang="en-US"/>
           </a:p>
         </p:txBody>
       </p:sp>
     </p:spTree>
     <p:extLst>
       <p:ext uri="{BB962C8B-B14F-4D97-AF65-F5344CB8AC3E}">
-        <p14:creationId xmlns:p14="http://schemas.microsoft.com/office/powerpoint/2010/main" val="304747598"/>
+        <p14:creationId xmlns:p14="http://schemas.microsoft.com/office/powerpoint/2010/main" val="2006387642"/>
       </p:ext>
     </p:extLst>
   </p:cSld>
@@ -9222,65 +9290,82 @@
           <p:cNvPr id="2" name="Title 1">
             <a:extLst>
               <a:ext uri="{FF2B5EF4-FFF2-40B4-BE49-F238E27FC236}">
-                <a16:creationId xmlns:a16="http://schemas.microsoft.com/office/drawing/2014/main" id="{A7CE3666-0251-236D-2C10-050AED8D53F0}"/>
+                <a16:creationId xmlns:a16="http://schemas.microsoft.com/office/drawing/2014/main" id="{7306C212-B3B4-8E92-B9B3-B626EF37EBA4}"/>
               </a:ext>
             </a:extLst>
           </p:cNvPr>
-          <p:cNvSpPr>
-            <a:spLocks noGrp="1"/>
-          </p:cNvSpPr>
-          <p:nvPr>
-            <p:ph type="title"/>
-          </p:nvPr>
-        </p:nvSpPr>
-        <p:spPr/>
-        <p:txBody>
-          <a:bodyPr/>
-          <a:lstStyle/>
-          <a:p>
-            <a:r>
-              <a:rPr lang="en-US" dirty="0"/>
+          <p:cNvSpPr txBox="1">
+            <a:spLocks noGrp="1"/>
+          </p:cNvSpPr>
+          <p:nvPr>
+            <p:ph type="title" idx="4294967295"/>
+          </p:nvPr>
+        </p:nvSpPr>
+        <p:spPr>
+          <a:xfrm>
+            <a:off x="1061794" y="2274838"/>
+            <a:ext cx="10068412" cy="2308324"/>
+          </a:xfrm>
+          <a:prstGeom prst="rect">
+            <a:avLst/>
+          </a:prstGeom>
+          <a:noFill/>
+          <a:ln>
+            <a:noFill/>
+            <a:prstDash/>
+          </a:ln>
+          <a:effectLst/>
+        </p:spPr>
+        <p:txBody>
+          <a:bodyPr rot="0" spcFirstLastPara="0" vertOverflow="overflow" horzOverflow="overflow" vert="horz" wrap="square" lIns="91440" tIns="45720" rIns="91440" bIns="45720" numCol="1" spcCol="0" rtlCol="0" fromWordArt="0" anchor="t" anchorCtr="0" forceAA="0" compatLnSpc="1">
+            <a:prstTxWarp prst="textNoShape">
+              <a:avLst/>
+            </a:prstTxWarp>
+            <a:spAutoFit/>
+          </a:bodyPr>
+          <a:lstStyle/>
+          <a:p>
+            <a:pPr marL="0" marR="0" lvl="0" indent="0" algn="ctr" defTabSz="457200" rtl="0" eaLnBrk="1" fontAlgn="auto" latinLnBrk="0" hangingPunct="1">
+              <a:lnSpc>
+                <a:spcPct val="100000"/>
+              </a:lnSpc>
+              <a:spcBef>
+                <a:spcPts val="0"/>
+              </a:spcBef>
+              <a:spcAft>
+                <a:spcPts val="0"/>
+              </a:spcAft>
+              <a:buClrTx/>
+              <a:buSzTx/>
+              <a:buFontTx/>
+              <a:buNone/>
+              <a:tabLst/>
+              <a:defRPr/>
+            </a:pPr>
+            <a:r>
+              <a:rPr kumimoji="0" lang="en-US" sz="7200" b="0" i="0" u="none" strike="noStrike" kern="1200" cap="none" spc="0" normalizeH="0" baseline="0" noProof="0" dirty="0">
+                <a:ln>
+                  <a:noFill/>
+                </a:ln>
+                <a:solidFill>
+                  <a:schemeClr val="tx1"/>
+                </a:solidFill>
+                <a:effectLst/>
+                <a:uLnTx/>
+                <a:uFillTx/>
+                <a:latin typeface="+mn-lt"/>
+                <a:ea typeface="+mn-ea"/>
+                <a:cs typeface="+mn-cs"/>
+              </a:rPr>
               <a:t>Reaching the next level</a:t>
             </a:r>
-            <a:br>
-              <a:rPr lang="en-US" dirty="0"/>
-            </a:br>
-            <a:r>
-              <a:rPr lang="en-US" dirty="0"/>
-              <a:t>…of what?</a:t>
-            </a:r>
-          </a:p>
-        </p:txBody>
-      </p:sp>
-      <p:sp>
-        <p:nvSpPr>
-          <p:cNvPr id="3" name="Content Placeholder 2">
-            <a:extLst>
-              <a:ext uri="{FF2B5EF4-FFF2-40B4-BE49-F238E27FC236}">
-                <a16:creationId xmlns:a16="http://schemas.microsoft.com/office/drawing/2014/main" id="{93C949C0-C922-F73D-03DA-51170B99EFF3}"/>
-              </a:ext>
-            </a:extLst>
-          </p:cNvPr>
-          <p:cNvSpPr>
-            <a:spLocks noGrp="1"/>
-          </p:cNvSpPr>
-          <p:nvPr>
-            <p:ph idx="1"/>
-          </p:nvPr>
-        </p:nvSpPr>
-        <p:spPr/>
-        <p:txBody>
-          <a:bodyPr/>
-          <a:lstStyle/>
-          <a:p>
-            <a:endParaRPr lang="en-US"/>
           </a:p>
         </p:txBody>
       </p:sp>
     </p:spTree>
     <p:extLst>
       <p:ext uri="{BB962C8B-B14F-4D97-AF65-F5344CB8AC3E}">
-        <p14:creationId xmlns:p14="http://schemas.microsoft.com/office/powerpoint/2010/main" val="17785311"/>
+        <p14:creationId xmlns:p14="http://schemas.microsoft.com/office/powerpoint/2010/main" val="304747598"/>
       </p:ext>
     </p:extLst>
   </p:cSld>
@@ -9337,7 +9422,7 @@
             </a:br>
             <a:r>
               <a:rPr lang="en-US" dirty="0"/>
-              <a:t>More reading and courses!</a:t>
+              <a:t>…of what?</a:t>
             </a:r>
           </a:p>
         </p:txBody>
@@ -9370,7 +9455,7 @@
     </p:spTree>
     <p:extLst>
       <p:ext uri="{BB962C8B-B14F-4D97-AF65-F5344CB8AC3E}">
-        <p14:creationId xmlns:p14="http://schemas.microsoft.com/office/powerpoint/2010/main" val="3599055868"/>
+        <p14:creationId xmlns:p14="http://schemas.microsoft.com/office/powerpoint/2010/main" val="17785311"/>
       </p:ext>
     </p:extLst>
   </p:cSld>
@@ -9427,6 +9512,96 @@
             </a:br>
             <a:r>
               <a:rPr lang="en-US" dirty="0"/>
+              <a:t>More reading and courses!</a:t>
+            </a:r>
+          </a:p>
+        </p:txBody>
+      </p:sp>
+      <p:sp>
+        <p:nvSpPr>
+          <p:cNvPr id="3" name="Content Placeholder 2">
+            <a:extLst>
+              <a:ext uri="{FF2B5EF4-FFF2-40B4-BE49-F238E27FC236}">
+                <a16:creationId xmlns:a16="http://schemas.microsoft.com/office/drawing/2014/main" id="{93C949C0-C922-F73D-03DA-51170B99EFF3}"/>
+              </a:ext>
+            </a:extLst>
+          </p:cNvPr>
+          <p:cNvSpPr>
+            <a:spLocks noGrp="1"/>
+          </p:cNvSpPr>
+          <p:nvPr>
+            <p:ph idx="1"/>
+          </p:nvPr>
+        </p:nvSpPr>
+        <p:spPr/>
+        <p:txBody>
+          <a:bodyPr/>
+          <a:lstStyle/>
+          <a:p>
+            <a:endParaRPr lang="en-US"/>
+          </a:p>
+        </p:txBody>
+      </p:sp>
+    </p:spTree>
+    <p:extLst>
+      <p:ext uri="{BB962C8B-B14F-4D97-AF65-F5344CB8AC3E}">
+        <p14:creationId xmlns:p14="http://schemas.microsoft.com/office/powerpoint/2010/main" val="3599055868"/>
+      </p:ext>
+    </p:extLst>
+  </p:cSld>
+  <p:clrMapOvr>
+    <a:masterClrMapping/>
+  </p:clrMapOvr>
+</p:sld>
+</file>
+
+<file path=ppt/slides/slide28.xml><?xml version="1.0" encoding="utf-8"?>
+<p:sld xmlns:a="http://schemas.openxmlformats.org/drawingml/2006/main" xmlns:r="http://schemas.openxmlformats.org/officeDocument/2006/relationships" xmlns:p="http://schemas.openxmlformats.org/presentationml/2006/main">
+  <p:cSld>
+    <p:spTree>
+      <p:nvGrpSpPr>
+        <p:cNvPr id="1" name=""/>
+        <p:cNvGrpSpPr/>
+        <p:nvPr/>
+      </p:nvGrpSpPr>
+      <p:grpSpPr>
+        <a:xfrm>
+          <a:off x="0" y="0"/>
+          <a:ext cx="0" cy="0"/>
+          <a:chOff x="0" y="0"/>
+          <a:chExt cx="0" cy="0"/>
+        </a:xfrm>
+      </p:grpSpPr>
+      <p:sp>
+        <p:nvSpPr>
+          <p:cNvPr id="2" name="Title 1">
+            <a:extLst>
+              <a:ext uri="{FF2B5EF4-FFF2-40B4-BE49-F238E27FC236}">
+                <a16:creationId xmlns:a16="http://schemas.microsoft.com/office/drawing/2014/main" id="{A7CE3666-0251-236D-2C10-050AED8D53F0}"/>
+              </a:ext>
+            </a:extLst>
+          </p:cNvPr>
+          <p:cNvSpPr>
+            <a:spLocks noGrp="1"/>
+          </p:cNvSpPr>
+          <p:nvPr>
+            <p:ph type="title"/>
+          </p:nvPr>
+        </p:nvSpPr>
+        <p:spPr/>
+        <p:txBody>
+          <a:bodyPr/>
+          <a:lstStyle/>
+          <a:p>
+            <a:r>
+              <a:rPr lang="en-US" dirty="0"/>
+              <a:t>Reaching the next level</a:t>
+            </a:r>
+            <a:br>
+              <a:rPr lang="en-US" dirty="0"/>
+            </a:br>
+            <a:r>
+              <a:rPr lang="en-US" dirty="0"/>
               <a:t>Formal education</a:t>
             </a:r>
           </a:p>
@@ -9470,7 +9645,7 @@
 </p:sld>
 </file>
 
-<file path=ppt/slides/slide28.xml><?xml version="1.0" encoding="utf-8"?>
+<file path=ppt/slides/slide29.xml><?xml version="1.0" encoding="utf-8"?>
 <p:sld xmlns:a="http://schemas.openxmlformats.org/drawingml/2006/main" xmlns:r="http://schemas.openxmlformats.org/officeDocument/2006/relationships" xmlns:p="http://schemas.openxmlformats.org/presentationml/2006/main">
   <p:cSld>
     <p:spTree>
@@ -9795,7 +9970,114 @@
 </p:sld>
 </file>
 
-<file path=ppt/slides/slide29.xml><?xml version="1.0" encoding="utf-8"?>
+<file path=ppt/slides/slide3.xml><?xml version="1.0" encoding="utf-8"?>
+<p:sld xmlns:a="http://schemas.openxmlformats.org/drawingml/2006/main" xmlns:r="http://schemas.openxmlformats.org/officeDocument/2006/relationships" xmlns:p="http://schemas.openxmlformats.org/presentationml/2006/main">
+  <p:cSld>
+    <p:spTree>
+      <p:nvGrpSpPr>
+        <p:cNvPr id="1" name=""/>
+        <p:cNvGrpSpPr/>
+        <p:nvPr/>
+      </p:nvGrpSpPr>
+      <p:grpSpPr>
+        <a:xfrm>
+          <a:off x="0" y="0"/>
+          <a:ext cx="0" cy="0"/>
+          <a:chOff x="0" y="0"/>
+          <a:chExt cx="0" cy="0"/>
+        </a:xfrm>
+      </p:grpSpPr>
+      <p:sp>
+        <p:nvSpPr>
+          <p:cNvPr id="2" name="Title 1">
+            <a:extLst>
+              <a:ext uri="{FF2B5EF4-FFF2-40B4-BE49-F238E27FC236}">
+                <a16:creationId xmlns:a16="http://schemas.microsoft.com/office/drawing/2014/main" id="{7306C212-B3B4-8E92-B9B3-B626EF37EBA4}"/>
+              </a:ext>
+            </a:extLst>
+          </p:cNvPr>
+          <p:cNvSpPr txBox="1">
+            <a:spLocks noGrp="1"/>
+          </p:cNvSpPr>
+          <p:nvPr>
+            <p:ph type="title" idx="4294967295"/>
+          </p:nvPr>
+        </p:nvSpPr>
+        <p:spPr>
+          <a:xfrm>
+            <a:off x="1061794" y="2828836"/>
+            <a:ext cx="10068412" cy="1200329"/>
+          </a:xfrm>
+          <a:prstGeom prst="rect">
+            <a:avLst/>
+          </a:prstGeom>
+          <a:noFill/>
+          <a:ln>
+            <a:noFill/>
+            <a:prstDash/>
+          </a:ln>
+          <a:effectLst/>
+        </p:spPr>
+        <p:txBody>
+          <a:bodyPr rot="0" spcFirstLastPara="0" vertOverflow="overflow" horzOverflow="overflow" vert="horz" wrap="square" lIns="91440" tIns="45720" rIns="91440" bIns="45720" numCol="1" spcCol="0" rtlCol="0" fromWordArt="0" anchor="t" anchorCtr="0" forceAA="0" compatLnSpc="1">
+            <a:prstTxWarp prst="textNoShape">
+              <a:avLst/>
+            </a:prstTxWarp>
+            <a:spAutoFit/>
+          </a:bodyPr>
+          <a:lstStyle/>
+          <a:p>
+            <a:pPr marL="0" marR="0" lvl="0" indent="0" algn="ctr" defTabSz="457200" rtl="0" eaLnBrk="1" fontAlgn="auto" latinLnBrk="0" hangingPunct="1">
+              <a:lnSpc>
+                <a:spcPct val="100000"/>
+              </a:lnSpc>
+              <a:spcBef>
+                <a:spcPts val="0"/>
+              </a:spcBef>
+              <a:spcAft>
+                <a:spcPts val="0"/>
+              </a:spcAft>
+              <a:buClrTx/>
+              <a:buSzTx/>
+              <a:buFontTx/>
+              <a:buNone/>
+              <a:tabLst/>
+              <a:defRPr/>
+            </a:pPr>
+            <a:r>
+              <a:rPr kumimoji="0" lang="en-US" sz="7200" b="0" i="0" u="none" strike="noStrike" kern="1200" cap="none" spc="0" normalizeH="0" baseline="0" noProof="0" dirty="0">
+                <a:ln>
+                  <a:noFill/>
+                </a:ln>
+                <a:solidFill>
+                  <a:schemeClr val="tx1"/>
+                </a:solidFill>
+                <a:effectLst/>
+                <a:uLnTx/>
+                <a:uFillTx/>
+                <a:latin typeface="+mn-lt"/>
+                <a:ea typeface="+mn-ea"/>
+                <a:cs typeface="+mn-cs"/>
+              </a:rPr>
+              <a:t>Getting ready</a:t>
+            </a:r>
+          </a:p>
+        </p:txBody>
+      </p:sp>
+    </p:spTree>
+    <p:extLst>
+      <p:ext uri="{BB962C8B-B14F-4D97-AF65-F5344CB8AC3E}">
+        <p14:creationId xmlns:p14="http://schemas.microsoft.com/office/powerpoint/2010/main" val="1134924029"/>
+      </p:ext>
+    </p:extLst>
+  </p:cSld>
+  <p:clrMapOvr>
+    <a:masterClrMapping/>
+  </p:clrMapOvr>
+</p:sld>
+</file>
+
+<file path=ppt/slides/slide30.xml><?xml version="1.0" encoding="utf-8"?>
 <p:sld xmlns:a="http://schemas.openxmlformats.org/drawingml/2006/main" xmlns:r="http://schemas.openxmlformats.org/officeDocument/2006/relationships" xmlns:p="http://schemas.openxmlformats.org/presentationml/2006/main">
   <p:cSld>
     <p:spTree>
@@ -10120,113 +10402,6 @@
 </p:sld>
 </file>
 
-<file path=ppt/slides/slide3.xml><?xml version="1.0" encoding="utf-8"?>
-<p:sld xmlns:a="http://schemas.openxmlformats.org/drawingml/2006/main" xmlns:r="http://schemas.openxmlformats.org/officeDocument/2006/relationships" xmlns:p="http://schemas.openxmlformats.org/presentationml/2006/main">
-  <p:cSld>
-    <p:spTree>
-      <p:nvGrpSpPr>
-        <p:cNvPr id="1" name=""/>
-        <p:cNvGrpSpPr/>
-        <p:nvPr/>
-      </p:nvGrpSpPr>
-      <p:grpSpPr>
-        <a:xfrm>
-          <a:off x="0" y="0"/>
-          <a:ext cx="0" cy="0"/>
-          <a:chOff x="0" y="0"/>
-          <a:chExt cx="0" cy="0"/>
-        </a:xfrm>
-      </p:grpSpPr>
-      <p:sp>
-        <p:nvSpPr>
-          <p:cNvPr id="2" name="Title 1">
-            <a:extLst>
-              <a:ext uri="{FF2B5EF4-FFF2-40B4-BE49-F238E27FC236}">
-                <a16:creationId xmlns:a16="http://schemas.microsoft.com/office/drawing/2014/main" id="{7306C212-B3B4-8E92-B9B3-B626EF37EBA4}"/>
-              </a:ext>
-            </a:extLst>
-          </p:cNvPr>
-          <p:cNvSpPr txBox="1">
-            <a:spLocks noGrp="1"/>
-          </p:cNvSpPr>
-          <p:nvPr>
-            <p:ph type="title" idx="4294967295"/>
-          </p:nvPr>
-        </p:nvSpPr>
-        <p:spPr>
-          <a:xfrm>
-            <a:off x="1061794" y="2828836"/>
-            <a:ext cx="10068412" cy="1200329"/>
-          </a:xfrm>
-          <a:prstGeom prst="rect">
-            <a:avLst/>
-          </a:prstGeom>
-          <a:noFill/>
-          <a:ln>
-            <a:noFill/>
-            <a:prstDash/>
-          </a:ln>
-          <a:effectLst/>
-        </p:spPr>
-        <p:txBody>
-          <a:bodyPr rot="0" spcFirstLastPara="0" vertOverflow="overflow" horzOverflow="overflow" vert="horz" wrap="square" lIns="91440" tIns="45720" rIns="91440" bIns="45720" numCol="1" spcCol="0" rtlCol="0" fromWordArt="0" anchor="t" anchorCtr="0" forceAA="0" compatLnSpc="1">
-            <a:prstTxWarp prst="textNoShape">
-              <a:avLst/>
-            </a:prstTxWarp>
-            <a:spAutoFit/>
-          </a:bodyPr>
-          <a:lstStyle/>
-          <a:p>
-            <a:pPr marL="0" marR="0" lvl="0" indent="0" algn="ctr" defTabSz="457200" rtl="0" eaLnBrk="1" fontAlgn="auto" latinLnBrk="0" hangingPunct="1">
-              <a:lnSpc>
-                <a:spcPct val="100000"/>
-              </a:lnSpc>
-              <a:spcBef>
-                <a:spcPts val="0"/>
-              </a:spcBef>
-              <a:spcAft>
-                <a:spcPts val="0"/>
-              </a:spcAft>
-              <a:buClrTx/>
-              <a:buSzTx/>
-              <a:buFontTx/>
-              <a:buNone/>
-              <a:tabLst/>
-              <a:defRPr/>
-            </a:pPr>
-            <a:r>
-              <a:rPr kumimoji="0" lang="en-US" sz="7200" b="0" i="0" u="none" strike="noStrike" kern="1200" cap="none" spc="0" normalizeH="0" baseline="0" noProof="0" dirty="0">
-                <a:ln>
-                  <a:noFill/>
-                </a:ln>
-                <a:solidFill>
-                  <a:schemeClr val="tx1"/>
-                </a:solidFill>
-                <a:effectLst/>
-                <a:uLnTx/>
-                <a:uFillTx/>
-                <a:latin typeface="+mn-lt"/>
-                <a:ea typeface="+mn-ea"/>
-                <a:cs typeface="+mn-cs"/>
-              </a:rPr>
-              <a:t>Getting ready</a:t>
-            </a:r>
-          </a:p>
-        </p:txBody>
-      </p:sp>
-    </p:spTree>
-    <p:extLst>
-      <p:ext uri="{BB962C8B-B14F-4D97-AF65-F5344CB8AC3E}">
-        <p14:creationId xmlns:p14="http://schemas.microsoft.com/office/powerpoint/2010/main" val="1134924029"/>
-      </p:ext>
-    </p:extLst>
-  </p:cSld>
-  <p:clrMapOvr>
-    <a:masterClrMapping/>
-  </p:clrMapOvr>
-</p:sld>
-</file>
-
 <file path=ppt/slides/slide4.xml><?xml version="1.0" encoding="utf-8"?>
 <p:sld xmlns:a="http://schemas.openxmlformats.org/drawingml/2006/main" xmlns:r="http://schemas.openxmlformats.org/officeDocument/2006/relationships" xmlns:p="http://schemas.openxmlformats.org/presentationml/2006/main">
   <p:cSld>
@@ -10519,82 +10694,65 @@
           <p:cNvPr id="2" name="Title 1">
             <a:extLst>
               <a:ext uri="{FF2B5EF4-FFF2-40B4-BE49-F238E27FC236}">
-                <a16:creationId xmlns:a16="http://schemas.microsoft.com/office/drawing/2014/main" id="{7306C212-B3B4-8E92-B9B3-B626EF37EBA4}"/>
+                <a16:creationId xmlns:a16="http://schemas.microsoft.com/office/drawing/2014/main" id="{A7715CD7-1334-1E83-5DB7-96C59765D264}"/>
               </a:ext>
             </a:extLst>
           </p:cNvPr>
-          <p:cNvSpPr txBox="1">
-            <a:spLocks noGrp="1"/>
-          </p:cNvSpPr>
-          <p:nvPr>
-            <p:ph type="title" idx="4294967295"/>
-          </p:nvPr>
-        </p:nvSpPr>
-        <p:spPr>
-          <a:xfrm>
-            <a:off x="1061794" y="2274838"/>
-            <a:ext cx="10068412" cy="2308324"/>
-          </a:xfrm>
-          <a:prstGeom prst="rect">
-            <a:avLst/>
-          </a:prstGeom>
-          <a:noFill/>
-          <a:ln>
-            <a:noFill/>
-            <a:prstDash/>
-          </a:ln>
-          <a:effectLst/>
-        </p:spPr>
-        <p:txBody>
-          <a:bodyPr rot="0" spcFirstLastPara="0" vertOverflow="overflow" horzOverflow="overflow" vert="horz" wrap="square" lIns="91440" tIns="45720" rIns="91440" bIns="45720" numCol="1" spcCol="0" rtlCol="0" fromWordArt="0" anchor="t" anchorCtr="0" forceAA="0" compatLnSpc="1">
-            <a:prstTxWarp prst="textNoShape">
-              <a:avLst/>
-            </a:prstTxWarp>
-            <a:spAutoFit/>
-          </a:bodyPr>
-          <a:lstStyle/>
-          <a:p>
-            <a:pPr marL="0" marR="0" lvl="0" indent="0" algn="ctr" defTabSz="457200" rtl="0" eaLnBrk="1" fontAlgn="auto" latinLnBrk="0" hangingPunct="1">
-              <a:lnSpc>
-                <a:spcPct val="100000"/>
-              </a:lnSpc>
-              <a:spcBef>
-                <a:spcPts val="0"/>
-              </a:spcBef>
-              <a:spcAft>
-                <a:spcPts val="0"/>
-              </a:spcAft>
-              <a:buClrTx/>
-              <a:buSzTx/>
-              <a:buFontTx/>
-              <a:buNone/>
-              <a:tabLst/>
-              <a:defRPr/>
-            </a:pPr>
-            <a:r>
-              <a:rPr kumimoji="0" lang="en-US" sz="7200" b="0" i="0" u="none" strike="noStrike" kern="1200" cap="none" spc="0" normalizeH="0" baseline="0" noProof="0" dirty="0">
-                <a:ln>
-                  <a:noFill/>
-                </a:ln>
-                <a:solidFill>
-                  <a:schemeClr val="tx1"/>
-                </a:solidFill>
-                <a:effectLst/>
-                <a:uLnTx/>
-                <a:uFillTx/>
-                <a:latin typeface="+mn-lt"/>
-                <a:ea typeface="+mn-ea"/>
-                <a:cs typeface="+mn-cs"/>
-              </a:rPr>
-              <a:t>Leadership and management</a:t>
-            </a:r>
+          <p:cNvSpPr>
+            <a:spLocks noGrp="1"/>
+          </p:cNvSpPr>
+          <p:nvPr>
+            <p:ph type="title"/>
+          </p:nvPr>
+        </p:nvSpPr>
+        <p:spPr/>
+        <p:txBody>
+          <a:bodyPr/>
+          <a:lstStyle/>
+          <a:p>
+            <a:r>
+              <a:rPr lang="en-US" dirty="0"/>
+              <a:t>Getting ready</a:t>
+            </a:r>
+            <a:br>
+              <a:rPr lang="en-US" dirty="0"/>
+            </a:br>
+            <a:r>
+              <a:rPr lang="en-US" dirty="0"/>
+              <a:t>Looking back</a:t>
+            </a:r>
+          </a:p>
+        </p:txBody>
+      </p:sp>
+      <p:sp>
+        <p:nvSpPr>
+          <p:cNvPr id="3" name="Content Placeholder 2">
+            <a:extLst>
+              <a:ext uri="{FF2B5EF4-FFF2-40B4-BE49-F238E27FC236}">
+                <a16:creationId xmlns:a16="http://schemas.microsoft.com/office/drawing/2014/main" id="{23D4A86E-BB61-7BFE-7E4B-C6A5FA110605}"/>
+              </a:ext>
+            </a:extLst>
+          </p:cNvPr>
+          <p:cNvSpPr>
+            <a:spLocks noGrp="1"/>
+          </p:cNvSpPr>
+          <p:nvPr>
+            <p:ph idx="1"/>
+          </p:nvPr>
+        </p:nvSpPr>
+        <p:spPr/>
+        <p:txBody>
+          <a:bodyPr/>
+          <a:lstStyle/>
+          <a:p>
+            <a:endParaRPr lang="en-US"/>
           </a:p>
         </p:txBody>
       </p:sp>
     </p:spTree>
     <p:extLst>
       <p:ext uri="{BB962C8B-B14F-4D97-AF65-F5344CB8AC3E}">
-        <p14:creationId xmlns:p14="http://schemas.microsoft.com/office/powerpoint/2010/main" val="3940947354"/>
+        <p14:creationId xmlns:p14="http://schemas.microsoft.com/office/powerpoint/2010/main" val="3641460179"/>
       </p:ext>
     </p:extLst>
   </p:cSld>
@@ -10626,65 +10784,82 @@
           <p:cNvPr id="2" name="Title 1">
             <a:extLst>
               <a:ext uri="{FF2B5EF4-FFF2-40B4-BE49-F238E27FC236}">
-                <a16:creationId xmlns:a16="http://schemas.microsoft.com/office/drawing/2014/main" id="{85AD860C-A17C-AE6C-22A8-9F41B0D57738}"/>
+                <a16:creationId xmlns:a16="http://schemas.microsoft.com/office/drawing/2014/main" id="{7306C212-B3B4-8E92-B9B3-B626EF37EBA4}"/>
               </a:ext>
             </a:extLst>
           </p:cNvPr>
-          <p:cNvSpPr>
-            <a:spLocks noGrp="1"/>
-          </p:cNvSpPr>
-          <p:nvPr>
-            <p:ph type="title"/>
-          </p:nvPr>
-        </p:nvSpPr>
-        <p:spPr/>
-        <p:txBody>
-          <a:bodyPr/>
-          <a:lstStyle/>
-          <a:p>
-            <a:r>
-              <a:rPr lang="en-US" dirty="0"/>
+          <p:cNvSpPr txBox="1">
+            <a:spLocks noGrp="1"/>
+          </p:cNvSpPr>
+          <p:nvPr>
+            <p:ph type="title" idx="4294967295"/>
+          </p:nvPr>
+        </p:nvSpPr>
+        <p:spPr>
+          <a:xfrm>
+            <a:off x="1061794" y="2274838"/>
+            <a:ext cx="10068412" cy="2308324"/>
+          </a:xfrm>
+          <a:prstGeom prst="rect">
+            <a:avLst/>
+          </a:prstGeom>
+          <a:noFill/>
+          <a:ln>
+            <a:noFill/>
+            <a:prstDash/>
+          </a:ln>
+          <a:effectLst/>
+        </p:spPr>
+        <p:txBody>
+          <a:bodyPr rot="0" spcFirstLastPara="0" vertOverflow="overflow" horzOverflow="overflow" vert="horz" wrap="square" lIns="91440" tIns="45720" rIns="91440" bIns="45720" numCol="1" spcCol="0" rtlCol="0" fromWordArt="0" anchor="t" anchorCtr="0" forceAA="0" compatLnSpc="1">
+            <a:prstTxWarp prst="textNoShape">
+              <a:avLst/>
+            </a:prstTxWarp>
+            <a:spAutoFit/>
+          </a:bodyPr>
+          <a:lstStyle/>
+          <a:p>
+            <a:pPr marL="0" marR="0" lvl="0" indent="0" algn="ctr" defTabSz="457200" rtl="0" eaLnBrk="1" fontAlgn="auto" latinLnBrk="0" hangingPunct="1">
+              <a:lnSpc>
+                <a:spcPct val="100000"/>
+              </a:lnSpc>
+              <a:spcBef>
+                <a:spcPts val="0"/>
+              </a:spcBef>
+              <a:spcAft>
+                <a:spcPts val="0"/>
+              </a:spcAft>
+              <a:buClrTx/>
+              <a:buSzTx/>
+              <a:buFontTx/>
+              <a:buNone/>
+              <a:tabLst/>
+              <a:defRPr/>
+            </a:pPr>
+            <a:r>
+              <a:rPr kumimoji="0" lang="en-US" sz="7200" b="0" i="0" u="none" strike="noStrike" kern="1200" cap="none" spc="0" normalizeH="0" baseline="0" noProof="0" dirty="0">
+                <a:ln>
+                  <a:noFill/>
+                </a:ln>
+                <a:solidFill>
+                  <a:schemeClr val="tx1"/>
+                </a:solidFill>
+                <a:effectLst/>
+                <a:uLnTx/>
+                <a:uFillTx/>
+                <a:latin typeface="+mn-lt"/>
+                <a:ea typeface="+mn-ea"/>
+                <a:cs typeface="+mn-cs"/>
+              </a:rPr>
               <a:t>Leadership and management</a:t>
             </a:r>
-            <a:br>
-              <a:rPr lang="en-US" dirty="0"/>
-            </a:br>
-            <a:r>
-              <a:rPr lang="en-US" dirty="0"/>
-              <a:t>An Outlook on helping Teams Excel</a:t>
-            </a:r>
-          </a:p>
-        </p:txBody>
-      </p:sp>
-      <p:sp>
-        <p:nvSpPr>
-          <p:cNvPr id="3" name="Content Placeholder 2">
-            <a:extLst>
-              <a:ext uri="{FF2B5EF4-FFF2-40B4-BE49-F238E27FC236}">
-                <a16:creationId xmlns:a16="http://schemas.microsoft.com/office/drawing/2014/main" id="{79129D58-9DB9-FEC3-0C9D-348AAA5A68E6}"/>
-              </a:ext>
-            </a:extLst>
-          </p:cNvPr>
-          <p:cNvSpPr>
-            <a:spLocks noGrp="1"/>
-          </p:cNvSpPr>
-          <p:nvPr>
-            <p:ph idx="1"/>
-          </p:nvPr>
-        </p:nvSpPr>
-        <p:spPr/>
-        <p:txBody>
-          <a:bodyPr/>
-          <a:lstStyle/>
-          <a:p>
-            <a:endParaRPr lang="en-US"/>
           </a:p>
         </p:txBody>
       </p:sp>
     </p:spTree>
     <p:extLst>
       <p:ext uri="{BB962C8B-B14F-4D97-AF65-F5344CB8AC3E}">
-        <p14:creationId xmlns:p14="http://schemas.microsoft.com/office/powerpoint/2010/main" val="2676459649"/>
+        <p14:creationId xmlns:p14="http://schemas.microsoft.com/office/powerpoint/2010/main" val="3940947354"/>
       </p:ext>
     </p:extLst>
   </p:cSld>
@@ -10741,7 +10916,7 @@
             </a:br>
             <a:r>
               <a:rPr lang="en-US" dirty="0"/>
-              <a:t>Definitions</a:t>
+              <a:t>An Outlook on helping Teams Excel</a:t>
             </a:r>
           </a:p>
         </p:txBody>
@@ -10774,7 +10949,7 @@
     </p:spTree>
     <p:extLst>
       <p:ext uri="{BB962C8B-B14F-4D97-AF65-F5344CB8AC3E}">
-        <p14:creationId xmlns:p14="http://schemas.microsoft.com/office/powerpoint/2010/main" val="2210604802"/>
+        <p14:creationId xmlns:p14="http://schemas.microsoft.com/office/powerpoint/2010/main" val="2676459649"/>
       </p:ext>
     </p:extLst>
   </p:cSld>

</xml_diff>

<commit_message>
Additional slide, first bullet points
</commit_message>
<xml_diff>
--- a/Sitting in meetings all day long.pptx
+++ b/Sitting in meetings all day long.pptx
@@ -5,7 +5,7 @@
     <p:sldMasterId id="2147483660" r:id="rId1"/>
   </p:sldMasterIdLst>
   <p:notesMasterIdLst>
-    <p:notesMasterId r:id="rId32"/>
+    <p:notesMasterId r:id="rId33"/>
   </p:notesMasterIdLst>
   <p:sldIdLst>
     <p:sldId id="256" r:id="rId2"/>
@@ -26,18 +26,19 @@
     <p:sldId id="287" r:id="rId17"/>
     <p:sldId id="305" r:id="rId18"/>
     <p:sldId id="306" r:id="rId19"/>
-    <p:sldId id="290" r:id="rId20"/>
-    <p:sldId id="307" r:id="rId21"/>
-    <p:sldId id="308" r:id="rId22"/>
-    <p:sldId id="291" r:id="rId23"/>
-    <p:sldId id="309" r:id="rId24"/>
-    <p:sldId id="310" r:id="rId25"/>
-    <p:sldId id="288" r:id="rId26"/>
-    <p:sldId id="302" r:id="rId27"/>
-    <p:sldId id="303" r:id="rId28"/>
-    <p:sldId id="304" r:id="rId29"/>
-    <p:sldId id="284" r:id="rId30"/>
-    <p:sldId id="285" r:id="rId31"/>
+    <p:sldId id="312" r:id="rId20"/>
+    <p:sldId id="290" r:id="rId21"/>
+    <p:sldId id="307" r:id="rId22"/>
+    <p:sldId id="308" r:id="rId23"/>
+    <p:sldId id="291" r:id="rId24"/>
+    <p:sldId id="309" r:id="rId25"/>
+    <p:sldId id="310" r:id="rId26"/>
+    <p:sldId id="288" r:id="rId27"/>
+    <p:sldId id="302" r:id="rId28"/>
+    <p:sldId id="303" r:id="rId29"/>
+    <p:sldId id="304" r:id="rId30"/>
+    <p:sldId id="284" r:id="rId31"/>
+    <p:sldId id="285" r:id="rId32"/>
   </p:sldIdLst>
   <p:sldSz cx="12192000" cy="6858000"/>
   <p:notesSz cx="6858000" cy="9144000"/>
@@ -226,7 +227,7 @@
           <a:p>
             <a:fld id="{2B6DBF41-98D5-4B29-8B81-B31614D19ACC}" type="datetimeFigureOut">
               <a:rPr lang="en-US" smtClean="0"/>
-              <a:t>3/29/24</a:t>
+              <a:t>4/3/24</a:t>
             </a:fld>
             <a:endParaRPr lang="en-US"/>
           </a:p>
@@ -981,7 +982,7 @@
           <a:p>
             <a:fld id="{F9BC75CE-03FF-4667-898C-4C70B4392062}" type="datetimeFigureOut">
               <a:rPr lang="en-US" smtClean="0"/>
-              <a:t>3/29/24</a:t>
+              <a:t>4/3/24</a:t>
             </a:fld>
             <a:endParaRPr lang="en-US"/>
           </a:p>
@@ -1256,7 +1257,7 @@
           <a:p>
             <a:fld id="{F9BC75CE-03FF-4667-898C-4C70B4392062}" type="datetimeFigureOut">
               <a:rPr lang="en-US" smtClean="0"/>
-              <a:t>3/29/24</a:t>
+              <a:t>4/3/24</a:t>
             </a:fld>
             <a:endParaRPr lang="en-US"/>
           </a:p>
@@ -1450,7 +1451,7 @@
           <a:p>
             <a:fld id="{F9BC75CE-03FF-4667-898C-4C70B4392062}" type="datetimeFigureOut">
               <a:rPr lang="en-US" smtClean="0"/>
-              <a:t>3/29/24</a:t>
+              <a:t>4/3/24</a:t>
             </a:fld>
             <a:endParaRPr lang="en-US"/>
           </a:p>
@@ -1723,7 +1724,7 @@
           <a:p>
             <a:fld id="{F9BC75CE-03FF-4667-898C-4C70B4392062}" type="datetimeFigureOut">
               <a:rPr lang="en-US" smtClean="0"/>
-              <a:t>3/29/24</a:t>
+              <a:t>4/3/24</a:t>
             </a:fld>
             <a:endParaRPr lang="en-US"/>
           </a:p>
@@ -2064,7 +2065,7 @@
           <a:p>
             <a:fld id="{F9BC75CE-03FF-4667-898C-4C70B4392062}" type="datetimeFigureOut">
               <a:rPr lang="en-US" smtClean="0"/>
-              <a:t>3/29/24</a:t>
+              <a:t>4/3/24</a:t>
             </a:fld>
             <a:endParaRPr lang="en-US"/>
           </a:p>
@@ -2687,7 +2688,7 @@
           <a:p>
             <a:fld id="{F9BC75CE-03FF-4667-898C-4C70B4392062}" type="datetimeFigureOut">
               <a:rPr lang="en-US" smtClean="0"/>
-              <a:t>3/29/24</a:t>
+              <a:t>4/3/24</a:t>
             </a:fld>
             <a:endParaRPr lang="en-US"/>
           </a:p>
@@ -3547,7 +3548,7 @@
           <a:p>
             <a:fld id="{F9BC75CE-03FF-4667-898C-4C70B4392062}" type="datetimeFigureOut">
               <a:rPr lang="en-US" smtClean="0"/>
-              <a:t>3/29/24</a:t>
+              <a:t>4/3/24</a:t>
             </a:fld>
             <a:endParaRPr lang="en-US"/>
           </a:p>
@@ -3717,7 +3718,7 @@
           <a:p>
             <a:fld id="{F9BC75CE-03FF-4667-898C-4C70B4392062}" type="datetimeFigureOut">
               <a:rPr lang="en-US" smtClean="0"/>
-              <a:t>3/29/24</a:t>
+              <a:t>4/3/24</a:t>
             </a:fld>
             <a:endParaRPr lang="en-US"/>
           </a:p>
@@ -3897,7 +3898,7 @@
           <a:p>
             <a:fld id="{F9BC75CE-03FF-4667-898C-4C70B4392062}" type="datetimeFigureOut">
               <a:rPr lang="en-US" smtClean="0"/>
-              <a:t>3/29/24</a:t>
+              <a:t>4/3/24</a:t>
             </a:fld>
             <a:endParaRPr lang="en-US"/>
           </a:p>
@@ -4067,7 +4068,7 @@
           <a:p>
             <a:fld id="{F9BC75CE-03FF-4667-898C-4C70B4392062}" type="datetimeFigureOut">
               <a:rPr lang="en-US" smtClean="0"/>
-              <a:t>3/29/24</a:t>
+              <a:t>4/3/24</a:t>
             </a:fld>
             <a:endParaRPr lang="en-US"/>
           </a:p>
@@ -4314,7 +4315,7 @@
           <a:p>
             <a:fld id="{F9BC75CE-03FF-4667-898C-4C70B4392062}" type="datetimeFigureOut">
               <a:rPr lang="en-US" smtClean="0"/>
-              <a:t>3/29/24</a:t>
+              <a:t>4/3/24</a:t>
             </a:fld>
             <a:endParaRPr lang="en-US"/>
           </a:p>
@@ -4606,7 +4607,7 @@
           <a:p>
             <a:fld id="{F9BC75CE-03FF-4667-898C-4C70B4392062}" type="datetimeFigureOut">
               <a:rPr lang="en-US" smtClean="0"/>
-              <a:t>3/29/24</a:t>
+              <a:t>4/3/24</a:t>
             </a:fld>
             <a:endParaRPr lang="en-US"/>
           </a:p>
@@ -5050,7 +5051,7 @@
           <a:p>
             <a:fld id="{F9BC75CE-03FF-4667-898C-4C70B4392062}" type="datetimeFigureOut">
               <a:rPr lang="en-US" smtClean="0"/>
-              <a:t>3/29/24</a:t>
+              <a:t>4/3/24</a:t>
             </a:fld>
             <a:endParaRPr lang="en-US"/>
           </a:p>
@@ -5168,7 +5169,7 @@
           <a:p>
             <a:fld id="{F9BC75CE-03FF-4667-898C-4C70B4392062}" type="datetimeFigureOut">
               <a:rPr lang="en-US" smtClean="0"/>
-              <a:t>3/29/24</a:t>
+              <a:t>4/3/24</a:t>
             </a:fld>
             <a:endParaRPr lang="en-US"/>
           </a:p>
@@ -5263,7 +5264,7 @@
           <a:p>
             <a:fld id="{F9BC75CE-03FF-4667-898C-4C70B4392062}" type="datetimeFigureOut">
               <a:rPr lang="en-US" smtClean="0"/>
-              <a:t>3/29/24</a:t>
+              <a:t>4/3/24</a:t>
             </a:fld>
             <a:endParaRPr lang="en-US"/>
           </a:p>
@@ -5542,7 +5543,7 @@
           <a:p>
             <a:fld id="{F9BC75CE-03FF-4667-898C-4C70B4392062}" type="datetimeFigureOut">
               <a:rPr lang="en-US" smtClean="0"/>
-              <a:t>3/29/24</a:t>
+              <a:t>4/3/24</a:t>
             </a:fld>
             <a:endParaRPr lang="en-US"/>
           </a:p>
@@ -5817,7 +5818,7 @@
           <a:p>
             <a:fld id="{F9BC75CE-03FF-4667-898C-4C70B4392062}" type="datetimeFigureOut">
               <a:rPr lang="en-US" smtClean="0"/>
-              <a:t>3/29/24</a:t>
+              <a:t>4/3/24</a:t>
             </a:fld>
             <a:endParaRPr lang="en-US"/>
           </a:p>
@@ -6246,7 +6247,7 @@
           <a:p>
             <a:fld id="{F9BC75CE-03FF-4667-898C-4C70B4392062}" type="datetimeFigureOut">
               <a:rPr lang="en-US" smtClean="0"/>
-              <a:t>3/29/24</a:t>
+              <a:t>4/3/24</a:t>
             </a:fld>
             <a:endParaRPr lang="en-US"/>
           </a:p>
@@ -7947,7 +7948,22 @@
           <a:bodyPr/>
           <a:lstStyle/>
           <a:p>
-            <a:endParaRPr lang="en-US"/>
+            <a:r>
+              <a:rPr lang="en-US" dirty="0"/>
+              <a:t>Defining and improving processes</a:t>
+            </a:r>
+          </a:p>
+          <a:p>
+            <a:r>
+              <a:rPr lang="en-US" dirty="0"/>
+              <a:t>Producing new roles</a:t>
+            </a:r>
+          </a:p>
+          <a:p>
+            <a:r>
+              <a:rPr lang="en-US" dirty="0"/>
+              <a:t>Staffing reductions</a:t>
+            </a:r>
           </a:p>
         </p:txBody>
       </p:sp>
@@ -8273,74 +8289,66 @@
           <p:cNvPr id="2" name="Title 1">
             <a:extLst>
               <a:ext uri="{FF2B5EF4-FFF2-40B4-BE49-F238E27FC236}">
-                <a16:creationId xmlns:a16="http://schemas.microsoft.com/office/drawing/2014/main" id="{7306C212-B3B4-8E92-B9B3-B626EF37EBA4}"/>
+                <a16:creationId xmlns:a16="http://schemas.microsoft.com/office/drawing/2014/main" id="{B1C169BA-9384-13A8-9DDF-F5C2403AEDE8}"/>
               </a:ext>
             </a:extLst>
           </p:cNvPr>
-          <p:cNvSpPr txBox="1">
-            <a:spLocks noGrp="1"/>
-          </p:cNvSpPr>
-          <p:nvPr>
-            <p:ph type="title" idx="4294967295"/>
-          </p:nvPr>
-        </p:nvSpPr>
-        <p:spPr>
-          <a:xfrm>
-            <a:off x="1061794" y="2274838"/>
-            <a:ext cx="10068412" cy="2308324"/>
-          </a:xfrm>
-          <a:prstGeom prst="rect">
-            <a:avLst/>
-          </a:prstGeom>
-          <a:noFill/>
-          <a:ln>
-            <a:noFill/>
-            <a:prstDash/>
-          </a:ln>
-          <a:effectLst/>
-        </p:spPr>
-        <p:txBody>
-          <a:bodyPr rot="0" spcFirstLastPara="0" vertOverflow="overflow" horzOverflow="overflow" vert="horz" wrap="square" lIns="91440" tIns="45720" rIns="91440" bIns="45720" numCol="1" spcCol="0" rtlCol="0" fromWordArt="0" anchor="t" anchorCtr="0" forceAA="0" compatLnSpc="1">
-            <a:prstTxWarp prst="textNoShape">
-              <a:avLst/>
-            </a:prstTxWarp>
-            <a:spAutoFit/>
-          </a:bodyPr>
-          <a:lstStyle/>
-          <a:p>
-            <a:pPr marL="0" marR="0" lvl="0" indent="0" algn="ctr" defTabSz="457200" rtl="0" eaLnBrk="1" fontAlgn="auto" latinLnBrk="0" hangingPunct="1">
-              <a:lnSpc>
-                <a:spcPct val="100000"/>
-              </a:lnSpc>
-              <a:spcBef>
-                <a:spcPts val="0"/>
-              </a:spcBef>
-              <a:spcAft>
-                <a:spcPts val="0"/>
-              </a:spcAft>
-              <a:buClrTx/>
-              <a:buSzTx/>
-              <a:buFontTx/>
-              <a:buNone/>
-              <a:tabLst/>
-              <a:defRPr/>
-            </a:pPr>
-            <a:r>
-              <a:rPr kumimoji="0" lang="en-US" sz="7200" b="0" i="0" u="none" strike="noStrike" kern="1200" cap="none" spc="0" normalizeH="0" baseline="0" noProof="0" dirty="0">
-                <a:ln>
-                  <a:noFill/>
-                </a:ln>
-                <a:solidFill>
-                  <a:schemeClr val="tx1"/>
-                </a:solidFill>
-                <a:effectLst/>
-                <a:uLnTx/>
-                <a:uFillTx/>
-                <a:latin typeface="+mn-lt"/>
-                <a:ea typeface="+mn-ea"/>
-                <a:cs typeface="+mn-cs"/>
-              </a:rPr>
-              <a:t>Tactical and strategic staffing</a:t>
+          <p:cNvSpPr>
+            <a:spLocks noGrp="1"/>
+          </p:cNvSpPr>
+          <p:nvPr>
+            <p:ph type="title"/>
+          </p:nvPr>
+        </p:nvSpPr>
+        <p:spPr/>
+        <p:txBody>
+          <a:bodyPr/>
+          <a:lstStyle/>
+          <a:p>
+            <a:r>
+              <a:rPr lang="en-US" dirty="0"/>
+              <a:t>Lessons in communication</a:t>
+            </a:r>
+            <a:br>
+              <a:rPr lang="en-US" dirty="0"/>
+            </a:br>
+            <a:r>
+              <a:rPr lang="en-US" dirty="0"/>
+              <a:t>“Managing” in all sorts of directions</a:t>
+            </a:r>
+          </a:p>
+        </p:txBody>
+      </p:sp>
+      <p:sp>
+        <p:nvSpPr>
+          <p:cNvPr id="3" name="Content Placeholder 2">
+            <a:extLst>
+              <a:ext uri="{FF2B5EF4-FFF2-40B4-BE49-F238E27FC236}">
+                <a16:creationId xmlns:a16="http://schemas.microsoft.com/office/drawing/2014/main" id="{B2E99B5C-42F6-68A9-5D8C-522EA5A66EF8}"/>
+              </a:ext>
+            </a:extLst>
+          </p:cNvPr>
+          <p:cNvSpPr>
+            <a:spLocks noGrp="1"/>
+          </p:cNvSpPr>
+          <p:nvPr>
+            <p:ph idx="1"/>
+          </p:nvPr>
+        </p:nvSpPr>
+        <p:spPr/>
+        <p:txBody>
+          <a:bodyPr/>
+          <a:lstStyle/>
+          <a:p>
+            <a:r>
+              <a:rPr lang="en-US" dirty="0"/>
+              <a:t>Managing up</a:t>
+            </a:r>
+          </a:p>
+          <a:p>
+            <a:r>
+              <a:rPr lang="en-US" dirty="0"/>
+              <a:t>Managing laterally</a:t>
             </a:r>
           </a:p>
         </p:txBody>
@@ -8348,7 +8356,7 @@
     </p:spTree>
     <p:extLst>
       <p:ext uri="{BB962C8B-B14F-4D97-AF65-F5344CB8AC3E}">
-        <p14:creationId xmlns:p14="http://schemas.microsoft.com/office/powerpoint/2010/main" val="2515611607"/>
+        <p14:creationId xmlns:p14="http://schemas.microsoft.com/office/powerpoint/2010/main" val="2893093441"/>
       </p:ext>
     </p:extLst>
   </p:cSld>
@@ -8823,65 +8831,82 @@
           <p:cNvPr id="2" name="Title 1">
             <a:extLst>
               <a:ext uri="{FF2B5EF4-FFF2-40B4-BE49-F238E27FC236}">
-                <a16:creationId xmlns:a16="http://schemas.microsoft.com/office/drawing/2014/main" id="{4B1138EC-C228-F909-6E50-58916471968D}"/>
+                <a16:creationId xmlns:a16="http://schemas.microsoft.com/office/drawing/2014/main" id="{7306C212-B3B4-8E92-B9B3-B626EF37EBA4}"/>
               </a:ext>
             </a:extLst>
           </p:cNvPr>
-          <p:cNvSpPr>
-            <a:spLocks noGrp="1"/>
-          </p:cNvSpPr>
-          <p:nvPr>
-            <p:ph type="title"/>
-          </p:nvPr>
-        </p:nvSpPr>
-        <p:spPr/>
-        <p:txBody>
-          <a:bodyPr/>
-          <a:lstStyle/>
-          <a:p>
-            <a:r>
-              <a:rPr lang="en-US" dirty="0"/>
+          <p:cNvSpPr txBox="1">
+            <a:spLocks noGrp="1"/>
+          </p:cNvSpPr>
+          <p:nvPr>
+            <p:ph type="title" idx="4294967295"/>
+          </p:nvPr>
+        </p:nvSpPr>
+        <p:spPr>
+          <a:xfrm>
+            <a:off x="1061794" y="2274838"/>
+            <a:ext cx="10068412" cy="2308324"/>
+          </a:xfrm>
+          <a:prstGeom prst="rect">
+            <a:avLst/>
+          </a:prstGeom>
+          <a:noFill/>
+          <a:ln>
+            <a:noFill/>
+            <a:prstDash/>
+          </a:ln>
+          <a:effectLst/>
+        </p:spPr>
+        <p:txBody>
+          <a:bodyPr rot="0" spcFirstLastPara="0" vertOverflow="overflow" horzOverflow="overflow" vert="horz" wrap="square" lIns="91440" tIns="45720" rIns="91440" bIns="45720" numCol="1" spcCol="0" rtlCol="0" fromWordArt="0" anchor="t" anchorCtr="0" forceAA="0" compatLnSpc="1">
+            <a:prstTxWarp prst="textNoShape">
+              <a:avLst/>
+            </a:prstTxWarp>
+            <a:spAutoFit/>
+          </a:bodyPr>
+          <a:lstStyle/>
+          <a:p>
+            <a:pPr marL="0" marR="0" lvl="0" indent="0" algn="ctr" defTabSz="457200" rtl="0" eaLnBrk="1" fontAlgn="auto" latinLnBrk="0" hangingPunct="1">
+              <a:lnSpc>
+                <a:spcPct val="100000"/>
+              </a:lnSpc>
+              <a:spcBef>
+                <a:spcPts val="0"/>
+              </a:spcBef>
+              <a:spcAft>
+                <a:spcPts val="0"/>
+              </a:spcAft>
+              <a:buClrTx/>
+              <a:buSzTx/>
+              <a:buFontTx/>
+              <a:buNone/>
+              <a:tabLst/>
+              <a:defRPr/>
+            </a:pPr>
+            <a:r>
+              <a:rPr kumimoji="0" lang="en-US" sz="7200" b="0" i="0" u="none" strike="noStrike" kern="1200" cap="none" spc="0" normalizeH="0" baseline="0" noProof="0" dirty="0">
+                <a:ln>
+                  <a:noFill/>
+                </a:ln>
+                <a:solidFill>
+                  <a:schemeClr val="tx1"/>
+                </a:solidFill>
+                <a:effectLst/>
+                <a:uLnTx/>
+                <a:uFillTx/>
+                <a:latin typeface="+mn-lt"/>
+                <a:ea typeface="+mn-ea"/>
+                <a:cs typeface="+mn-cs"/>
+              </a:rPr>
               <a:t>Tactical and strategic staffing</a:t>
             </a:r>
-            <a:br>
-              <a:rPr lang="en-US" dirty="0"/>
-            </a:br>
-            <a:r>
-              <a:rPr lang="en-US" dirty="0"/>
-              <a:t>Tactical (short-term)</a:t>
-            </a:r>
-          </a:p>
-        </p:txBody>
-      </p:sp>
-      <p:sp>
-        <p:nvSpPr>
-          <p:cNvPr id="3" name="Content Placeholder 2">
-            <a:extLst>
-              <a:ext uri="{FF2B5EF4-FFF2-40B4-BE49-F238E27FC236}">
-                <a16:creationId xmlns:a16="http://schemas.microsoft.com/office/drawing/2014/main" id="{8EC4E523-CC9F-4A9F-C5CF-DCCEB45FA33E}"/>
-              </a:ext>
-            </a:extLst>
-          </p:cNvPr>
-          <p:cNvSpPr>
-            <a:spLocks noGrp="1"/>
-          </p:cNvSpPr>
-          <p:nvPr>
-            <p:ph idx="1"/>
-          </p:nvPr>
-        </p:nvSpPr>
-        <p:spPr/>
-        <p:txBody>
-          <a:bodyPr/>
-          <a:lstStyle/>
-          <a:p>
-            <a:endParaRPr lang="en-US"/>
           </a:p>
         </p:txBody>
       </p:sp>
     </p:spTree>
     <p:extLst>
       <p:ext uri="{BB962C8B-B14F-4D97-AF65-F5344CB8AC3E}">
-        <p14:creationId xmlns:p14="http://schemas.microsoft.com/office/powerpoint/2010/main" val="191123847"/>
+        <p14:creationId xmlns:p14="http://schemas.microsoft.com/office/powerpoint/2010/main" val="2515611607"/>
       </p:ext>
     </p:extLst>
   </p:cSld>
@@ -8938,7 +8963,7 @@
             </a:br>
             <a:r>
               <a:rPr lang="en-US" dirty="0"/>
-              <a:t>Strategic (long-term)</a:t>
+              <a:t>Tactical (short-term)</a:t>
             </a:r>
           </a:p>
         </p:txBody>
@@ -8971,7 +8996,7 @@
     </p:spTree>
     <p:extLst>
       <p:ext uri="{BB962C8B-B14F-4D97-AF65-F5344CB8AC3E}">
-        <p14:creationId xmlns:p14="http://schemas.microsoft.com/office/powerpoint/2010/main" val="1883057240"/>
+        <p14:creationId xmlns:p14="http://schemas.microsoft.com/office/powerpoint/2010/main" val="191123847"/>
       </p:ext>
     </p:extLst>
   </p:cSld>
@@ -9003,82 +9028,65 @@
           <p:cNvPr id="2" name="Title 1">
             <a:extLst>
               <a:ext uri="{FF2B5EF4-FFF2-40B4-BE49-F238E27FC236}">
-                <a16:creationId xmlns:a16="http://schemas.microsoft.com/office/drawing/2014/main" id="{7306C212-B3B4-8E92-B9B3-B626EF37EBA4}"/>
+                <a16:creationId xmlns:a16="http://schemas.microsoft.com/office/drawing/2014/main" id="{4B1138EC-C228-F909-6E50-58916471968D}"/>
               </a:ext>
             </a:extLst>
           </p:cNvPr>
-          <p:cNvSpPr txBox="1">
-            <a:spLocks noGrp="1"/>
-          </p:cNvSpPr>
-          <p:nvPr>
-            <p:ph type="title" idx="4294967295"/>
-          </p:nvPr>
-        </p:nvSpPr>
-        <p:spPr>
-          <a:xfrm>
-            <a:off x="1061794" y="2274838"/>
-            <a:ext cx="10068412" cy="2308324"/>
-          </a:xfrm>
-          <a:prstGeom prst="rect">
-            <a:avLst/>
-          </a:prstGeom>
-          <a:noFill/>
-          <a:ln>
-            <a:noFill/>
-            <a:prstDash/>
-          </a:ln>
-          <a:effectLst/>
-        </p:spPr>
-        <p:txBody>
-          <a:bodyPr rot="0" spcFirstLastPara="0" vertOverflow="overflow" horzOverflow="overflow" vert="horz" wrap="square" lIns="91440" tIns="45720" rIns="91440" bIns="45720" numCol="1" spcCol="0" rtlCol="0" fromWordArt="0" anchor="t" anchorCtr="0" forceAA="0" compatLnSpc="1">
-            <a:prstTxWarp prst="textNoShape">
-              <a:avLst/>
-            </a:prstTxWarp>
-            <a:spAutoFit/>
-          </a:bodyPr>
-          <a:lstStyle/>
-          <a:p>
-            <a:pPr marL="0" marR="0" lvl="0" indent="0" algn="ctr" defTabSz="457200" rtl="0" eaLnBrk="1" fontAlgn="auto" latinLnBrk="0" hangingPunct="1">
-              <a:lnSpc>
-                <a:spcPct val="100000"/>
-              </a:lnSpc>
-              <a:spcBef>
-                <a:spcPts val="0"/>
-              </a:spcBef>
-              <a:spcAft>
-                <a:spcPts val="0"/>
-              </a:spcAft>
-              <a:buClrTx/>
-              <a:buSzTx/>
-              <a:buFontTx/>
-              <a:buNone/>
-              <a:tabLst/>
-              <a:defRPr/>
-            </a:pPr>
-            <a:r>
-              <a:rPr kumimoji="0" lang="en-US" sz="7200" b="0" i="0" u="none" strike="noStrike" kern="1200" cap="none" spc="0" normalizeH="0" baseline="0" noProof="0" dirty="0">
-                <a:ln>
-                  <a:noFill/>
-                </a:ln>
-                <a:solidFill>
-                  <a:schemeClr val="tx1"/>
-                </a:solidFill>
-                <a:effectLst/>
-                <a:uLnTx/>
-                <a:uFillTx/>
-                <a:latin typeface="+mn-lt"/>
-                <a:ea typeface="+mn-ea"/>
-                <a:cs typeface="+mn-cs"/>
-              </a:rPr>
-              <a:t>Dealing with ”large" amounts</a:t>
-            </a:r>
+          <p:cNvSpPr>
+            <a:spLocks noGrp="1"/>
+          </p:cNvSpPr>
+          <p:nvPr>
+            <p:ph type="title"/>
+          </p:nvPr>
+        </p:nvSpPr>
+        <p:spPr/>
+        <p:txBody>
+          <a:bodyPr/>
+          <a:lstStyle/>
+          <a:p>
+            <a:r>
+              <a:rPr lang="en-US" dirty="0"/>
+              <a:t>Tactical and strategic staffing</a:t>
+            </a:r>
+            <a:br>
+              <a:rPr lang="en-US" dirty="0"/>
+            </a:br>
+            <a:r>
+              <a:rPr lang="en-US" dirty="0"/>
+              <a:t>Strategic (long-term)</a:t>
+            </a:r>
+          </a:p>
+        </p:txBody>
+      </p:sp>
+      <p:sp>
+        <p:nvSpPr>
+          <p:cNvPr id="3" name="Content Placeholder 2">
+            <a:extLst>
+              <a:ext uri="{FF2B5EF4-FFF2-40B4-BE49-F238E27FC236}">
+                <a16:creationId xmlns:a16="http://schemas.microsoft.com/office/drawing/2014/main" id="{8EC4E523-CC9F-4A9F-C5CF-DCCEB45FA33E}"/>
+              </a:ext>
+            </a:extLst>
+          </p:cNvPr>
+          <p:cNvSpPr>
+            <a:spLocks noGrp="1"/>
+          </p:cNvSpPr>
+          <p:nvPr>
+            <p:ph idx="1"/>
+          </p:nvPr>
+        </p:nvSpPr>
+        <p:spPr/>
+        <p:txBody>
+          <a:bodyPr/>
+          <a:lstStyle/>
+          <a:p>
+            <a:endParaRPr lang="en-US"/>
           </a:p>
         </p:txBody>
       </p:sp>
     </p:spTree>
     <p:extLst>
       <p:ext uri="{BB962C8B-B14F-4D97-AF65-F5344CB8AC3E}">
-        <p14:creationId xmlns:p14="http://schemas.microsoft.com/office/powerpoint/2010/main" val="3958885873"/>
+        <p14:creationId xmlns:p14="http://schemas.microsoft.com/office/powerpoint/2010/main" val="1883057240"/>
       </p:ext>
     </p:extLst>
   </p:cSld>
@@ -9110,65 +9118,82 @@
           <p:cNvPr id="2" name="Title 1">
             <a:extLst>
               <a:ext uri="{FF2B5EF4-FFF2-40B4-BE49-F238E27FC236}">
-                <a16:creationId xmlns:a16="http://schemas.microsoft.com/office/drawing/2014/main" id="{1DC5880F-8E65-EA3A-86E0-927CA442F637}"/>
+                <a16:creationId xmlns:a16="http://schemas.microsoft.com/office/drawing/2014/main" id="{7306C212-B3B4-8E92-B9B3-B626EF37EBA4}"/>
               </a:ext>
             </a:extLst>
           </p:cNvPr>
-          <p:cNvSpPr>
-            <a:spLocks noGrp="1"/>
-          </p:cNvSpPr>
-          <p:nvPr>
-            <p:ph type="title"/>
-          </p:nvPr>
-        </p:nvSpPr>
-        <p:spPr/>
-        <p:txBody>
-          <a:bodyPr/>
-          <a:lstStyle/>
-          <a:p>
-            <a:r>
-              <a:rPr lang="en-US" dirty="0"/>
+          <p:cNvSpPr txBox="1">
+            <a:spLocks noGrp="1"/>
+          </p:cNvSpPr>
+          <p:nvPr>
+            <p:ph type="title" idx="4294967295"/>
+          </p:nvPr>
+        </p:nvSpPr>
+        <p:spPr>
+          <a:xfrm>
+            <a:off x="1061794" y="2274838"/>
+            <a:ext cx="10068412" cy="2308324"/>
+          </a:xfrm>
+          <a:prstGeom prst="rect">
+            <a:avLst/>
+          </a:prstGeom>
+          <a:noFill/>
+          <a:ln>
+            <a:noFill/>
+            <a:prstDash/>
+          </a:ln>
+          <a:effectLst/>
+        </p:spPr>
+        <p:txBody>
+          <a:bodyPr rot="0" spcFirstLastPara="0" vertOverflow="overflow" horzOverflow="overflow" vert="horz" wrap="square" lIns="91440" tIns="45720" rIns="91440" bIns="45720" numCol="1" spcCol="0" rtlCol="0" fromWordArt="0" anchor="t" anchorCtr="0" forceAA="0" compatLnSpc="1">
+            <a:prstTxWarp prst="textNoShape">
+              <a:avLst/>
+            </a:prstTxWarp>
+            <a:spAutoFit/>
+          </a:bodyPr>
+          <a:lstStyle/>
+          <a:p>
+            <a:pPr marL="0" marR="0" lvl="0" indent="0" algn="ctr" defTabSz="457200" rtl="0" eaLnBrk="1" fontAlgn="auto" latinLnBrk="0" hangingPunct="1">
+              <a:lnSpc>
+                <a:spcPct val="100000"/>
+              </a:lnSpc>
+              <a:spcBef>
+                <a:spcPts val="0"/>
+              </a:spcBef>
+              <a:spcAft>
+                <a:spcPts val="0"/>
+              </a:spcAft>
+              <a:buClrTx/>
+              <a:buSzTx/>
+              <a:buFontTx/>
+              <a:buNone/>
+              <a:tabLst/>
+              <a:defRPr/>
+            </a:pPr>
+            <a:r>
+              <a:rPr kumimoji="0" lang="en-US" sz="7200" b="0" i="0" u="none" strike="noStrike" kern="1200" cap="none" spc="0" normalizeH="0" baseline="0" noProof="0" dirty="0">
+                <a:ln>
+                  <a:noFill/>
+                </a:ln>
+                <a:solidFill>
+                  <a:schemeClr val="tx1"/>
+                </a:solidFill>
+                <a:effectLst/>
+                <a:uLnTx/>
+                <a:uFillTx/>
+                <a:latin typeface="+mn-lt"/>
+                <a:ea typeface="+mn-ea"/>
+                <a:cs typeface="+mn-cs"/>
+              </a:rPr>
               <a:t>Dealing with ”large" amounts</a:t>
             </a:r>
-            <a:br>
-              <a:rPr lang="en-US" dirty="0"/>
-            </a:br>
-            <a:r>
-              <a:rPr lang="en-US" dirty="0"/>
-              <a:t>From retail to buying in bulk…</a:t>
-            </a:r>
-          </a:p>
-        </p:txBody>
-      </p:sp>
-      <p:sp>
-        <p:nvSpPr>
-          <p:cNvPr id="3" name="Content Placeholder 2">
-            <a:extLst>
-              <a:ext uri="{FF2B5EF4-FFF2-40B4-BE49-F238E27FC236}">
-                <a16:creationId xmlns:a16="http://schemas.microsoft.com/office/drawing/2014/main" id="{7CBE18E6-3DB3-585A-A7CA-B43607C969DC}"/>
-              </a:ext>
-            </a:extLst>
-          </p:cNvPr>
-          <p:cNvSpPr>
-            <a:spLocks noGrp="1"/>
-          </p:cNvSpPr>
-          <p:nvPr>
-            <p:ph idx="1"/>
-          </p:nvPr>
-        </p:nvSpPr>
-        <p:spPr/>
-        <p:txBody>
-          <a:bodyPr/>
-          <a:lstStyle/>
-          <a:p>
-            <a:endParaRPr lang="en-US"/>
           </a:p>
         </p:txBody>
       </p:sp>
     </p:spTree>
     <p:extLst>
       <p:ext uri="{BB962C8B-B14F-4D97-AF65-F5344CB8AC3E}">
-        <p14:creationId xmlns:p14="http://schemas.microsoft.com/office/powerpoint/2010/main" val="538221144"/>
+        <p14:creationId xmlns:p14="http://schemas.microsoft.com/office/powerpoint/2010/main" val="3958885873"/>
       </p:ext>
     </p:extLst>
   </p:cSld>
@@ -9225,7 +9250,7 @@
             </a:br>
             <a:r>
               <a:rPr lang="en-US" dirty="0"/>
-              <a:t>…to labor costs</a:t>
+              <a:t>From retail to buying in bulk…</a:t>
             </a:r>
           </a:p>
         </p:txBody>
@@ -9258,7 +9283,7 @@
     </p:spTree>
     <p:extLst>
       <p:ext uri="{BB962C8B-B14F-4D97-AF65-F5344CB8AC3E}">
-        <p14:creationId xmlns:p14="http://schemas.microsoft.com/office/powerpoint/2010/main" val="2006387642"/>
+        <p14:creationId xmlns:p14="http://schemas.microsoft.com/office/powerpoint/2010/main" val="538221144"/>
       </p:ext>
     </p:extLst>
   </p:cSld>
@@ -9290,82 +9315,65 @@
           <p:cNvPr id="2" name="Title 1">
             <a:extLst>
               <a:ext uri="{FF2B5EF4-FFF2-40B4-BE49-F238E27FC236}">
-                <a16:creationId xmlns:a16="http://schemas.microsoft.com/office/drawing/2014/main" id="{7306C212-B3B4-8E92-B9B3-B626EF37EBA4}"/>
+                <a16:creationId xmlns:a16="http://schemas.microsoft.com/office/drawing/2014/main" id="{1DC5880F-8E65-EA3A-86E0-927CA442F637}"/>
               </a:ext>
             </a:extLst>
           </p:cNvPr>
-          <p:cNvSpPr txBox="1">
-            <a:spLocks noGrp="1"/>
-          </p:cNvSpPr>
-          <p:nvPr>
-            <p:ph type="title" idx="4294967295"/>
-          </p:nvPr>
-        </p:nvSpPr>
-        <p:spPr>
-          <a:xfrm>
-            <a:off x="1061794" y="2274838"/>
-            <a:ext cx="10068412" cy="2308324"/>
-          </a:xfrm>
-          <a:prstGeom prst="rect">
-            <a:avLst/>
-          </a:prstGeom>
-          <a:noFill/>
-          <a:ln>
-            <a:noFill/>
-            <a:prstDash/>
-          </a:ln>
-          <a:effectLst/>
-        </p:spPr>
-        <p:txBody>
-          <a:bodyPr rot="0" spcFirstLastPara="0" vertOverflow="overflow" horzOverflow="overflow" vert="horz" wrap="square" lIns="91440" tIns="45720" rIns="91440" bIns="45720" numCol="1" spcCol="0" rtlCol="0" fromWordArt="0" anchor="t" anchorCtr="0" forceAA="0" compatLnSpc="1">
-            <a:prstTxWarp prst="textNoShape">
-              <a:avLst/>
-            </a:prstTxWarp>
-            <a:spAutoFit/>
-          </a:bodyPr>
-          <a:lstStyle/>
-          <a:p>
-            <a:pPr marL="0" marR="0" lvl="0" indent="0" algn="ctr" defTabSz="457200" rtl="0" eaLnBrk="1" fontAlgn="auto" latinLnBrk="0" hangingPunct="1">
-              <a:lnSpc>
-                <a:spcPct val="100000"/>
-              </a:lnSpc>
-              <a:spcBef>
-                <a:spcPts val="0"/>
-              </a:spcBef>
-              <a:spcAft>
-                <a:spcPts val="0"/>
-              </a:spcAft>
-              <a:buClrTx/>
-              <a:buSzTx/>
-              <a:buFontTx/>
-              <a:buNone/>
-              <a:tabLst/>
-              <a:defRPr/>
-            </a:pPr>
-            <a:r>
-              <a:rPr kumimoji="0" lang="en-US" sz="7200" b="0" i="0" u="none" strike="noStrike" kern="1200" cap="none" spc="0" normalizeH="0" baseline="0" noProof="0" dirty="0">
-                <a:ln>
-                  <a:noFill/>
-                </a:ln>
-                <a:solidFill>
-                  <a:schemeClr val="tx1"/>
-                </a:solidFill>
-                <a:effectLst/>
-                <a:uLnTx/>
-                <a:uFillTx/>
-                <a:latin typeface="+mn-lt"/>
-                <a:ea typeface="+mn-ea"/>
-                <a:cs typeface="+mn-cs"/>
-              </a:rPr>
-              <a:t>Reaching the next level</a:t>
-            </a:r>
+          <p:cNvSpPr>
+            <a:spLocks noGrp="1"/>
+          </p:cNvSpPr>
+          <p:nvPr>
+            <p:ph type="title"/>
+          </p:nvPr>
+        </p:nvSpPr>
+        <p:spPr/>
+        <p:txBody>
+          <a:bodyPr/>
+          <a:lstStyle/>
+          <a:p>
+            <a:r>
+              <a:rPr lang="en-US" dirty="0"/>
+              <a:t>Dealing with ”large" amounts</a:t>
+            </a:r>
+            <a:br>
+              <a:rPr lang="en-US" dirty="0"/>
+            </a:br>
+            <a:r>
+              <a:rPr lang="en-US" dirty="0"/>
+              <a:t>…to labor costs</a:t>
+            </a:r>
+          </a:p>
+        </p:txBody>
+      </p:sp>
+      <p:sp>
+        <p:nvSpPr>
+          <p:cNvPr id="3" name="Content Placeholder 2">
+            <a:extLst>
+              <a:ext uri="{FF2B5EF4-FFF2-40B4-BE49-F238E27FC236}">
+                <a16:creationId xmlns:a16="http://schemas.microsoft.com/office/drawing/2014/main" id="{7CBE18E6-3DB3-585A-A7CA-B43607C969DC}"/>
+              </a:ext>
+            </a:extLst>
+          </p:cNvPr>
+          <p:cNvSpPr>
+            <a:spLocks noGrp="1"/>
+          </p:cNvSpPr>
+          <p:nvPr>
+            <p:ph idx="1"/>
+          </p:nvPr>
+        </p:nvSpPr>
+        <p:spPr/>
+        <p:txBody>
+          <a:bodyPr/>
+          <a:lstStyle/>
+          <a:p>
+            <a:endParaRPr lang="en-US"/>
           </a:p>
         </p:txBody>
       </p:sp>
     </p:spTree>
     <p:extLst>
       <p:ext uri="{BB962C8B-B14F-4D97-AF65-F5344CB8AC3E}">
-        <p14:creationId xmlns:p14="http://schemas.microsoft.com/office/powerpoint/2010/main" val="304747598"/>
+        <p14:creationId xmlns:p14="http://schemas.microsoft.com/office/powerpoint/2010/main" val="2006387642"/>
       </p:ext>
     </p:extLst>
   </p:cSld>
@@ -9397,65 +9405,82 @@
           <p:cNvPr id="2" name="Title 1">
             <a:extLst>
               <a:ext uri="{FF2B5EF4-FFF2-40B4-BE49-F238E27FC236}">
-                <a16:creationId xmlns:a16="http://schemas.microsoft.com/office/drawing/2014/main" id="{A7CE3666-0251-236D-2C10-050AED8D53F0}"/>
+                <a16:creationId xmlns:a16="http://schemas.microsoft.com/office/drawing/2014/main" id="{7306C212-B3B4-8E92-B9B3-B626EF37EBA4}"/>
               </a:ext>
             </a:extLst>
           </p:cNvPr>
-          <p:cNvSpPr>
-            <a:spLocks noGrp="1"/>
-          </p:cNvSpPr>
-          <p:nvPr>
-            <p:ph type="title"/>
-          </p:nvPr>
-        </p:nvSpPr>
-        <p:spPr/>
-        <p:txBody>
-          <a:bodyPr/>
-          <a:lstStyle/>
-          <a:p>
-            <a:r>
-              <a:rPr lang="en-US" dirty="0"/>
+          <p:cNvSpPr txBox="1">
+            <a:spLocks noGrp="1"/>
+          </p:cNvSpPr>
+          <p:nvPr>
+            <p:ph type="title" idx="4294967295"/>
+          </p:nvPr>
+        </p:nvSpPr>
+        <p:spPr>
+          <a:xfrm>
+            <a:off x="1061794" y="2274838"/>
+            <a:ext cx="10068412" cy="2308324"/>
+          </a:xfrm>
+          <a:prstGeom prst="rect">
+            <a:avLst/>
+          </a:prstGeom>
+          <a:noFill/>
+          <a:ln>
+            <a:noFill/>
+            <a:prstDash/>
+          </a:ln>
+          <a:effectLst/>
+        </p:spPr>
+        <p:txBody>
+          <a:bodyPr rot="0" spcFirstLastPara="0" vertOverflow="overflow" horzOverflow="overflow" vert="horz" wrap="square" lIns="91440" tIns="45720" rIns="91440" bIns="45720" numCol="1" spcCol="0" rtlCol="0" fromWordArt="0" anchor="t" anchorCtr="0" forceAA="0" compatLnSpc="1">
+            <a:prstTxWarp prst="textNoShape">
+              <a:avLst/>
+            </a:prstTxWarp>
+            <a:spAutoFit/>
+          </a:bodyPr>
+          <a:lstStyle/>
+          <a:p>
+            <a:pPr marL="0" marR="0" lvl="0" indent="0" algn="ctr" defTabSz="457200" rtl="0" eaLnBrk="1" fontAlgn="auto" latinLnBrk="0" hangingPunct="1">
+              <a:lnSpc>
+                <a:spcPct val="100000"/>
+              </a:lnSpc>
+              <a:spcBef>
+                <a:spcPts val="0"/>
+              </a:spcBef>
+              <a:spcAft>
+                <a:spcPts val="0"/>
+              </a:spcAft>
+              <a:buClrTx/>
+              <a:buSzTx/>
+              <a:buFontTx/>
+              <a:buNone/>
+              <a:tabLst/>
+              <a:defRPr/>
+            </a:pPr>
+            <a:r>
+              <a:rPr kumimoji="0" lang="en-US" sz="7200" b="0" i="0" u="none" strike="noStrike" kern="1200" cap="none" spc="0" normalizeH="0" baseline="0" noProof="0" dirty="0">
+                <a:ln>
+                  <a:noFill/>
+                </a:ln>
+                <a:solidFill>
+                  <a:schemeClr val="tx1"/>
+                </a:solidFill>
+                <a:effectLst/>
+                <a:uLnTx/>
+                <a:uFillTx/>
+                <a:latin typeface="+mn-lt"/>
+                <a:ea typeface="+mn-ea"/>
+                <a:cs typeface="+mn-cs"/>
+              </a:rPr>
               <a:t>Reaching the next level</a:t>
             </a:r>
-            <a:br>
-              <a:rPr lang="en-US" dirty="0"/>
-            </a:br>
-            <a:r>
-              <a:rPr lang="en-US" dirty="0"/>
-              <a:t>…of what?</a:t>
-            </a:r>
-          </a:p>
-        </p:txBody>
-      </p:sp>
-      <p:sp>
-        <p:nvSpPr>
-          <p:cNvPr id="3" name="Content Placeholder 2">
-            <a:extLst>
-              <a:ext uri="{FF2B5EF4-FFF2-40B4-BE49-F238E27FC236}">
-                <a16:creationId xmlns:a16="http://schemas.microsoft.com/office/drawing/2014/main" id="{93C949C0-C922-F73D-03DA-51170B99EFF3}"/>
-              </a:ext>
-            </a:extLst>
-          </p:cNvPr>
-          <p:cNvSpPr>
-            <a:spLocks noGrp="1"/>
-          </p:cNvSpPr>
-          <p:nvPr>
-            <p:ph idx="1"/>
-          </p:nvPr>
-        </p:nvSpPr>
-        <p:spPr/>
-        <p:txBody>
-          <a:bodyPr/>
-          <a:lstStyle/>
-          <a:p>
-            <a:endParaRPr lang="en-US"/>
           </a:p>
         </p:txBody>
       </p:sp>
     </p:spTree>
     <p:extLst>
       <p:ext uri="{BB962C8B-B14F-4D97-AF65-F5344CB8AC3E}">
-        <p14:creationId xmlns:p14="http://schemas.microsoft.com/office/powerpoint/2010/main" val="17785311"/>
+        <p14:creationId xmlns:p14="http://schemas.microsoft.com/office/powerpoint/2010/main" val="304747598"/>
       </p:ext>
     </p:extLst>
   </p:cSld>
@@ -9512,7 +9537,7 @@
             </a:br>
             <a:r>
               <a:rPr lang="en-US" dirty="0"/>
-              <a:t>More reading and courses!</a:t>
+              <a:t>…of what?</a:t>
             </a:r>
           </a:p>
         </p:txBody>
@@ -9545,7 +9570,7 @@
     </p:spTree>
     <p:extLst>
       <p:ext uri="{BB962C8B-B14F-4D97-AF65-F5344CB8AC3E}">
-        <p14:creationId xmlns:p14="http://schemas.microsoft.com/office/powerpoint/2010/main" val="3599055868"/>
+        <p14:creationId xmlns:p14="http://schemas.microsoft.com/office/powerpoint/2010/main" val="17785311"/>
       </p:ext>
     </p:extLst>
   </p:cSld>
@@ -9602,6 +9627,96 @@
             </a:br>
             <a:r>
               <a:rPr lang="en-US" dirty="0"/>
+              <a:t>More reading and courses!</a:t>
+            </a:r>
+          </a:p>
+        </p:txBody>
+      </p:sp>
+      <p:sp>
+        <p:nvSpPr>
+          <p:cNvPr id="3" name="Content Placeholder 2">
+            <a:extLst>
+              <a:ext uri="{FF2B5EF4-FFF2-40B4-BE49-F238E27FC236}">
+                <a16:creationId xmlns:a16="http://schemas.microsoft.com/office/drawing/2014/main" id="{93C949C0-C922-F73D-03DA-51170B99EFF3}"/>
+              </a:ext>
+            </a:extLst>
+          </p:cNvPr>
+          <p:cNvSpPr>
+            <a:spLocks noGrp="1"/>
+          </p:cNvSpPr>
+          <p:nvPr>
+            <p:ph idx="1"/>
+          </p:nvPr>
+        </p:nvSpPr>
+        <p:spPr/>
+        <p:txBody>
+          <a:bodyPr/>
+          <a:lstStyle/>
+          <a:p>
+            <a:endParaRPr lang="en-US"/>
+          </a:p>
+        </p:txBody>
+      </p:sp>
+    </p:spTree>
+    <p:extLst>
+      <p:ext uri="{BB962C8B-B14F-4D97-AF65-F5344CB8AC3E}">
+        <p14:creationId xmlns:p14="http://schemas.microsoft.com/office/powerpoint/2010/main" val="3599055868"/>
+      </p:ext>
+    </p:extLst>
+  </p:cSld>
+  <p:clrMapOvr>
+    <a:masterClrMapping/>
+  </p:clrMapOvr>
+</p:sld>
+</file>
+
+<file path=ppt/slides/slide29.xml><?xml version="1.0" encoding="utf-8"?>
+<p:sld xmlns:a="http://schemas.openxmlformats.org/drawingml/2006/main" xmlns:r="http://schemas.openxmlformats.org/officeDocument/2006/relationships" xmlns:p="http://schemas.openxmlformats.org/presentationml/2006/main">
+  <p:cSld>
+    <p:spTree>
+      <p:nvGrpSpPr>
+        <p:cNvPr id="1" name=""/>
+        <p:cNvGrpSpPr/>
+        <p:nvPr/>
+      </p:nvGrpSpPr>
+      <p:grpSpPr>
+        <a:xfrm>
+          <a:off x="0" y="0"/>
+          <a:ext cx="0" cy="0"/>
+          <a:chOff x="0" y="0"/>
+          <a:chExt cx="0" cy="0"/>
+        </a:xfrm>
+      </p:grpSpPr>
+      <p:sp>
+        <p:nvSpPr>
+          <p:cNvPr id="2" name="Title 1">
+            <a:extLst>
+              <a:ext uri="{FF2B5EF4-FFF2-40B4-BE49-F238E27FC236}">
+                <a16:creationId xmlns:a16="http://schemas.microsoft.com/office/drawing/2014/main" id="{A7CE3666-0251-236D-2C10-050AED8D53F0}"/>
+              </a:ext>
+            </a:extLst>
+          </p:cNvPr>
+          <p:cNvSpPr>
+            <a:spLocks noGrp="1"/>
+          </p:cNvSpPr>
+          <p:nvPr>
+            <p:ph type="title"/>
+          </p:nvPr>
+        </p:nvSpPr>
+        <p:spPr/>
+        <p:txBody>
+          <a:bodyPr/>
+          <a:lstStyle/>
+          <a:p>
+            <a:r>
+              <a:rPr lang="en-US" dirty="0"/>
+              <a:t>Reaching the next level</a:t>
+            </a:r>
+            <a:br>
+              <a:rPr lang="en-US" dirty="0"/>
+            </a:br>
+            <a:r>
+              <a:rPr lang="en-US" dirty="0"/>
               <a:t>Formal education</a:t>
             </a:r>
           </a:p>
@@ -9645,7 +9760,114 @@
 </p:sld>
 </file>
 
-<file path=ppt/slides/slide29.xml><?xml version="1.0" encoding="utf-8"?>
+<file path=ppt/slides/slide3.xml><?xml version="1.0" encoding="utf-8"?>
+<p:sld xmlns:a="http://schemas.openxmlformats.org/drawingml/2006/main" xmlns:r="http://schemas.openxmlformats.org/officeDocument/2006/relationships" xmlns:p="http://schemas.openxmlformats.org/presentationml/2006/main">
+  <p:cSld>
+    <p:spTree>
+      <p:nvGrpSpPr>
+        <p:cNvPr id="1" name=""/>
+        <p:cNvGrpSpPr/>
+        <p:nvPr/>
+      </p:nvGrpSpPr>
+      <p:grpSpPr>
+        <a:xfrm>
+          <a:off x="0" y="0"/>
+          <a:ext cx="0" cy="0"/>
+          <a:chOff x="0" y="0"/>
+          <a:chExt cx="0" cy="0"/>
+        </a:xfrm>
+      </p:grpSpPr>
+      <p:sp>
+        <p:nvSpPr>
+          <p:cNvPr id="2" name="Title 1">
+            <a:extLst>
+              <a:ext uri="{FF2B5EF4-FFF2-40B4-BE49-F238E27FC236}">
+                <a16:creationId xmlns:a16="http://schemas.microsoft.com/office/drawing/2014/main" id="{7306C212-B3B4-8E92-B9B3-B626EF37EBA4}"/>
+              </a:ext>
+            </a:extLst>
+          </p:cNvPr>
+          <p:cNvSpPr txBox="1">
+            <a:spLocks noGrp="1"/>
+          </p:cNvSpPr>
+          <p:nvPr>
+            <p:ph type="title" idx="4294967295"/>
+          </p:nvPr>
+        </p:nvSpPr>
+        <p:spPr>
+          <a:xfrm>
+            <a:off x="1061794" y="2828836"/>
+            <a:ext cx="10068412" cy="1200329"/>
+          </a:xfrm>
+          <a:prstGeom prst="rect">
+            <a:avLst/>
+          </a:prstGeom>
+          <a:noFill/>
+          <a:ln>
+            <a:noFill/>
+            <a:prstDash/>
+          </a:ln>
+          <a:effectLst/>
+        </p:spPr>
+        <p:txBody>
+          <a:bodyPr rot="0" spcFirstLastPara="0" vertOverflow="overflow" horzOverflow="overflow" vert="horz" wrap="square" lIns="91440" tIns="45720" rIns="91440" bIns="45720" numCol="1" spcCol="0" rtlCol="0" fromWordArt="0" anchor="t" anchorCtr="0" forceAA="0" compatLnSpc="1">
+            <a:prstTxWarp prst="textNoShape">
+              <a:avLst/>
+            </a:prstTxWarp>
+            <a:spAutoFit/>
+          </a:bodyPr>
+          <a:lstStyle/>
+          <a:p>
+            <a:pPr marL="0" marR="0" lvl="0" indent="0" algn="ctr" defTabSz="457200" rtl="0" eaLnBrk="1" fontAlgn="auto" latinLnBrk="0" hangingPunct="1">
+              <a:lnSpc>
+                <a:spcPct val="100000"/>
+              </a:lnSpc>
+              <a:spcBef>
+                <a:spcPts val="0"/>
+              </a:spcBef>
+              <a:spcAft>
+                <a:spcPts val="0"/>
+              </a:spcAft>
+              <a:buClrTx/>
+              <a:buSzTx/>
+              <a:buFontTx/>
+              <a:buNone/>
+              <a:tabLst/>
+              <a:defRPr/>
+            </a:pPr>
+            <a:r>
+              <a:rPr kumimoji="0" lang="en-US" sz="7200" b="0" i="0" u="none" strike="noStrike" kern="1200" cap="none" spc="0" normalizeH="0" baseline="0" noProof="0" dirty="0">
+                <a:ln>
+                  <a:noFill/>
+                </a:ln>
+                <a:solidFill>
+                  <a:schemeClr val="tx1"/>
+                </a:solidFill>
+                <a:effectLst/>
+                <a:uLnTx/>
+                <a:uFillTx/>
+                <a:latin typeface="+mn-lt"/>
+                <a:ea typeface="+mn-ea"/>
+                <a:cs typeface="+mn-cs"/>
+              </a:rPr>
+              <a:t>Getting ready</a:t>
+            </a:r>
+          </a:p>
+        </p:txBody>
+      </p:sp>
+    </p:spTree>
+    <p:extLst>
+      <p:ext uri="{BB962C8B-B14F-4D97-AF65-F5344CB8AC3E}">
+        <p14:creationId xmlns:p14="http://schemas.microsoft.com/office/powerpoint/2010/main" val="1134924029"/>
+      </p:ext>
+    </p:extLst>
+  </p:cSld>
+  <p:clrMapOvr>
+    <a:masterClrMapping/>
+  </p:clrMapOvr>
+</p:sld>
+</file>
+
+<file path=ppt/slides/slide30.xml><?xml version="1.0" encoding="utf-8"?>
 <p:sld xmlns:a="http://schemas.openxmlformats.org/drawingml/2006/main" xmlns:r="http://schemas.openxmlformats.org/officeDocument/2006/relationships" xmlns:p="http://schemas.openxmlformats.org/presentationml/2006/main">
   <p:cSld>
     <p:spTree>
@@ -9970,114 +10192,7 @@
 </p:sld>
 </file>
 
-<file path=ppt/slides/slide3.xml><?xml version="1.0" encoding="utf-8"?>
-<p:sld xmlns:a="http://schemas.openxmlformats.org/drawingml/2006/main" xmlns:r="http://schemas.openxmlformats.org/officeDocument/2006/relationships" xmlns:p="http://schemas.openxmlformats.org/presentationml/2006/main">
-  <p:cSld>
-    <p:spTree>
-      <p:nvGrpSpPr>
-        <p:cNvPr id="1" name=""/>
-        <p:cNvGrpSpPr/>
-        <p:nvPr/>
-      </p:nvGrpSpPr>
-      <p:grpSpPr>
-        <a:xfrm>
-          <a:off x="0" y="0"/>
-          <a:ext cx="0" cy="0"/>
-          <a:chOff x="0" y="0"/>
-          <a:chExt cx="0" cy="0"/>
-        </a:xfrm>
-      </p:grpSpPr>
-      <p:sp>
-        <p:nvSpPr>
-          <p:cNvPr id="2" name="Title 1">
-            <a:extLst>
-              <a:ext uri="{FF2B5EF4-FFF2-40B4-BE49-F238E27FC236}">
-                <a16:creationId xmlns:a16="http://schemas.microsoft.com/office/drawing/2014/main" id="{7306C212-B3B4-8E92-B9B3-B626EF37EBA4}"/>
-              </a:ext>
-            </a:extLst>
-          </p:cNvPr>
-          <p:cNvSpPr txBox="1">
-            <a:spLocks noGrp="1"/>
-          </p:cNvSpPr>
-          <p:nvPr>
-            <p:ph type="title" idx="4294967295"/>
-          </p:nvPr>
-        </p:nvSpPr>
-        <p:spPr>
-          <a:xfrm>
-            <a:off x="1061794" y="2828836"/>
-            <a:ext cx="10068412" cy="1200329"/>
-          </a:xfrm>
-          <a:prstGeom prst="rect">
-            <a:avLst/>
-          </a:prstGeom>
-          <a:noFill/>
-          <a:ln>
-            <a:noFill/>
-            <a:prstDash/>
-          </a:ln>
-          <a:effectLst/>
-        </p:spPr>
-        <p:txBody>
-          <a:bodyPr rot="0" spcFirstLastPara="0" vertOverflow="overflow" horzOverflow="overflow" vert="horz" wrap="square" lIns="91440" tIns="45720" rIns="91440" bIns="45720" numCol="1" spcCol="0" rtlCol="0" fromWordArt="0" anchor="t" anchorCtr="0" forceAA="0" compatLnSpc="1">
-            <a:prstTxWarp prst="textNoShape">
-              <a:avLst/>
-            </a:prstTxWarp>
-            <a:spAutoFit/>
-          </a:bodyPr>
-          <a:lstStyle/>
-          <a:p>
-            <a:pPr marL="0" marR="0" lvl="0" indent="0" algn="ctr" defTabSz="457200" rtl="0" eaLnBrk="1" fontAlgn="auto" latinLnBrk="0" hangingPunct="1">
-              <a:lnSpc>
-                <a:spcPct val="100000"/>
-              </a:lnSpc>
-              <a:spcBef>
-                <a:spcPts val="0"/>
-              </a:spcBef>
-              <a:spcAft>
-                <a:spcPts val="0"/>
-              </a:spcAft>
-              <a:buClrTx/>
-              <a:buSzTx/>
-              <a:buFontTx/>
-              <a:buNone/>
-              <a:tabLst/>
-              <a:defRPr/>
-            </a:pPr>
-            <a:r>
-              <a:rPr kumimoji="0" lang="en-US" sz="7200" b="0" i="0" u="none" strike="noStrike" kern="1200" cap="none" spc="0" normalizeH="0" baseline="0" noProof="0" dirty="0">
-                <a:ln>
-                  <a:noFill/>
-                </a:ln>
-                <a:solidFill>
-                  <a:schemeClr val="tx1"/>
-                </a:solidFill>
-                <a:effectLst/>
-                <a:uLnTx/>
-                <a:uFillTx/>
-                <a:latin typeface="+mn-lt"/>
-                <a:ea typeface="+mn-ea"/>
-                <a:cs typeface="+mn-cs"/>
-              </a:rPr>
-              <a:t>Getting ready</a:t>
-            </a:r>
-          </a:p>
-        </p:txBody>
-      </p:sp>
-    </p:spTree>
-    <p:extLst>
-      <p:ext uri="{BB962C8B-B14F-4D97-AF65-F5344CB8AC3E}">
-        <p14:creationId xmlns:p14="http://schemas.microsoft.com/office/powerpoint/2010/main" val="1134924029"/>
-      </p:ext>
-    </p:extLst>
-  </p:cSld>
-  <p:clrMapOvr>
-    <a:masterClrMapping/>
-  </p:clrMapOvr>
-</p:sld>
-</file>
-
-<file path=ppt/slides/slide30.xml><?xml version="1.0" encoding="utf-8"?>
+<file path=ppt/slides/slide31.xml><?xml version="1.0" encoding="utf-8"?>
 <p:sld xmlns:a="http://schemas.openxmlformats.org/drawingml/2006/main" xmlns:r="http://schemas.openxmlformats.org/officeDocument/2006/relationships" xmlns:p="http://schemas.openxmlformats.org/presentationml/2006/main">
   <p:cSld>
     <p:spTree>

</xml_diff>

<commit_message>
Don't make assumptions about what people are interested in
</commit_message>
<xml_diff>
--- a/Sitting in meetings all day long.pptx
+++ b/Sitting in meetings all day long.pptx
@@ -227,7 +227,7 @@
           <a:p>
             <a:fld id="{2B6DBF41-98D5-4B29-8B81-B31614D19ACC}" type="datetimeFigureOut">
               <a:rPr lang="en-US" smtClean="0"/>
-              <a:t>4/3/24</a:t>
+              <a:t>4/10/24</a:t>
             </a:fld>
             <a:endParaRPr lang="en-US"/>
           </a:p>
@@ -982,7 +982,7 @@
           <a:p>
             <a:fld id="{F9BC75CE-03FF-4667-898C-4C70B4392062}" type="datetimeFigureOut">
               <a:rPr lang="en-US" smtClean="0"/>
-              <a:t>4/3/24</a:t>
+              <a:t>4/10/24</a:t>
             </a:fld>
             <a:endParaRPr lang="en-US"/>
           </a:p>
@@ -1257,7 +1257,7 @@
           <a:p>
             <a:fld id="{F9BC75CE-03FF-4667-898C-4C70B4392062}" type="datetimeFigureOut">
               <a:rPr lang="en-US" smtClean="0"/>
-              <a:t>4/3/24</a:t>
+              <a:t>4/10/24</a:t>
             </a:fld>
             <a:endParaRPr lang="en-US"/>
           </a:p>
@@ -1451,7 +1451,7 @@
           <a:p>
             <a:fld id="{F9BC75CE-03FF-4667-898C-4C70B4392062}" type="datetimeFigureOut">
               <a:rPr lang="en-US" smtClean="0"/>
-              <a:t>4/3/24</a:t>
+              <a:t>4/10/24</a:t>
             </a:fld>
             <a:endParaRPr lang="en-US"/>
           </a:p>
@@ -1724,7 +1724,7 @@
           <a:p>
             <a:fld id="{F9BC75CE-03FF-4667-898C-4C70B4392062}" type="datetimeFigureOut">
               <a:rPr lang="en-US" smtClean="0"/>
-              <a:t>4/3/24</a:t>
+              <a:t>4/10/24</a:t>
             </a:fld>
             <a:endParaRPr lang="en-US"/>
           </a:p>
@@ -2065,7 +2065,7 @@
           <a:p>
             <a:fld id="{F9BC75CE-03FF-4667-898C-4C70B4392062}" type="datetimeFigureOut">
               <a:rPr lang="en-US" smtClean="0"/>
-              <a:t>4/3/24</a:t>
+              <a:t>4/10/24</a:t>
             </a:fld>
             <a:endParaRPr lang="en-US"/>
           </a:p>
@@ -2688,7 +2688,7 @@
           <a:p>
             <a:fld id="{F9BC75CE-03FF-4667-898C-4C70B4392062}" type="datetimeFigureOut">
               <a:rPr lang="en-US" smtClean="0"/>
-              <a:t>4/3/24</a:t>
+              <a:t>4/10/24</a:t>
             </a:fld>
             <a:endParaRPr lang="en-US"/>
           </a:p>
@@ -3548,7 +3548,7 @@
           <a:p>
             <a:fld id="{F9BC75CE-03FF-4667-898C-4C70B4392062}" type="datetimeFigureOut">
               <a:rPr lang="en-US" smtClean="0"/>
-              <a:t>4/3/24</a:t>
+              <a:t>4/10/24</a:t>
             </a:fld>
             <a:endParaRPr lang="en-US"/>
           </a:p>
@@ -3718,7 +3718,7 @@
           <a:p>
             <a:fld id="{F9BC75CE-03FF-4667-898C-4C70B4392062}" type="datetimeFigureOut">
               <a:rPr lang="en-US" smtClean="0"/>
-              <a:t>4/3/24</a:t>
+              <a:t>4/10/24</a:t>
             </a:fld>
             <a:endParaRPr lang="en-US"/>
           </a:p>
@@ -3898,7 +3898,7 @@
           <a:p>
             <a:fld id="{F9BC75CE-03FF-4667-898C-4C70B4392062}" type="datetimeFigureOut">
               <a:rPr lang="en-US" smtClean="0"/>
-              <a:t>4/3/24</a:t>
+              <a:t>4/10/24</a:t>
             </a:fld>
             <a:endParaRPr lang="en-US"/>
           </a:p>
@@ -4068,7 +4068,7 @@
           <a:p>
             <a:fld id="{F9BC75CE-03FF-4667-898C-4C70B4392062}" type="datetimeFigureOut">
               <a:rPr lang="en-US" smtClean="0"/>
-              <a:t>4/3/24</a:t>
+              <a:t>4/10/24</a:t>
             </a:fld>
             <a:endParaRPr lang="en-US"/>
           </a:p>
@@ -4315,7 +4315,7 @@
           <a:p>
             <a:fld id="{F9BC75CE-03FF-4667-898C-4C70B4392062}" type="datetimeFigureOut">
               <a:rPr lang="en-US" smtClean="0"/>
-              <a:t>4/3/24</a:t>
+              <a:t>4/10/24</a:t>
             </a:fld>
             <a:endParaRPr lang="en-US"/>
           </a:p>
@@ -4607,7 +4607,7 @@
           <a:p>
             <a:fld id="{F9BC75CE-03FF-4667-898C-4C70B4392062}" type="datetimeFigureOut">
               <a:rPr lang="en-US" smtClean="0"/>
-              <a:t>4/3/24</a:t>
+              <a:t>4/10/24</a:t>
             </a:fld>
             <a:endParaRPr lang="en-US"/>
           </a:p>
@@ -5051,7 +5051,7 @@
           <a:p>
             <a:fld id="{F9BC75CE-03FF-4667-898C-4C70B4392062}" type="datetimeFigureOut">
               <a:rPr lang="en-US" smtClean="0"/>
-              <a:t>4/3/24</a:t>
+              <a:t>4/10/24</a:t>
             </a:fld>
             <a:endParaRPr lang="en-US"/>
           </a:p>
@@ -5169,7 +5169,7 @@
           <a:p>
             <a:fld id="{F9BC75CE-03FF-4667-898C-4C70B4392062}" type="datetimeFigureOut">
               <a:rPr lang="en-US" smtClean="0"/>
-              <a:t>4/3/24</a:t>
+              <a:t>4/10/24</a:t>
             </a:fld>
             <a:endParaRPr lang="en-US"/>
           </a:p>
@@ -5264,7 +5264,7 @@
           <a:p>
             <a:fld id="{F9BC75CE-03FF-4667-898C-4C70B4392062}" type="datetimeFigureOut">
               <a:rPr lang="en-US" smtClean="0"/>
-              <a:t>4/3/24</a:t>
+              <a:t>4/10/24</a:t>
             </a:fld>
             <a:endParaRPr lang="en-US"/>
           </a:p>
@@ -5543,7 +5543,7 @@
           <a:p>
             <a:fld id="{F9BC75CE-03FF-4667-898C-4C70B4392062}" type="datetimeFigureOut">
               <a:rPr lang="en-US" smtClean="0"/>
-              <a:t>4/3/24</a:t>
+              <a:t>4/10/24</a:t>
             </a:fld>
             <a:endParaRPr lang="en-US"/>
           </a:p>
@@ -5818,7 +5818,7 @@
           <a:p>
             <a:fld id="{F9BC75CE-03FF-4667-898C-4C70B4392062}" type="datetimeFigureOut">
               <a:rPr lang="en-US" smtClean="0"/>
-              <a:t>4/3/24</a:t>
+              <a:t>4/10/24</a:t>
             </a:fld>
             <a:endParaRPr lang="en-US"/>
           </a:p>
@@ -6247,7 +6247,7 @@
           <a:p>
             <a:fld id="{F9BC75CE-03FF-4667-898C-4C70B4392062}" type="datetimeFigureOut">
               <a:rPr lang="en-US" smtClean="0"/>
-              <a:t>4/3/24</a:t>
+              <a:t>4/10/24</a:t>
             </a:fld>
             <a:endParaRPr lang="en-US"/>
           </a:p>
@@ -9079,7 +9079,10 @@
           <a:bodyPr/>
           <a:lstStyle/>
           <a:p>
-            <a:endParaRPr lang="en-US"/>
+            <a:r>
+              <a:rPr lang="en-US" dirty="0"/>
+              <a:t>Don’t assume what people are interested in</a:t>
+            </a:r>
           </a:p>
         </p:txBody>
       </p:sp>

</xml_diff>

<commit_message>
Update Sitting in meetings all day long.pptx
Typography fixes
</commit_message>
<xml_diff>
--- a/Sitting in meetings all day long.pptx
+++ b/Sitting in meetings all day long.pptx
@@ -227,7 +227,7 @@
           <a:p>
             <a:fld id="{2B6DBF41-98D5-4B29-8B81-B31614D19ACC}" type="datetimeFigureOut">
               <a:rPr lang="en-US" smtClean="0"/>
-              <a:t>4/10/24</a:t>
+              <a:t>5/20/24</a:t>
             </a:fld>
             <a:endParaRPr lang="en-US"/>
           </a:p>
@@ -982,7 +982,7 @@
           <a:p>
             <a:fld id="{F9BC75CE-03FF-4667-898C-4C70B4392062}" type="datetimeFigureOut">
               <a:rPr lang="en-US" smtClean="0"/>
-              <a:t>4/10/24</a:t>
+              <a:t>5/20/24</a:t>
             </a:fld>
             <a:endParaRPr lang="en-US"/>
           </a:p>
@@ -1257,7 +1257,7 @@
           <a:p>
             <a:fld id="{F9BC75CE-03FF-4667-898C-4C70B4392062}" type="datetimeFigureOut">
               <a:rPr lang="en-US" smtClean="0"/>
-              <a:t>4/10/24</a:t>
+              <a:t>5/20/24</a:t>
             </a:fld>
             <a:endParaRPr lang="en-US"/>
           </a:p>
@@ -1451,7 +1451,7 @@
           <a:p>
             <a:fld id="{F9BC75CE-03FF-4667-898C-4C70B4392062}" type="datetimeFigureOut">
               <a:rPr lang="en-US" smtClean="0"/>
-              <a:t>4/10/24</a:t>
+              <a:t>5/20/24</a:t>
             </a:fld>
             <a:endParaRPr lang="en-US"/>
           </a:p>
@@ -1724,7 +1724,7 @@
           <a:p>
             <a:fld id="{F9BC75CE-03FF-4667-898C-4C70B4392062}" type="datetimeFigureOut">
               <a:rPr lang="en-US" smtClean="0"/>
-              <a:t>4/10/24</a:t>
+              <a:t>5/20/24</a:t>
             </a:fld>
             <a:endParaRPr lang="en-US"/>
           </a:p>
@@ -2065,7 +2065,7 @@
           <a:p>
             <a:fld id="{F9BC75CE-03FF-4667-898C-4C70B4392062}" type="datetimeFigureOut">
               <a:rPr lang="en-US" smtClean="0"/>
-              <a:t>4/10/24</a:t>
+              <a:t>5/20/24</a:t>
             </a:fld>
             <a:endParaRPr lang="en-US"/>
           </a:p>
@@ -2688,7 +2688,7 @@
           <a:p>
             <a:fld id="{F9BC75CE-03FF-4667-898C-4C70B4392062}" type="datetimeFigureOut">
               <a:rPr lang="en-US" smtClean="0"/>
-              <a:t>4/10/24</a:t>
+              <a:t>5/20/24</a:t>
             </a:fld>
             <a:endParaRPr lang="en-US"/>
           </a:p>
@@ -3548,7 +3548,7 @@
           <a:p>
             <a:fld id="{F9BC75CE-03FF-4667-898C-4C70B4392062}" type="datetimeFigureOut">
               <a:rPr lang="en-US" smtClean="0"/>
-              <a:t>4/10/24</a:t>
+              <a:t>5/20/24</a:t>
             </a:fld>
             <a:endParaRPr lang="en-US"/>
           </a:p>
@@ -3718,7 +3718,7 @@
           <a:p>
             <a:fld id="{F9BC75CE-03FF-4667-898C-4C70B4392062}" type="datetimeFigureOut">
               <a:rPr lang="en-US" smtClean="0"/>
-              <a:t>4/10/24</a:t>
+              <a:t>5/20/24</a:t>
             </a:fld>
             <a:endParaRPr lang="en-US"/>
           </a:p>
@@ -3898,7 +3898,7 @@
           <a:p>
             <a:fld id="{F9BC75CE-03FF-4667-898C-4C70B4392062}" type="datetimeFigureOut">
               <a:rPr lang="en-US" smtClean="0"/>
-              <a:t>4/10/24</a:t>
+              <a:t>5/20/24</a:t>
             </a:fld>
             <a:endParaRPr lang="en-US"/>
           </a:p>
@@ -4068,7 +4068,7 @@
           <a:p>
             <a:fld id="{F9BC75CE-03FF-4667-898C-4C70B4392062}" type="datetimeFigureOut">
               <a:rPr lang="en-US" smtClean="0"/>
-              <a:t>4/10/24</a:t>
+              <a:t>5/20/24</a:t>
             </a:fld>
             <a:endParaRPr lang="en-US"/>
           </a:p>
@@ -4315,7 +4315,7 @@
           <a:p>
             <a:fld id="{F9BC75CE-03FF-4667-898C-4C70B4392062}" type="datetimeFigureOut">
               <a:rPr lang="en-US" smtClean="0"/>
-              <a:t>4/10/24</a:t>
+              <a:t>5/20/24</a:t>
             </a:fld>
             <a:endParaRPr lang="en-US"/>
           </a:p>
@@ -4607,7 +4607,7 @@
           <a:p>
             <a:fld id="{F9BC75CE-03FF-4667-898C-4C70B4392062}" type="datetimeFigureOut">
               <a:rPr lang="en-US" smtClean="0"/>
-              <a:t>4/10/24</a:t>
+              <a:t>5/20/24</a:t>
             </a:fld>
             <a:endParaRPr lang="en-US"/>
           </a:p>
@@ -5051,7 +5051,7 @@
           <a:p>
             <a:fld id="{F9BC75CE-03FF-4667-898C-4C70B4392062}" type="datetimeFigureOut">
               <a:rPr lang="en-US" smtClean="0"/>
-              <a:t>4/10/24</a:t>
+              <a:t>5/20/24</a:t>
             </a:fld>
             <a:endParaRPr lang="en-US"/>
           </a:p>
@@ -5169,7 +5169,7 @@
           <a:p>
             <a:fld id="{F9BC75CE-03FF-4667-898C-4C70B4392062}" type="datetimeFigureOut">
               <a:rPr lang="en-US" smtClean="0"/>
-              <a:t>4/10/24</a:t>
+              <a:t>5/20/24</a:t>
             </a:fld>
             <a:endParaRPr lang="en-US"/>
           </a:p>
@@ -5264,7 +5264,7 @@
           <a:p>
             <a:fld id="{F9BC75CE-03FF-4667-898C-4C70B4392062}" type="datetimeFigureOut">
               <a:rPr lang="en-US" smtClean="0"/>
-              <a:t>4/10/24</a:t>
+              <a:t>5/20/24</a:t>
             </a:fld>
             <a:endParaRPr lang="en-US"/>
           </a:p>
@@ -5543,7 +5543,7 @@
           <a:p>
             <a:fld id="{F9BC75CE-03FF-4667-898C-4C70B4392062}" type="datetimeFigureOut">
               <a:rPr lang="en-US" smtClean="0"/>
-              <a:t>4/10/24</a:t>
+              <a:t>5/20/24</a:t>
             </a:fld>
             <a:endParaRPr lang="en-US"/>
           </a:p>
@@ -5818,7 +5818,7 @@
           <a:p>
             <a:fld id="{F9BC75CE-03FF-4667-898C-4C70B4392062}" type="datetimeFigureOut">
               <a:rPr lang="en-US" smtClean="0"/>
-              <a:t>4/10/24</a:t>
+              <a:t>5/20/24</a:t>
             </a:fld>
             <a:endParaRPr lang="en-US"/>
           </a:p>
@@ -6247,7 +6247,7 @@
           <a:p>
             <a:fld id="{F9BC75CE-03FF-4667-898C-4C70B4392062}" type="datetimeFigureOut">
               <a:rPr lang="en-US" smtClean="0"/>
-              <a:t>4/10/24</a:t>
+              <a:t>5/20/24</a:t>
             </a:fld>
             <a:endParaRPr lang="en-US"/>
           </a:p>
@@ -7400,7 +7400,7 @@
           <a:p>
             <a:r>
               <a:rPr lang="en-US" sz="1200" dirty="0"/>
-              <a:t>Rev. 1 (2024-04-??), </a:t>
+              <a:t>Rev. 1 (2024-05-??), </a:t>
             </a:r>
             <a:r>
               <a:rPr lang="en-US" sz="1200" dirty="0">
@@ -8314,7 +8314,7 @@
             </a:br>
             <a:r>
               <a:rPr lang="en-US" dirty="0"/>
-              <a:t>“Managing” in all sorts of directions</a:t>
+              <a:t>"Managing" in all sorts of directions</a:t>
             </a:r>
           </a:p>
         </p:txBody>
@@ -9188,7 +9188,7 @@
                 <a:ea typeface="+mn-ea"/>
                 <a:cs typeface="+mn-cs"/>
               </a:rPr>
-              <a:t>Dealing with ”large" amounts</a:t>
+              <a:t>Dealing with "large" amounts</a:t>
             </a:r>
           </a:p>
         </p:txBody>
@@ -9246,7 +9246,7 @@
           <a:p>
             <a:r>
               <a:rPr lang="en-US" dirty="0"/>
-              <a:t>Dealing with ”large" amounts</a:t>
+              <a:t>Dealing with "large" amounts</a:t>
             </a:r>
             <a:br>
               <a:rPr lang="en-US" dirty="0"/>
@@ -9336,7 +9336,7 @@
           <a:p>
             <a:r>
               <a:rPr lang="en-US" dirty="0"/>
-              <a:t>Dealing with ”large" amounts</a:t>
+              <a:t>Dealing with "large" amounts</a:t>
             </a:r>
             <a:br>
               <a:rPr lang="en-US" dirty="0"/>

</xml_diff>